<commit_message>
cleaned the logs and checkpoints, updated presentation
</commit_message>
<xml_diff>
--- a/deck/zk-hack-berlin.pptx
+++ b/deck/zk-hack-berlin.pptx
@@ -10,7 +10,11 @@
     <p:sldId id="260" r:id="rId4"/>
     <p:sldId id="259" r:id="rId5"/>
     <p:sldId id="261" r:id="rId6"/>
-    <p:sldId id="262" r:id="rId7"/>
+    <p:sldId id="264" r:id="rId7"/>
+    <p:sldId id="265" r:id="rId8"/>
+    <p:sldId id="266" r:id="rId9"/>
+    <p:sldId id="262" r:id="rId10"/>
+    <p:sldId id="263" r:id="rId11"/>
   </p:sldIdLst>
   <p:sldSz cx="12192000" cy="6858000"/>
   <p:notesSz cx="6858000" cy="9144000"/>
@@ -110,6 +114,2855 @@
     </a:lvl9pPr>
   </p:defaultTextStyle>
 </p:presentation>
+</file>
+
+<file path=ppt/diagrams/colors1.xml><?xml version="1.0" encoding="utf-8"?>
+<dgm:colorsDef xmlns:dgm="http://schemas.openxmlformats.org/drawingml/2006/diagram" xmlns:a="http://schemas.openxmlformats.org/drawingml/2006/main" uniqueId="urn:microsoft.com/office/officeart/2005/8/colors/colorful2">
+  <dgm:title val=""/>
+  <dgm:desc val=""/>
+  <dgm:catLst>
+    <dgm:cat type="colorful" pri="10200"/>
+  </dgm:catLst>
+  <dgm:styleLbl name="node0">
+    <dgm:fillClrLst meth="repeat">
+      <a:schemeClr val="accent1"/>
+    </dgm:fillClrLst>
+    <dgm:linClrLst meth="repeat">
+      <a:schemeClr val="lt1"/>
+    </dgm:linClrLst>
+    <dgm:effectClrLst/>
+    <dgm:txLinClrLst/>
+    <dgm:txFillClrLst/>
+    <dgm:txEffectClrLst/>
+  </dgm:styleLbl>
+  <dgm:styleLbl name="node1">
+    <dgm:fillClrLst>
+      <a:schemeClr val="accent2"/>
+      <a:schemeClr val="accent3"/>
+    </dgm:fillClrLst>
+    <dgm:linClrLst meth="repeat">
+      <a:schemeClr val="lt1"/>
+    </dgm:linClrLst>
+    <dgm:effectClrLst/>
+    <dgm:txLinClrLst/>
+    <dgm:txFillClrLst/>
+    <dgm:txEffectClrLst/>
+  </dgm:styleLbl>
+  <dgm:styleLbl name="alignNode1">
+    <dgm:fillClrLst>
+      <a:schemeClr val="accent2"/>
+      <a:schemeClr val="accent3"/>
+    </dgm:fillClrLst>
+    <dgm:linClrLst>
+      <a:schemeClr val="accent2"/>
+      <a:schemeClr val="accent3"/>
+    </dgm:linClrLst>
+    <dgm:effectClrLst/>
+    <dgm:txLinClrLst/>
+    <dgm:txFillClrLst/>
+    <dgm:txEffectClrLst/>
+  </dgm:styleLbl>
+  <dgm:styleLbl name="lnNode1">
+    <dgm:fillClrLst>
+      <a:schemeClr val="accent2"/>
+      <a:schemeClr val="accent3"/>
+    </dgm:fillClrLst>
+    <dgm:linClrLst meth="repeat">
+      <a:schemeClr val="lt1"/>
+    </dgm:linClrLst>
+    <dgm:effectClrLst/>
+    <dgm:txLinClrLst/>
+    <dgm:txFillClrLst/>
+    <dgm:txEffectClrLst/>
+  </dgm:styleLbl>
+  <dgm:styleLbl name="vennNode1">
+    <dgm:fillClrLst>
+      <a:schemeClr val="accent2">
+        <a:alpha val="50000"/>
+      </a:schemeClr>
+      <a:schemeClr val="accent3">
+        <a:alpha val="50000"/>
+      </a:schemeClr>
+    </dgm:fillClrLst>
+    <dgm:linClrLst meth="repeat">
+      <a:schemeClr val="lt1"/>
+    </dgm:linClrLst>
+    <dgm:effectClrLst/>
+    <dgm:txLinClrLst/>
+    <dgm:txFillClrLst/>
+    <dgm:txEffectClrLst/>
+  </dgm:styleLbl>
+  <dgm:styleLbl name="node2">
+    <dgm:fillClrLst>
+      <a:schemeClr val="accent3"/>
+    </dgm:fillClrLst>
+    <dgm:linClrLst meth="repeat">
+      <a:schemeClr val="lt1"/>
+    </dgm:linClrLst>
+    <dgm:effectClrLst/>
+    <dgm:txLinClrLst/>
+    <dgm:txFillClrLst/>
+    <dgm:txEffectClrLst/>
+  </dgm:styleLbl>
+  <dgm:styleLbl name="node3">
+    <dgm:fillClrLst>
+      <a:schemeClr val="accent4"/>
+    </dgm:fillClrLst>
+    <dgm:linClrLst meth="repeat">
+      <a:schemeClr val="lt1"/>
+    </dgm:linClrLst>
+    <dgm:effectClrLst/>
+    <dgm:txLinClrLst/>
+    <dgm:txFillClrLst/>
+    <dgm:txEffectClrLst/>
+  </dgm:styleLbl>
+  <dgm:styleLbl name="node4">
+    <dgm:fillClrLst>
+      <a:schemeClr val="accent5"/>
+    </dgm:fillClrLst>
+    <dgm:linClrLst meth="repeat">
+      <a:schemeClr val="lt1"/>
+    </dgm:linClrLst>
+    <dgm:effectClrLst/>
+    <dgm:txLinClrLst/>
+    <dgm:txFillClrLst/>
+    <dgm:txEffectClrLst/>
+  </dgm:styleLbl>
+  <dgm:styleLbl name="fgImgPlace1">
+    <dgm:fillClrLst>
+      <a:schemeClr val="accent2">
+        <a:tint val="50000"/>
+      </a:schemeClr>
+      <a:schemeClr val="accent3">
+        <a:tint val="50000"/>
+      </a:schemeClr>
+    </dgm:fillClrLst>
+    <dgm:linClrLst meth="repeat">
+      <a:schemeClr val="lt1"/>
+    </dgm:linClrLst>
+    <dgm:effectClrLst/>
+    <dgm:txLinClrLst/>
+    <dgm:txFillClrLst meth="repeat">
+      <a:schemeClr val="lt1"/>
+    </dgm:txFillClrLst>
+    <dgm:txEffectClrLst/>
+  </dgm:styleLbl>
+  <dgm:styleLbl name="alignImgPlace1">
+    <dgm:fillClrLst>
+      <a:schemeClr val="accent2">
+        <a:tint val="50000"/>
+      </a:schemeClr>
+      <a:schemeClr val="accent3">
+        <a:tint val="20000"/>
+      </a:schemeClr>
+    </dgm:fillClrLst>
+    <dgm:linClrLst meth="repeat">
+      <a:schemeClr val="lt1"/>
+    </dgm:linClrLst>
+    <dgm:effectClrLst/>
+    <dgm:txLinClrLst/>
+    <dgm:txFillClrLst meth="repeat">
+      <a:schemeClr val="lt1"/>
+    </dgm:txFillClrLst>
+    <dgm:txEffectClrLst/>
+  </dgm:styleLbl>
+  <dgm:styleLbl name="bgImgPlace1">
+    <dgm:fillClrLst>
+      <a:schemeClr val="accent2">
+        <a:tint val="50000"/>
+      </a:schemeClr>
+      <a:schemeClr val="accent3">
+        <a:tint val="20000"/>
+      </a:schemeClr>
+    </dgm:fillClrLst>
+    <dgm:linClrLst meth="repeat">
+      <a:schemeClr val="lt1"/>
+    </dgm:linClrLst>
+    <dgm:effectClrLst/>
+    <dgm:txLinClrLst/>
+    <dgm:txFillClrLst meth="repeat">
+      <a:schemeClr val="lt1"/>
+    </dgm:txFillClrLst>
+    <dgm:txEffectClrLst/>
+  </dgm:styleLbl>
+  <dgm:styleLbl name="sibTrans2D1">
+    <dgm:fillClrLst>
+      <a:schemeClr val="accent2"/>
+      <a:schemeClr val="accent3"/>
+    </dgm:fillClrLst>
+    <dgm:linClrLst meth="repeat">
+      <a:schemeClr val="lt1"/>
+    </dgm:linClrLst>
+    <dgm:effectClrLst/>
+    <dgm:txLinClrLst/>
+    <dgm:txFillClrLst/>
+    <dgm:txEffectClrLst/>
+  </dgm:styleLbl>
+  <dgm:styleLbl name="fgSibTrans2D1">
+    <dgm:fillClrLst>
+      <a:schemeClr val="accent2"/>
+      <a:schemeClr val="accent3"/>
+    </dgm:fillClrLst>
+    <dgm:linClrLst meth="repeat">
+      <a:schemeClr val="lt1"/>
+    </dgm:linClrLst>
+    <dgm:effectClrLst/>
+    <dgm:txLinClrLst/>
+    <dgm:txFillClrLst meth="repeat">
+      <a:schemeClr val="lt1"/>
+    </dgm:txFillClrLst>
+    <dgm:txEffectClrLst/>
+  </dgm:styleLbl>
+  <dgm:styleLbl name="bgSibTrans2D1">
+    <dgm:fillClrLst>
+      <a:schemeClr val="accent2"/>
+      <a:schemeClr val="accent3"/>
+    </dgm:fillClrLst>
+    <dgm:linClrLst meth="repeat">
+      <a:schemeClr val="lt1"/>
+    </dgm:linClrLst>
+    <dgm:effectClrLst/>
+    <dgm:txLinClrLst/>
+    <dgm:txFillClrLst meth="repeat">
+      <a:schemeClr val="lt1"/>
+    </dgm:txFillClrLst>
+    <dgm:txEffectClrLst/>
+  </dgm:styleLbl>
+  <dgm:styleLbl name="sibTrans1D1">
+    <dgm:fillClrLst/>
+    <dgm:linClrLst>
+      <a:schemeClr val="accent2"/>
+      <a:schemeClr val="accent3"/>
+    </dgm:linClrLst>
+    <dgm:effectClrLst/>
+    <dgm:txLinClrLst/>
+    <dgm:txFillClrLst meth="repeat">
+      <a:schemeClr val="tx1"/>
+    </dgm:txFillClrLst>
+    <dgm:txEffectClrLst/>
+  </dgm:styleLbl>
+  <dgm:styleLbl name="callout">
+    <dgm:fillClrLst meth="repeat">
+      <a:schemeClr val="accent2"/>
+    </dgm:fillClrLst>
+    <dgm:linClrLst meth="repeat">
+      <a:schemeClr val="accent2">
+        <a:tint val="50000"/>
+      </a:schemeClr>
+    </dgm:linClrLst>
+    <dgm:effectClrLst/>
+    <dgm:txLinClrLst/>
+    <dgm:txFillClrLst meth="repeat">
+      <a:schemeClr val="tx1"/>
+    </dgm:txFillClrLst>
+    <dgm:txEffectClrLst/>
+  </dgm:styleLbl>
+  <dgm:styleLbl name="asst0">
+    <dgm:fillClrLst meth="repeat">
+      <a:schemeClr val="accent2"/>
+    </dgm:fillClrLst>
+    <dgm:linClrLst meth="repeat">
+      <a:schemeClr val="lt1">
+        <a:shade val="80000"/>
+      </a:schemeClr>
+    </dgm:linClrLst>
+    <dgm:effectClrLst/>
+    <dgm:txLinClrLst/>
+    <dgm:txFillClrLst/>
+    <dgm:txEffectClrLst/>
+  </dgm:styleLbl>
+  <dgm:styleLbl name="asst1">
+    <dgm:fillClrLst meth="repeat">
+      <a:schemeClr val="accent3"/>
+    </dgm:fillClrLst>
+    <dgm:linClrLst meth="repeat">
+      <a:schemeClr val="lt1">
+        <a:shade val="80000"/>
+      </a:schemeClr>
+    </dgm:linClrLst>
+    <dgm:effectClrLst/>
+    <dgm:txLinClrLst/>
+    <dgm:txFillClrLst/>
+    <dgm:txEffectClrLst/>
+  </dgm:styleLbl>
+  <dgm:styleLbl name="asst2">
+    <dgm:fillClrLst>
+      <a:schemeClr val="accent4"/>
+    </dgm:fillClrLst>
+    <dgm:linClrLst meth="repeat">
+      <a:schemeClr val="lt1"/>
+    </dgm:linClrLst>
+    <dgm:effectClrLst/>
+    <dgm:txLinClrLst/>
+    <dgm:txFillClrLst/>
+    <dgm:txEffectClrLst/>
+  </dgm:styleLbl>
+  <dgm:styleLbl name="asst3">
+    <dgm:fillClrLst>
+      <a:schemeClr val="accent5"/>
+    </dgm:fillClrLst>
+    <dgm:linClrLst meth="repeat">
+      <a:schemeClr val="lt1"/>
+    </dgm:linClrLst>
+    <dgm:effectClrLst/>
+    <dgm:txLinClrLst/>
+    <dgm:txFillClrLst/>
+    <dgm:txEffectClrLst/>
+  </dgm:styleLbl>
+  <dgm:styleLbl name="asst4">
+    <dgm:fillClrLst>
+      <a:schemeClr val="accent6"/>
+    </dgm:fillClrLst>
+    <dgm:linClrLst meth="repeat">
+      <a:schemeClr val="lt1"/>
+    </dgm:linClrLst>
+    <dgm:effectClrLst/>
+    <dgm:txLinClrLst/>
+    <dgm:txFillClrLst/>
+    <dgm:txEffectClrLst/>
+  </dgm:styleLbl>
+  <dgm:styleLbl name="parChTrans2D1">
+    <dgm:fillClrLst meth="repeat">
+      <a:schemeClr val="accent2"/>
+    </dgm:fillClrLst>
+    <dgm:linClrLst meth="repeat">
+      <a:schemeClr val="lt1"/>
+    </dgm:linClrLst>
+    <dgm:effectClrLst/>
+    <dgm:txLinClrLst/>
+    <dgm:txFillClrLst meth="repeat">
+      <a:schemeClr val="lt1"/>
+    </dgm:txFillClrLst>
+    <dgm:txEffectClrLst/>
+  </dgm:styleLbl>
+  <dgm:styleLbl name="parChTrans2D2">
+    <dgm:fillClrLst meth="repeat">
+      <a:schemeClr val="accent3"/>
+    </dgm:fillClrLst>
+    <dgm:linClrLst meth="repeat">
+      <a:schemeClr val="lt1"/>
+    </dgm:linClrLst>
+    <dgm:effectClrLst/>
+    <dgm:txLinClrLst/>
+    <dgm:txFillClrLst/>
+    <dgm:txEffectClrLst/>
+  </dgm:styleLbl>
+  <dgm:styleLbl name="parChTrans2D3">
+    <dgm:fillClrLst meth="repeat">
+      <a:schemeClr val="accent4"/>
+    </dgm:fillClrLst>
+    <dgm:linClrLst meth="repeat">
+      <a:schemeClr val="lt1"/>
+    </dgm:linClrLst>
+    <dgm:effectClrLst/>
+    <dgm:txLinClrLst/>
+    <dgm:txFillClrLst/>
+    <dgm:txEffectClrLst/>
+  </dgm:styleLbl>
+  <dgm:styleLbl name="parChTrans2D4">
+    <dgm:fillClrLst meth="repeat">
+      <a:schemeClr val="accent5"/>
+    </dgm:fillClrLst>
+    <dgm:linClrLst meth="repeat">
+      <a:schemeClr val="lt1"/>
+    </dgm:linClrLst>
+    <dgm:effectClrLst/>
+    <dgm:txLinClrLst/>
+    <dgm:txFillClrLst meth="repeat">
+      <a:schemeClr val="lt1"/>
+    </dgm:txFillClrLst>
+    <dgm:txEffectClrLst/>
+  </dgm:styleLbl>
+  <dgm:styleLbl name="parChTrans1D1">
+    <dgm:fillClrLst meth="repeat">
+      <a:schemeClr val="accent2"/>
+    </dgm:fillClrLst>
+    <dgm:linClrLst meth="repeat">
+      <a:schemeClr val="accent2"/>
+    </dgm:linClrLst>
+    <dgm:effectClrLst/>
+    <dgm:txLinClrLst/>
+    <dgm:txFillClrLst meth="repeat">
+      <a:schemeClr val="tx1"/>
+    </dgm:txFillClrLst>
+    <dgm:txEffectClrLst/>
+  </dgm:styleLbl>
+  <dgm:styleLbl name="parChTrans1D2">
+    <dgm:fillClrLst meth="repeat">
+      <a:schemeClr val="accent2">
+        <a:tint val="90000"/>
+      </a:schemeClr>
+    </dgm:fillClrLst>
+    <dgm:linClrLst meth="repeat">
+      <a:schemeClr val="accent3"/>
+    </dgm:linClrLst>
+    <dgm:effectClrLst/>
+    <dgm:txLinClrLst/>
+    <dgm:txFillClrLst meth="repeat">
+      <a:schemeClr val="tx1"/>
+    </dgm:txFillClrLst>
+    <dgm:txEffectClrLst/>
+  </dgm:styleLbl>
+  <dgm:styleLbl name="parChTrans1D3">
+    <dgm:fillClrLst meth="repeat">
+      <a:schemeClr val="accent2">
+        <a:tint val="70000"/>
+      </a:schemeClr>
+    </dgm:fillClrLst>
+    <dgm:linClrLst meth="repeat">
+      <a:schemeClr val="accent4"/>
+    </dgm:linClrLst>
+    <dgm:effectClrLst/>
+    <dgm:txLinClrLst/>
+    <dgm:txFillClrLst meth="repeat">
+      <a:schemeClr val="tx1"/>
+    </dgm:txFillClrLst>
+    <dgm:txEffectClrLst/>
+  </dgm:styleLbl>
+  <dgm:styleLbl name="parChTrans1D4">
+    <dgm:fillClrLst meth="repeat">
+      <a:schemeClr val="accent2">
+        <a:tint val="50000"/>
+      </a:schemeClr>
+    </dgm:fillClrLst>
+    <dgm:linClrLst meth="repeat">
+      <a:schemeClr val="accent5"/>
+    </dgm:linClrLst>
+    <dgm:effectClrLst/>
+    <dgm:txLinClrLst/>
+    <dgm:txFillClrLst meth="repeat">
+      <a:schemeClr val="tx1"/>
+    </dgm:txFillClrLst>
+    <dgm:txEffectClrLst/>
+  </dgm:styleLbl>
+  <dgm:styleLbl name="fgAcc1">
+    <dgm:fillClrLst meth="repeat">
+      <a:schemeClr val="lt1">
+        <a:alpha val="90000"/>
+      </a:schemeClr>
+    </dgm:fillClrLst>
+    <dgm:linClrLst>
+      <a:schemeClr val="accent2"/>
+      <a:schemeClr val="accent3"/>
+    </dgm:linClrLst>
+    <dgm:effectClrLst/>
+    <dgm:txLinClrLst/>
+    <dgm:txFillClrLst meth="repeat">
+      <a:schemeClr val="dk1"/>
+    </dgm:txFillClrLst>
+    <dgm:txEffectClrLst/>
+  </dgm:styleLbl>
+  <dgm:styleLbl name="conFgAcc1">
+    <dgm:fillClrLst meth="repeat">
+      <a:schemeClr val="lt1">
+        <a:alpha val="90000"/>
+      </a:schemeClr>
+    </dgm:fillClrLst>
+    <dgm:linClrLst>
+      <a:schemeClr val="accent2"/>
+      <a:schemeClr val="accent3"/>
+    </dgm:linClrLst>
+    <dgm:effectClrLst/>
+    <dgm:txLinClrLst/>
+    <dgm:txFillClrLst meth="repeat">
+      <a:schemeClr val="dk1"/>
+    </dgm:txFillClrLst>
+    <dgm:txEffectClrLst/>
+  </dgm:styleLbl>
+  <dgm:styleLbl name="alignAcc1">
+    <dgm:fillClrLst meth="repeat">
+      <a:schemeClr val="lt1">
+        <a:alpha val="90000"/>
+      </a:schemeClr>
+    </dgm:fillClrLst>
+    <dgm:linClrLst>
+      <a:schemeClr val="accent2"/>
+      <a:schemeClr val="accent3"/>
+    </dgm:linClrLst>
+    <dgm:effectClrLst/>
+    <dgm:txLinClrLst/>
+    <dgm:txFillClrLst meth="repeat">
+      <a:schemeClr val="dk1"/>
+    </dgm:txFillClrLst>
+    <dgm:txEffectClrLst/>
+  </dgm:styleLbl>
+  <dgm:styleLbl name="trAlignAcc1">
+    <dgm:fillClrLst meth="repeat">
+      <a:schemeClr val="lt1">
+        <a:alpha val="40000"/>
+      </a:schemeClr>
+    </dgm:fillClrLst>
+    <dgm:linClrLst meth="repeat">
+      <a:schemeClr val="accent2"/>
+    </dgm:linClrLst>
+    <dgm:effectClrLst/>
+    <dgm:txLinClrLst/>
+    <dgm:txFillClrLst meth="repeat">
+      <a:schemeClr val="dk1"/>
+    </dgm:txFillClrLst>
+    <dgm:txEffectClrLst/>
+  </dgm:styleLbl>
+  <dgm:styleLbl name="bgAcc1">
+    <dgm:fillClrLst meth="repeat">
+      <a:schemeClr val="lt1">
+        <a:alpha val="90000"/>
+      </a:schemeClr>
+    </dgm:fillClrLst>
+    <dgm:linClrLst>
+      <a:schemeClr val="accent2"/>
+      <a:schemeClr val="accent3"/>
+    </dgm:linClrLst>
+    <dgm:effectClrLst/>
+    <dgm:txLinClrLst/>
+    <dgm:txFillClrLst meth="repeat">
+      <a:schemeClr val="dk1"/>
+    </dgm:txFillClrLst>
+    <dgm:txEffectClrLst/>
+  </dgm:styleLbl>
+  <dgm:styleLbl name="solidFgAcc1">
+    <dgm:fillClrLst meth="repeat">
+      <a:schemeClr val="lt1"/>
+    </dgm:fillClrLst>
+    <dgm:linClrLst>
+      <a:schemeClr val="accent2"/>
+      <a:schemeClr val="accent3"/>
+    </dgm:linClrLst>
+    <dgm:effectClrLst/>
+    <dgm:txLinClrLst/>
+    <dgm:txFillClrLst meth="repeat">
+      <a:schemeClr val="dk1"/>
+    </dgm:txFillClrLst>
+    <dgm:txEffectClrLst/>
+  </dgm:styleLbl>
+  <dgm:styleLbl name="solidAlignAcc1">
+    <dgm:fillClrLst meth="repeat">
+      <a:schemeClr val="lt1"/>
+    </dgm:fillClrLst>
+    <dgm:linClrLst>
+      <a:schemeClr val="accent2"/>
+      <a:schemeClr val="accent3"/>
+    </dgm:linClrLst>
+    <dgm:effectClrLst/>
+    <dgm:txLinClrLst/>
+    <dgm:txFillClrLst meth="repeat">
+      <a:schemeClr val="dk1"/>
+    </dgm:txFillClrLst>
+    <dgm:txEffectClrLst/>
+  </dgm:styleLbl>
+  <dgm:styleLbl name="solidBgAcc1">
+    <dgm:fillClrLst meth="repeat">
+      <a:schemeClr val="lt1"/>
+    </dgm:fillClrLst>
+    <dgm:linClrLst>
+      <a:schemeClr val="accent2"/>
+      <a:schemeClr val="accent3"/>
+    </dgm:linClrLst>
+    <dgm:effectClrLst/>
+    <dgm:txLinClrLst/>
+    <dgm:txFillClrLst meth="repeat">
+      <a:schemeClr val="dk1"/>
+    </dgm:txFillClrLst>
+    <dgm:txEffectClrLst/>
+  </dgm:styleLbl>
+  <dgm:styleLbl name="fgAccFollowNode1">
+    <dgm:fillClrLst>
+      <a:schemeClr val="accent2">
+        <a:tint val="40000"/>
+        <a:alpha val="90000"/>
+      </a:schemeClr>
+      <a:schemeClr val="accent3">
+        <a:tint val="40000"/>
+        <a:alpha val="90000"/>
+      </a:schemeClr>
+    </dgm:fillClrLst>
+    <dgm:linClrLst>
+      <a:schemeClr val="accent2">
+        <a:tint val="40000"/>
+        <a:alpha val="90000"/>
+      </a:schemeClr>
+      <a:schemeClr val="accent3">
+        <a:tint val="40000"/>
+        <a:alpha val="90000"/>
+      </a:schemeClr>
+    </dgm:linClrLst>
+    <dgm:effectClrLst/>
+    <dgm:txLinClrLst/>
+    <dgm:txFillClrLst meth="repeat">
+      <a:schemeClr val="dk1"/>
+    </dgm:txFillClrLst>
+    <dgm:txEffectClrLst/>
+  </dgm:styleLbl>
+  <dgm:styleLbl name="alignAccFollowNode1">
+    <dgm:fillClrLst>
+      <a:schemeClr val="accent2">
+        <a:tint val="40000"/>
+        <a:alpha val="90000"/>
+      </a:schemeClr>
+      <a:schemeClr val="accent3">
+        <a:tint val="40000"/>
+        <a:alpha val="90000"/>
+      </a:schemeClr>
+    </dgm:fillClrLst>
+    <dgm:linClrLst>
+      <a:schemeClr val="accent2">
+        <a:tint val="40000"/>
+        <a:alpha val="90000"/>
+      </a:schemeClr>
+      <a:schemeClr val="accent3">
+        <a:tint val="40000"/>
+        <a:alpha val="90000"/>
+      </a:schemeClr>
+    </dgm:linClrLst>
+    <dgm:effectClrLst/>
+    <dgm:txLinClrLst/>
+    <dgm:txFillClrLst meth="repeat">
+      <a:schemeClr val="dk1"/>
+    </dgm:txFillClrLst>
+    <dgm:txEffectClrLst/>
+  </dgm:styleLbl>
+  <dgm:styleLbl name="bgAccFollowNode1">
+    <dgm:fillClrLst>
+      <a:schemeClr val="accent2">
+        <a:tint val="40000"/>
+        <a:alpha val="90000"/>
+      </a:schemeClr>
+      <a:schemeClr val="accent3">
+        <a:tint val="40000"/>
+        <a:alpha val="90000"/>
+      </a:schemeClr>
+    </dgm:fillClrLst>
+    <dgm:linClrLst>
+      <a:schemeClr val="accent2">
+        <a:tint val="40000"/>
+        <a:alpha val="90000"/>
+      </a:schemeClr>
+      <a:schemeClr val="accent3">
+        <a:tint val="40000"/>
+        <a:alpha val="90000"/>
+      </a:schemeClr>
+    </dgm:linClrLst>
+    <dgm:effectClrLst/>
+    <dgm:txLinClrLst/>
+    <dgm:txFillClrLst meth="repeat">
+      <a:schemeClr val="dk1"/>
+    </dgm:txFillClrLst>
+    <dgm:txEffectClrLst/>
+  </dgm:styleLbl>
+  <dgm:styleLbl name="fgAcc0">
+    <dgm:fillClrLst meth="repeat">
+      <a:schemeClr val="lt1">
+        <a:alpha val="90000"/>
+      </a:schemeClr>
+    </dgm:fillClrLst>
+    <dgm:linClrLst>
+      <a:schemeClr val="accent1"/>
+    </dgm:linClrLst>
+    <dgm:effectClrLst/>
+    <dgm:txLinClrLst/>
+    <dgm:txFillClrLst meth="repeat">
+      <a:schemeClr val="dk1"/>
+    </dgm:txFillClrLst>
+    <dgm:txEffectClrLst/>
+  </dgm:styleLbl>
+  <dgm:styleLbl name="fgAcc2">
+    <dgm:fillClrLst meth="repeat">
+      <a:schemeClr val="lt1">
+        <a:alpha val="90000"/>
+      </a:schemeClr>
+    </dgm:fillClrLst>
+    <dgm:linClrLst>
+      <a:schemeClr val="accent3"/>
+    </dgm:linClrLst>
+    <dgm:effectClrLst/>
+    <dgm:txLinClrLst/>
+    <dgm:txFillClrLst meth="repeat">
+      <a:schemeClr val="dk1"/>
+    </dgm:txFillClrLst>
+    <dgm:txEffectClrLst/>
+  </dgm:styleLbl>
+  <dgm:styleLbl name="fgAcc3">
+    <dgm:fillClrLst meth="repeat">
+      <a:schemeClr val="lt1">
+        <a:alpha val="90000"/>
+      </a:schemeClr>
+    </dgm:fillClrLst>
+    <dgm:linClrLst>
+      <a:schemeClr val="accent4"/>
+    </dgm:linClrLst>
+    <dgm:effectClrLst/>
+    <dgm:txLinClrLst/>
+    <dgm:txFillClrLst meth="repeat">
+      <a:schemeClr val="dk1"/>
+    </dgm:txFillClrLst>
+    <dgm:txEffectClrLst/>
+  </dgm:styleLbl>
+  <dgm:styleLbl name="fgAcc4">
+    <dgm:fillClrLst meth="repeat">
+      <a:schemeClr val="lt1">
+        <a:alpha val="90000"/>
+      </a:schemeClr>
+    </dgm:fillClrLst>
+    <dgm:linClrLst>
+      <a:schemeClr val="accent5"/>
+    </dgm:linClrLst>
+    <dgm:effectClrLst/>
+    <dgm:txLinClrLst/>
+    <dgm:txFillClrLst meth="repeat">
+      <a:schemeClr val="dk1"/>
+    </dgm:txFillClrLst>
+    <dgm:txEffectClrLst/>
+  </dgm:styleLbl>
+  <dgm:styleLbl name="bgShp">
+    <dgm:fillClrLst meth="repeat">
+      <a:schemeClr val="accent2">
+        <a:tint val="40000"/>
+      </a:schemeClr>
+    </dgm:fillClrLst>
+    <dgm:linClrLst meth="repeat">
+      <a:schemeClr val="dk1"/>
+    </dgm:linClrLst>
+    <dgm:effectClrLst/>
+    <dgm:txLinClrLst/>
+    <dgm:txFillClrLst meth="repeat">
+      <a:schemeClr val="dk1"/>
+    </dgm:txFillClrLst>
+    <dgm:txEffectClrLst/>
+  </dgm:styleLbl>
+  <dgm:styleLbl name="dkBgShp">
+    <dgm:fillClrLst meth="repeat">
+      <a:schemeClr val="accent2">
+        <a:shade val="90000"/>
+      </a:schemeClr>
+    </dgm:fillClrLst>
+    <dgm:linClrLst meth="repeat">
+      <a:schemeClr val="dk1"/>
+    </dgm:linClrLst>
+    <dgm:effectClrLst/>
+    <dgm:txLinClrLst/>
+    <dgm:txFillClrLst meth="repeat">
+      <a:schemeClr val="lt1"/>
+    </dgm:txFillClrLst>
+    <dgm:txEffectClrLst/>
+  </dgm:styleLbl>
+  <dgm:styleLbl name="trBgShp">
+    <dgm:fillClrLst meth="repeat">
+      <a:schemeClr val="accent2">
+        <a:tint val="50000"/>
+        <a:alpha val="40000"/>
+      </a:schemeClr>
+    </dgm:fillClrLst>
+    <dgm:linClrLst meth="repeat">
+      <a:schemeClr val="accent2"/>
+    </dgm:linClrLst>
+    <dgm:effectClrLst/>
+    <dgm:txLinClrLst/>
+    <dgm:txFillClrLst meth="repeat">
+      <a:schemeClr val="lt1"/>
+    </dgm:txFillClrLst>
+    <dgm:txEffectClrLst/>
+  </dgm:styleLbl>
+  <dgm:styleLbl name="fgShp">
+    <dgm:fillClrLst meth="repeat">
+      <a:schemeClr val="accent2">
+        <a:tint val="40000"/>
+      </a:schemeClr>
+    </dgm:fillClrLst>
+    <dgm:linClrLst meth="repeat">
+      <a:schemeClr val="lt1"/>
+    </dgm:linClrLst>
+    <dgm:effectClrLst/>
+    <dgm:txLinClrLst/>
+    <dgm:txFillClrLst meth="repeat">
+      <a:schemeClr val="dk1"/>
+    </dgm:txFillClrLst>
+    <dgm:txEffectClrLst/>
+  </dgm:styleLbl>
+  <dgm:styleLbl name="revTx">
+    <dgm:fillClrLst meth="repeat">
+      <a:schemeClr val="lt1">
+        <a:alpha val="0"/>
+      </a:schemeClr>
+    </dgm:fillClrLst>
+    <dgm:linClrLst meth="repeat">
+      <a:schemeClr val="dk1">
+        <a:alpha val="0"/>
+      </a:schemeClr>
+    </dgm:linClrLst>
+    <dgm:effectClrLst/>
+    <dgm:txLinClrLst/>
+    <dgm:txFillClrLst meth="repeat">
+      <a:schemeClr val="tx1"/>
+    </dgm:txFillClrLst>
+    <dgm:txEffectClrLst/>
+  </dgm:styleLbl>
+</dgm:colorsDef>
+</file>
+
+<file path=ppt/diagrams/data1.xml><?xml version="1.0" encoding="utf-8"?>
+<dgm:dataModel xmlns:dgm="http://schemas.openxmlformats.org/drawingml/2006/diagram" xmlns:a="http://schemas.openxmlformats.org/drawingml/2006/main">
+  <dgm:ptLst>
+    <dgm:pt modelId="{0C05111F-CBCB-44FC-9B48-ED7DCEB3671C}" type="doc">
+      <dgm:prSet loTypeId="urn:microsoft.com/office/officeart/2016/7/layout/LinearBlockProcessNumbered" loCatId="process" qsTypeId="urn:microsoft.com/office/officeart/2005/8/quickstyle/simple4" qsCatId="simple" csTypeId="urn:microsoft.com/office/officeart/2005/8/colors/colorful2" csCatId="colorful"/>
+      <dgm:spPr/>
+      <dgm:t>
+        <a:bodyPr/>
+        <a:lstStyle/>
+        <a:p>
+          <a:endParaRPr lang="en-US"/>
+        </a:p>
+      </dgm:t>
+    </dgm:pt>
+    <dgm:pt modelId="{3526197E-29DE-406C-A27B-4176AAE9F8E7}">
+      <dgm:prSet/>
+      <dgm:spPr/>
+      <dgm:t>
+        <a:bodyPr/>
+        <a:lstStyle/>
+        <a:p>
+          <a:r>
+            <a:rPr lang="en-US"/>
+            <a:t>Learn the most efficient proof of inference system for a given model</a:t>
+          </a:r>
+        </a:p>
+      </dgm:t>
+    </dgm:pt>
+    <dgm:pt modelId="{6705CFD3-E2D4-41D5-8B11-4613F41C94E7}" type="parTrans" cxnId="{FDCD678D-ED72-4618-AC1E-700A23C408B0}">
+      <dgm:prSet/>
+      <dgm:spPr/>
+      <dgm:t>
+        <a:bodyPr/>
+        <a:lstStyle/>
+        <a:p>
+          <a:endParaRPr lang="en-US"/>
+        </a:p>
+      </dgm:t>
+    </dgm:pt>
+    <dgm:pt modelId="{7D7A25D6-C2E2-4F96-9345-BC587FE432BC}" type="sibTrans" cxnId="{FDCD678D-ED72-4618-AC1E-700A23C408B0}">
+      <dgm:prSet phldrT="01" phldr="0"/>
+      <dgm:spPr/>
+      <dgm:t>
+        <a:bodyPr/>
+        <a:lstStyle/>
+        <a:p>
+          <a:r>
+            <a:rPr lang="en-US"/>
+            <a:t>01</a:t>
+          </a:r>
+        </a:p>
+      </dgm:t>
+    </dgm:pt>
+    <dgm:pt modelId="{4075C76F-D686-4E8F-A51C-56FE43155ED0}">
+      <dgm:prSet/>
+      <dgm:spPr/>
+      <dgm:t>
+        <a:bodyPr/>
+        <a:lstStyle/>
+        <a:p>
+          <a:r>
+            <a:rPr lang="en-US"/>
+            <a:t>Prove the token generation of a small language model</a:t>
+          </a:r>
+        </a:p>
+      </dgm:t>
+    </dgm:pt>
+    <dgm:pt modelId="{6CA3AC1B-80ED-433E-826E-A8124CEA7EE4}" type="parTrans" cxnId="{BA3F72F5-5E84-4FE9-8366-7E622093901F}">
+      <dgm:prSet/>
+      <dgm:spPr/>
+      <dgm:t>
+        <a:bodyPr/>
+        <a:lstStyle/>
+        <a:p>
+          <a:endParaRPr lang="en-US"/>
+        </a:p>
+      </dgm:t>
+    </dgm:pt>
+    <dgm:pt modelId="{D578B20A-098E-4BE6-98D3-62D008197A48}" type="sibTrans" cxnId="{BA3F72F5-5E84-4FE9-8366-7E622093901F}">
+      <dgm:prSet phldrT="02" phldr="0"/>
+      <dgm:spPr/>
+      <dgm:t>
+        <a:bodyPr/>
+        <a:lstStyle/>
+        <a:p>
+          <a:r>
+            <a:rPr lang="en-US"/>
+            <a:t>02</a:t>
+          </a:r>
+        </a:p>
+      </dgm:t>
+    </dgm:pt>
+    <dgm:pt modelId="{D31AEB38-0521-468D-977F-63F836D8633C}">
+      <dgm:prSet/>
+      <dgm:spPr/>
+      <dgm:t>
+        <a:bodyPr/>
+        <a:lstStyle/>
+        <a:p>
+          <a:r>
+            <a:rPr lang="en-US"/>
+            <a:t>Build an LLM proving runtime usable in production</a:t>
+          </a:r>
+        </a:p>
+      </dgm:t>
+    </dgm:pt>
+    <dgm:pt modelId="{8A4FA8ED-DA9C-463B-9E0B-3949DF369ED1}" type="parTrans" cxnId="{0E018F44-B82D-4DB3-B936-1C80C055774F}">
+      <dgm:prSet/>
+      <dgm:spPr/>
+      <dgm:t>
+        <a:bodyPr/>
+        <a:lstStyle/>
+        <a:p>
+          <a:endParaRPr lang="en-US"/>
+        </a:p>
+      </dgm:t>
+    </dgm:pt>
+    <dgm:pt modelId="{0022C6DE-6066-4230-A136-D7C1E54FFF99}" type="sibTrans" cxnId="{0E018F44-B82D-4DB3-B936-1C80C055774F}">
+      <dgm:prSet phldrT="03" phldr="0"/>
+      <dgm:spPr/>
+      <dgm:t>
+        <a:bodyPr/>
+        <a:lstStyle/>
+        <a:p>
+          <a:r>
+            <a:rPr lang="en-US"/>
+            <a:t>03</a:t>
+          </a:r>
+        </a:p>
+      </dgm:t>
+    </dgm:pt>
+    <dgm:pt modelId="{CA7D4457-ADA5-2341-8F84-9713DBF39E4F}" type="pres">
+      <dgm:prSet presAssocID="{0C05111F-CBCB-44FC-9B48-ED7DCEB3671C}" presName="Name0" presStyleCnt="0">
+        <dgm:presLayoutVars>
+          <dgm:animLvl val="lvl"/>
+          <dgm:resizeHandles val="exact"/>
+        </dgm:presLayoutVars>
+      </dgm:prSet>
+      <dgm:spPr/>
+    </dgm:pt>
+    <dgm:pt modelId="{1F0BC10A-F8A3-C042-B023-EA7AAF4D7B18}" type="pres">
+      <dgm:prSet presAssocID="{3526197E-29DE-406C-A27B-4176AAE9F8E7}" presName="compositeNode" presStyleCnt="0">
+        <dgm:presLayoutVars>
+          <dgm:bulletEnabled val="1"/>
+        </dgm:presLayoutVars>
+      </dgm:prSet>
+      <dgm:spPr/>
+    </dgm:pt>
+    <dgm:pt modelId="{5B3C41C2-230D-5245-8BCB-B4C1F0901A63}" type="pres">
+      <dgm:prSet presAssocID="{3526197E-29DE-406C-A27B-4176AAE9F8E7}" presName="bgRect" presStyleLbl="alignNode1" presStyleIdx="0" presStyleCnt="3"/>
+      <dgm:spPr/>
+    </dgm:pt>
+    <dgm:pt modelId="{B44B8935-2AF4-F841-B6D0-30556DC0F405}" type="pres">
+      <dgm:prSet presAssocID="{7D7A25D6-C2E2-4F96-9345-BC587FE432BC}" presName="sibTransNodeRect" presStyleLbl="alignNode1" presStyleIdx="0" presStyleCnt="3">
+        <dgm:presLayoutVars>
+          <dgm:chMax val="0"/>
+          <dgm:bulletEnabled val="1"/>
+        </dgm:presLayoutVars>
+      </dgm:prSet>
+      <dgm:spPr/>
+    </dgm:pt>
+    <dgm:pt modelId="{650D777E-1D49-EB48-8918-336886F98481}" type="pres">
+      <dgm:prSet presAssocID="{3526197E-29DE-406C-A27B-4176AAE9F8E7}" presName="nodeRect" presStyleLbl="alignNode1" presStyleIdx="0" presStyleCnt="3">
+        <dgm:presLayoutVars>
+          <dgm:bulletEnabled val="1"/>
+        </dgm:presLayoutVars>
+      </dgm:prSet>
+      <dgm:spPr/>
+    </dgm:pt>
+    <dgm:pt modelId="{80EA16F3-A0F9-6E48-98D5-E9A95B8D29CD}" type="pres">
+      <dgm:prSet presAssocID="{7D7A25D6-C2E2-4F96-9345-BC587FE432BC}" presName="sibTrans" presStyleCnt="0"/>
+      <dgm:spPr/>
+    </dgm:pt>
+    <dgm:pt modelId="{3F087A25-3D0F-594C-8355-411CEB9AFDCE}" type="pres">
+      <dgm:prSet presAssocID="{4075C76F-D686-4E8F-A51C-56FE43155ED0}" presName="compositeNode" presStyleCnt="0">
+        <dgm:presLayoutVars>
+          <dgm:bulletEnabled val="1"/>
+        </dgm:presLayoutVars>
+      </dgm:prSet>
+      <dgm:spPr/>
+    </dgm:pt>
+    <dgm:pt modelId="{05F4E2C9-EEF0-3942-8AEB-09F8211F94B7}" type="pres">
+      <dgm:prSet presAssocID="{4075C76F-D686-4E8F-A51C-56FE43155ED0}" presName="bgRect" presStyleLbl="alignNode1" presStyleIdx="1" presStyleCnt="3"/>
+      <dgm:spPr/>
+    </dgm:pt>
+    <dgm:pt modelId="{1F2320CC-85F4-4F4B-BC8D-2B5FF360811E}" type="pres">
+      <dgm:prSet presAssocID="{D578B20A-098E-4BE6-98D3-62D008197A48}" presName="sibTransNodeRect" presStyleLbl="alignNode1" presStyleIdx="1" presStyleCnt="3">
+        <dgm:presLayoutVars>
+          <dgm:chMax val="0"/>
+          <dgm:bulletEnabled val="1"/>
+        </dgm:presLayoutVars>
+      </dgm:prSet>
+      <dgm:spPr/>
+    </dgm:pt>
+    <dgm:pt modelId="{AF8180D2-8167-2541-A303-E1E08151969C}" type="pres">
+      <dgm:prSet presAssocID="{4075C76F-D686-4E8F-A51C-56FE43155ED0}" presName="nodeRect" presStyleLbl="alignNode1" presStyleIdx="1" presStyleCnt="3">
+        <dgm:presLayoutVars>
+          <dgm:bulletEnabled val="1"/>
+        </dgm:presLayoutVars>
+      </dgm:prSet>
+      <dgm:spPr/>
+    </dgm:pt>
+    <dgm:pt modelId="{5D33D895-4199-8C48-86D9-3DA0634FCB66}" type="pres">
+      <dgm:prSet presAssocID="{D578B20A-098E-4BE6-98D3-62D008197A48}" presName="sibTrans" presStyleCnt="0"/>
+      <dgm:spPr/>
+    </dgm:pt>
+    <dgm:pt modelId="{96AFDF67-72A5-6946-A5B7-B3D925ABD805}" type="pres">
+      <dgm:prSet presAssocID="{D31AEB38-0521-468D-977F-63F836D8633C}" presName="compositeNode" presStyleCnt="0">
+        <dgm:presLayoutVars>
+          <dgm:bulletEnabled val="1"/>
+        </dgm:presLayoutVars>
+      </dgm:prSet>
+      <dgm:spPr/>
+    </dgm:pt>
+    <dgm:pt modelId="{270AD7A0-5A34-9949-AE1A-C94C3DBB7E06}" type="pres">
+      <dgm:prSet presAssocID="{D31AEB38-0521-468D-977F-63F836D8633C}" presName="bgRect" presStyleLbl="alignNode1" presStyleIdx="2" presStyleCnt="3"/>
+      <dgm:spPr/>
+    </dgm:pt>
+    <dgm:pt modelId="{4B74C98C-46C8-9943-95F0-C719CD4AC326}" type="pres">
+      <dgm:prSet presAssocID="{0022C6DE-6066-4230-A136-D7C1E54FFF99}" presName="sibTransNodeRect" presStyleLbl="alignNode1" presStyleIdx="2" presStyleCnt="3">
+        <dgm:presLayoutVars>
+          <dgm:chMax val="0"/>
+          <dgm:bulletEnabled val="1"/>
+        </dgm:presLayoutVars>
+      </dgm:prSet>
+      <dgm:spPr/>
+    </dgm:pt>
+    <dgm:pt modelId="{CAC4A9B4-A8E7-4142-A238-FA2FF5562F41}" type="pres">
+      <dgm:prSet presAssocID="{D31AEB38-0521-468D-977F-63F836D8633C}" presName="nodeRect" presStyleLbl="alignNode1" presStyleIdx="2" presStyleCnt="3">
+        <dgm:presLayoutVars>
+          <dgm:bulletEnabled val="1"/>
+        </dgm:presLayoutVars>
+      </dgm:prSet>
+      <dgm:spPr/>
+    </dgm:pt>
+  </dgm:ptLst>
+  <dgm:cxnLst>
+    <dgm:cxn modelId="{B928C717-619B-1E44-8AC0-5A0F47E122A2}" type="presOf" srcId="{0C05111F-CBCB-44FC-9B48-ED7DCEB3671C}" destId="{CA7D4457-ADA5-2341-8F84-9713DBF39E4F}" srcOrd="0" destOrd="0" presId="urn:microsoft.com/office/officeart/2016/7/layout/LinearBlockProcessNumbered"/>
+    <dgm:cxn modelId="{B2104318-1043-8A4D-B598-746A2D634A9A}" type="presOf" srcId="{0022C6DE-6066-4230-A136-D7C1E54FFF99}" destId="{4B74C98C-46C8-9943-95F0-C719CD4AC326}" srcOrd="0" destOrd="0" presId="urn:microsoft.com/office/officeart/2016/7/layout/LinearBlockProcessNumbered"/>
+    <dgm:cxn modelId="{D5E0FB1C-B8D2-224C-A157-E78F9DBDD4D3}" type="presOf" srcId="{D578B20A-098E-4BE6-98D3-62D008197A48}" destId="{1F2320CC-85F4-4F4B-BC8D-2B5FF360811E}" srcOrd="0" destOrd="0" presId="urn:microsoft.com/office/officeart/2016/7/layout/LinearBlockProcessNumbered"/>
+    <dgm:cxn modelId="{E4D43026-6AED-434B-90BE-CD8B5CA3C9C2}" type="presOf" srcId="{7D7A25D6-C2E2-4F96-9345-BC587FE432BC}" destId="{B44B8935-2AF4-F841-B6D0-30556DC0F405}" srcOrd="0" destOrd="0" presId="urn:microsoft.com/office/officeart/2016/7/layout/LinearBlockProcessNumbered"/>
+    <dgm:cxn modelId="{99660929-8D4B-FA4D-B66C-CABBD49B0893}" type="presOf" srcId="{3526197E-29DE-406C-A27B-4176AAE9F8E7}" destId="{5B3C41C2-230D-5245-8BCB-B4C1F0901A63}" srcOrd="0" destOrd="0" presId="urn:microsoft.com/office/officeart/2016/7/layout/LinearBlockProcessNumbered"/>
+    <dgm:cxn modelId="{0E018F44-B82D-4DB3-B936-1C80C055774F}" srcId="{0C05111F-CBCB-44FC-9B48-ED7DCEB3671C}" destId="{D31AEB38-0521-468D-977F-63F836D8633C}" srcOrd="2" destOrd="0" parTransId="{8A4FA8ED-DA9C-463B-9E0B-3949DF369ED1}" sibTransId="{0022C6DE-6066-4230-A136-D7C1E54FFF99}"/>
+    <dgm:cxn modelId="{2AC0C152-9678-EA42-9AC7-8BAD60850961}" type="presOf" srcId="{3526197E-29DE-406C-A27B-4176AAE9F8E7}" destId="{650D777E-1D49-EB48-8918-336886F98481}" srcOrd="1" destOrd="0" presId="urn:microsoft.com/office/officeart/2016/7/layout/LinearBlockProcessNumbered"/>
+    <dgm:cxn modelId="{7EE5BE67-1802-9646-B79E-CD776FFD2539}" type="presOf" srcId="{4075C76F-D686-4E8F-A51C-56FE43155ED0}" destId="{05F4E2C9-EEF0-3942-8AEB-09F8211F94B7}" srcOrd="0" destOrd="0" presId="urn:microsoft.com/office/officeart/2016/7/layout/LinearBlockProcessNumbered"/>
+    <dgm:cxn modelId="{52FDF378-0874-B943-B04E-0E2ADF88FCB5}" type="presOf" srcId="{4075C76F-D686-4E8F-A51C-56FE43155ED0}" destId="{AF8180D2-8167-2541-A303-E1E08151969C}" srcOrd="1" destOrd="0" presId="urn:microsoft.com/office/officeart/2016/7/layout/LinearBlockProcessNumbered"/>
+    <dgm:cxn modelId="{EDA5B08B-A10E-6B43-8E70-03050A8FBB5D}" type="presOf" srcId="{D31AEB38-0521-468D-977F-63F836D8633C}" destId="{270AD7A0-5A34-9949-AE1A-C94C3DBB7E06}" srcOrd="0" destOrd="0" presId="urn:microsoft.com/office/officeart/2016/7/layout/LinearBlockProcessNumbered"/>
+    <dgm:cxn modelId="{FDCD678D-ED72-4618-AC1E-700A23C408B0}" srcId="{0C05111F-CBCB-44FC-9B48-ED7DCEB3671C}" destId="{3526197E-29DE-406C-A27B-4176AAE9F8E7}" srcOrd="0" destOrd="0" parTransId="{6705CFD3-E2D4-41D5-8B11-4613F41C94E7}" sibTransId="{7D7A25D6-C2E2-4F96-9345-BC587FE432BC}"/>
+    <dgm:cxn modelId="{2557DFDB-0CFA-524D-8EC0-47884340CDBC}" type="presOf" srcId="{D31AEB38-0521-468D-977F-63F836D8633C}" destId="{CAC4A9B4-A8E7-4142-A238-FA2FF5562F41}" srcOrd="1" destOrd="0" presId="urn:microsoft.com/office/officeart/2016/7/layout/LinearBlockProcessNumbered"/>
+    <dgm:cxn modelId="{BA3F72F5-5E84-4FE9-8366-7E622093901F}" srcId="{0C05111F-CBCB-44FC-9B48-ED7DCEB3671C}" destId="{4075C76F-D686-4E8F-A51C-56FE43155ED0}" srcOrd="1" destOrd="0" parTransId="{6CA3AC1B-80ED-433E-826E-A8124CEA7EE4}" sibTransId="{D578B20A-098E-4BE6-98D3-62D008197A48}"/>
+    <dgm:cxn modelId="{D451786D-FAD8-EB43-8CD4-881DC22FC217}" type="presParOf" srcId="{CA7D4457-ADA5-2341-8F84-9713DBF39E4F}" destId="{1F0BC10A-F8A3-C042-B023-EA7AAF4D7B18}" srcOrd="0" destOrd="0" presId="urn:microsoft.com/office/officeart/2016/7/layout/LinearBlockProcessNumbered"/>
+    <dgm:cxn modelId="{7FE6EF18-B2E8-1540-BE94-5DAD7ABA32EE}" type="presParOf" srcId="{1F0BC10A-F8A3-C042-B023-EA7AAF4D7B18}" destId="{5B3C41C2-230D-5245-8BCB-B4C1F0901A63}" srcOrd="0" destOrd="0" presId="urn:microsoft.com/office/officeart/2016/7/layout/LinearBlockProcessNumbered"/>
+    <dgm:cxn modelId="{E8E76EB1-0901-FE44-9DDB-8D85A9F6B234}" type="presParOf" srcId="{1F0BC10A-F8A3-C042-B023-EA7AAF4D7B18}" destId="{B44B8935-2AF4-F841-B6D0-30556DC0F405}" srcOrd="1" destOrd="0" presId="urn:microsoft.com/office/officeart/2016/7/layout/LinearBlockProcessNumbered"/>
+    <dgm:cxn modelId="{5237F9DF-6724-9447-9045-E0C013BB8ED6}" type="presParOf" srcId="{1F0BC10A-F8A3-C042-B023-EA7AAF4D7B18}" destId="{650D777E-1D49-EB48-8918-336886F98481}" srcOrd="2" destOrd="0" presId="urn:microsoft.com/office/officeart/2016/7/layout/LinearBlockProcessNumbered"/>
+    <dgm:cxn modelId="{9401A8BA-1011-864D-9693-2FB6653FC1D5}" type="presParOf" srcId="{CA7D4457-ADA5-2341-8F84-9713DBF39E4F}" destId="{80EA16F3-A0F9-6E48-98D5-E9A95B8D29CD}" srcOrd="1" destOrd="0" presId="urn:microsoft.com/office/officeart/2016/7/layout/LinearBlockProcessNumbered"/>
+    <dgm:cxn modelId="{463ACF09-4FC1-D549-A44F-A4C2FC8BFD94}" type="presParOf" srcId="{CA7D4457-ADA5-2341-8F84-9713DBF39E4F}" destId="{3F087A25-3D0F-594C-8355-411CEB9AFDCE}" srcOrd="2" destOrd="0" presId="urn:microsoft.com/office/officeart/2016/7/layout/LinearBlockProcessNumbered"/>
+    <dgm:cxn modelId="{C86E8AD7-CB35-FD44-AA78-0283A24662D7}" type="presParOf" srcId="{3F087A25-3D0F-594C-8355-411CEB9AFDCE}" destId="{05F4E2C9-EEF0-3942-8AEB-09F8211F94B7}" srcOrd="0" destOrd="0" presId="urn:microsoft.com/office/officeart/2016/7/layout/LinearBlockProcessNumbered"/>
+    <dgm:cxn modelId="{37A7AA0D-78AF-8D48-8EB2-175A74CFA1AE}" type="presParOf" srcId="{3F087A25-3D0F-594C-8355-411CEB9AFDCE}" destId="{1F2320CC-85F4-4F4B-BC8D-2B5FF360811E}" srcOrd="1" destOrd="0" presId="urn:microsoft.com/office/officeart/2016/7/layout/LinearBlockProcessNumbered"/>
+    <dgm:cxn modelId="{9C73E558-1797-EC4D-A8BD-40C5B0F18F24}" type="presParOf" srcId="{3F087A25-3D0F-594C-8355-411CEB9AFDCE}" destId="{AF8180D2-8167-2541-A303-E1E08151969C}" srcOrd="2" destOrd="0" presId="urn:microsoft.com/office/officeart/2016/7/layout/LinearBlockProcessNumbered"/>
+    <dgm:cxn modelId="{FDE5FA4D-E359-864A-A307-6EF9637ABE34}" type="presParOf" srcId="{CA7D4457-ADA5-2341-8F84-9713DBF39E4F}" destId="{5D33D895-4199-8C48-86D9-3DA0634FCB66}" srcOrd="3" destOrd="0" presId="urn:microsoft.com/office/officeart/2016/7/layout/LinearBlockProcessNumbered"/>
+    <dgm:cxn modelId="{D2EB2548-D515-5342-A7BE-311AE08CEC55}" type="presParOf" srcId="{CA7D4457-ADA5-2341-8F84-9713DBF39E4F}" destId="{96AFDF67-72A5-6946-A5B7-B3D925ABD805}" srcOrd="4" destOrd="0" presId="urn:microsoft.com/office/officeart/2016/7/layout/LinearBlockProcessNumbered"/>
+    <dgm:cxn modelId="{6B7F8A6F-ACA0-0B4F-9026-3E5C1D398DAB}" type="presParOf" srcId="{96AFDF67-72A5-6946-A5B7-B3D925ABD805}" destId="{270AD7A0-5A34-9949-AE1A-C94C3DBB7E06}" srcOrd="0" destOrd="0" presId="urn:microsoft.com/office/officeart/2016/7/layout/LinearBlockProcessNumbered"/>
+    <dgm:cxn modelId="{51E10F11-D129-C340-860C-F3C82E2F6B23}" type="presParOf" srcId="{96AFDF67-72A5-6946-A5B7-B3D925ABD805}" destId="{4B74C98C-46C8-9943-95F0-C719CD4AC326}" srcOrd="1" destOrd="0" presId="urn:microsoft.com/office/officeart/2016/7/layout/LinearBlockProcessNumbered"/>
+    <dgm:cxn modelId="{D538FE3A-C6B0-884F-8631-527B198A1753}" type="presParOf" srcId="{96AFDF67-72A5-6946-A5B7-B3D925ABD805}" destId="{CAC4A9B4-A8E7-4142-A238-FA2FF5562F41}" srcOrd="2" destOrd="0" presId="urn:microsoft.com/office/officeart/2016/7/layout/LinearBlockProcessNumbered"/>
+  </dgm:cxnLst>
+  <dgm:bg/>
+  <dgm:whole/>
+  <dgm:extLst>
+    <a:ext uri="http://schemas.microsoft.com/office/drawing/2008/diagram">
+      <dsp:dataModelExt xmlns:dsp="http://schemas.microsoft.com/office/drawing/2008/diagram" relId="rId7" minVer="http://schemas.openxmlformats.org/drawingml/2006/diagram"/>
+    </a:ext>
+  </dgm:extLst>
+</dgm:dataModel>
+</file>
+
+<file path=ppt/diagrams/drawing1.xml><?xml version="1.0" encoding="utf-8"?>
+<dsp:drawing xmlns:dgm="http://schemas.openxmlformats.org/drawingml/2006/diagram" xmlns:dsp="http://schemas.microsoft.com/office/drawing/2008/diagram" xmlns:a="http://schemas.openxmlformats.org/drawingml/2006/main">
+  <dsp:spTree>
+    <dsp:nvGrpSpPr>
+      <dsp:cNvPr id="0" name=""/>
+      <dsp:cNvGrpSpPr/>
+    </dsp:nvGrpSpPr>
+    <dsp:grpSpPr/>
+    <dsp:sp modelId="{5B3C41C2-230D-5245-8BCB-B4C1F0901A63}">
+      <dsp:nvSpPr>
+        <dsp:cNvPr id="0" name=""/>
+        <dsp:cNvSpPr/>
+      </dsp:nvSpPr>
+      <dsp:spPr>
+        <a:xfrm>
+          <a:off x="773" y="0"/>
+          <a:ext cx="3134320" cy="3142721"/>
+        </a:xfrm>
+        <a:prstGeom prst="rect">
+          <a:avLst/>
+        </a:prstGeom>
+        <a:gradFill rotWithShape="0">
+          <a:gsLst>
+            <a:gs pos="0">
+              <a:schemeClr val="accent2">
+                <a:hueOff val="0"/>
+                <a:satOff val="0"/>
+                <a:lumOff val="0"/>
+                <a:alphaOff val="0"/>
+                <a:tint val="94000"/>
+                <a:satMod val="105000"/>
+                <a:lumMod val="102000"/>
+              </a:schemeClr>
+            </a:gs>
+            <a:gs pos="100000">
+              <a:schemeClr val="accent2">
+                <a:hueOff val="0"/>
+                <a:satOff val="0"/>
+                <a:lumOff val="0"/>
+                <a:alphaOff val="0"/>
+                <a:shade val="74000"/>
+                <a:satMod val="128000"/>
+                <a:lumMod val="100000"/>
+              </a:schemeClr>
+            </a:gs>
+          </a:gsLst>
+          <a:lin ang="5400000" scaled="0"/>
+        </a:gradFill>
+        <a:ln w="9525" cap="flat" cmpd="sng" algn="ctr">
+          <a:solidFill>
+            <a:schemeClr val="accent2">
+              <a:hueOff val="0"/>
+              <a:satOff val="0"/>
+              <a:lumOff val="0"/>
+              <a:alphaOff val="0"/>
+            </a:schemeClr>
+          </a:solidFill>
+          <a:prstDash val="solid"/>
+        </a:ln>
+        <a:effectLst/>
+      </dsp:spPr>
+      <dsp:style>
+        <a:lnRef idx="1">
+          <a:scrgbClr r="0" g="0" b="0"/>
+        </a:lnRef>
+        <a:fillRef idx="3">
+          <a:scrgbClr r="0" g="0" b="0"/>
+        </a:fillRef>
+        <a:effectRef idx="2">
+          <a:scrgbClr r="0" g="0" b="0"/>
+        </a:effectRef>
+        <a:fontRef idx="minor">
+          <a:schemeClr val="lt1"/>
+        </a:fontRef>
+      </dsp:style>
+      <dsp:txBody>
+        <a:bodyPr spcFirstLastPara="0" vert="horz" wrap="square" lIns="309601" tIns="0" rIns="309601" bIns="330200" numCol="1" spcCol="1270" anchor="t" anchorCtr="0">
+          <a:noAutofit/>
+        </a:bodyPr>
+        <a:lstStyle/>
+        <a:p>
+          <a:pPr marL="0" lvl="0" indent="0" algn="l" defTabSz="1155700">
+            <a:lnSpc>
+              <a:spcPct val="90000"/>
+            </a:lnSpc>
+            <a:spcBef>
+              <a:spcPct val="0"/>
+            </a:spcBef>
+            <a:spcAft>
+              <a:spcPct val="35000"/>
+            </a:spcAft>
+            <a:buNone/>
+          </a:pPr>
+          <a:r>
+            <a:rPr lang="en-US" sz="2600" kern="1200"/>
+            <a:t>Learn the most efficient proof of inference system for a given model</a:t>
+          </a:r>
+        </a:p>
+      </dsp:txBody>
+      <dsp:txXfrm>
+        <a:off x="773" y="1257088"/>
+        <a:ext cx="3134320" cy="1885632"/>
+      </dsp:txXfrm>
+    </dsp:sp>
+    <dsp:sp modelId="{B44B8935-2AF4-F841-B6D0-30556DC0F405}">
+      <dsp:nvSpPr>
+        <dsp:cNvPr id="0" name=""/>
+        <dsp:cNvSpPr/>
+      </dsp:nvSpPr>
+      <dsp:spPr>
+        <a:xfrm>
+          <a:off x="773" y="0"/>
+          <a:ext cx="3134320" cy="1257088"/>
+        </a:xfrm>
+        <a:prstGeom prst="rect">
+          <a:avLst/>
+        </a:prstGeom>
+        <a:noFill/>
+        <a:ln w="9525" cap="flat" cmpd="sng" algn="ctr">
+          <a:noFill/>
+          <a:prstDash val="solid"/>
+        </a:ln>
+        <a:effectLst/>
+        <a:sp3d/>
+      </dsp:spPr>
+      <dsp:style>
+        <a:lnRef idx="1">
+          <a:scrgbClr r="0" g="0" b="0"/>
+        </a:lnRef>
+        <a:fillRef idx="3">
+          <a:scrgbClr r="0" g="0" b="0"/>
+        </a:fillRef>
+        <a:effectRef idx="2">
+          <a:scrgbClr r="0" g="0" b="0"/>
+        </a:effectRef>
+        <a:fontRef idx="minor">
+          <a:schemeClr val="lt1"/>
+        </a:fontRef>
+      </dsp:style>
+      <dsp:txBody>
+        <a:bodyPr spcFirstLastPara="0" vert="horz" wrap="square" lIns="309601" tIns="165100" rIns="309601" bIns="165100" numCol="1" spcCol="1270" anchor="ctr" anchorCtr="0">
+          <a:noAutofit/>
+        </a:bodyPr>
+        <a:lstStyle/>
+        <a:p>
+          <a:pPr marL="0" lvl="0" indent="0" algn="l" defTabSz="2933700">
+            <a:lnSpc>
+              <a:spcPct val="90000"/>
+            </a:lnSpc>
+            <a:spcBef>
+              <a:spcPct val="0"/>
+            </a:spcBef>
+            <a:spcAft>
+              <a:spcPct val="35000"/>
+            </a:spcAft>
+            <a:buNone/>
+          </a:pPr>
+          <a:r>
+            <a:rPr lang="en-US" sz="6600" kern="1200"/>
+            <a:t>01</a:t>
+          </a:r>
+        </a:p>
+      </dsp:txBody>
+      <dsp:txXfrm>
+        <a:off x="773" y="0"/>
+        <a:ext cx="3134320" cy="1257088"/>
+      </dsp:txXfrm>
+    </dsp:sp>
+    <dsp:sp modelId="{05F4E2C9-EEF0-3942-8AEB-09F8211F94B7}">
+      <dsp:nvSpPr>
+        <dsp:cNvPr id="0" name=""/>
+        <dsp:cNvSpPr/>
+      </dsp:nvSpPr>
+      <dsp:spPr>
+        <a:xfrm>
+          <a:off x="3385839" y="0"/>
+          <a:ext cx="3134320" cy="3142721"/>
+        </a:xfrm>
+        <a:prstGeom prst="rect">
+          <a:avLst/>
+        </a:prstGeom>
+        <a:gradFill rotWithShape="0">
+          <a:gsLst>
+            <a:gs pos="0">
+              <a:schemeClr val="accent2">
+                <a:hueOff val="2394041"/>
+                <a:satOff val="-7276"/>
+                <a:lumOff val="-98"/>
+                <a:alphaOff val="0"/>
+                <a:tint val="94000"/>
+                <a:satMod val="105000"/>
+                <a:lumMod val="102000"/>
+              </a:schemeClr>
+            </a:gs>
+            <a:gs pos="100000">
+              <a:schemeClr val="accent2">
+                <a:hueOff val="2394041"/>
+                <a:satOff val="-7276"/>
+                <a:lumOff val="-98"/>
+                <a:alphaOff val="0"/>
+                <a:shade val="74000"/>
+                <a:satMod val="128000"/>
+                <a:lumMod val="100000"/>
+              </a:schemeClr>
+            </a:gs>
+          </a:gsLst>
+          <a:lin ang="5400000" scaled="0"/>
+        </a:gradFill>
+        <a:ln w="9525" cap="flat" cmpd="sng" algn="ctr">
+          <a:solidFill>
+            <a:schemeClr val="accent2">
+              <a:hueOff val="2394041"/>
+              <a:satOff val="-7276"/>
+              <a:lumOff val="-98"/>
+              <a:alphaOff val="0"/>
+            </a:schemeClr>
+          </a:solidFill>
+          <a:prstDash val="solid"/>
+        </a:ln>
+        <a:effectLst/>
+      </dsp:spPr>
+      <dsp:style>
+        <a:lnRef idx="1">
+          <a:scrgbClr r="0" g="0" b="0"/>
+        </a:lnRef>
+        <a:fillRef idx="3">
+          <a:scrgbClr r="0" g="0" b="0"/>
+        </a:fillRef>
+        <a:effectRef idx="2">
+          <a:scrgbClr r="0" g="0" b="0"/>
+        </a:effectRef>
+        <a:fontRef idx="minor">
+          <a:schemeClr val="lt1"/>
+        </a:fontRef>
+      </dsp:style>
+      <dsp:txBody>
+        <a:bodyPr spcFirstLastPara="0" vert="horz" wrap="square" lIns="309601" tIns="0" rIns="309601" bIns="330200" numCol="1" spcCol="1270" anchor="t" anchorCtr="0">
+          <a:noAutofit/>
+        </a:bodyPr>
+        <a:lstStyle/>
+        <a:p>
+          <a:pPr marL="0" lvl="0" indent="0" algn="l" defTabSz="1155700">
+            <a:lnSpc>
+              <a:spcPct val="90000"/>
+            </a:lnSpc>
+            <a:spcBef>
+              <a:spcPct val="0"/>
+            </a:spcBef>
+            <a:spcAft>
+              <a:spcPct val="35000"/>
+            </a:spcAft>
+            <a:buNone/>
+          </a:pPr>
+          <a:r>
+            <a:rPr lang="en-US" sz="2600" kern="1200"/>
+            <a:t>Prove the token generation of a small language model</a:t>
+          </a:r>
+        </a:p>
+      </dsp:txBody>
+      <dsp:txXfrm>
+        <a:off x="3385839" y="1257088"/>
+        <a:ext cx="3134320" cy="1885632"/>
+      </dsp:txXfrm>
+    </dsp:sp>
+    <dsp:sp modelId="{1F2320CC-85F4-4F4B-BC8D-2B5FF360811E}">
+      <dsp:nvSpPr>
+        <dsp:cNvPr id="0" name=""/>
+        <dsp:cNvSpPr/>
+      </dsp:nvSpPr>
+      <dsp:spPr>
+        <a:xfrm>
+          <a:off x="3385839" y="0"/>
+          <a:ext cx="3134320" cy="1257088"/>
+        </a:xfrm>
+        <a:prstGeom prst="rect">
+          <a:avLst/>
+        </a:prstGeom>
+        <a:noFill/>
+        <a:ln w="9525" cap="flat" cmpd="sng" algn="ctr">
+          <a:noFill/>
+          <a:prstDash val="solid"/>
+        </a:ln>
+        <a:effectLst/>
+        <a:sp3d/>
+      </dsp:spPr>
+      <dsp:style>
+        <a:lnRef idx="1">
+          <a:scrgbClr r="0" g="0" b="0"/>
+        </a:lnRef>
+        <a:fillRef idx="3">
+          <a:scrgbClr r="0" g="0" b="0"/>
+        </a:fillRef>
+        <a:effectRef idx="2">
+          <a:scrgbClr r="0" g="0" b="0"/>
+        </a:effectRef>
+        <a:fontRef idx="minor">
+          <a:schemeClr val="lt1"/>
+        </a:fontRef>
+      </dsp:style>
+      <dsp:txBody>
+        <a:bodyPr spcFirstLastPara="0" vert="horz" wrap="square" lIns="309601" tIns="165100" rIns="309601" bIns="165100" numCol="1" spcCol="1270" anchor="ctr" anchorCtr="0">
+          <a:noAutofit/>
+        </a:bodyPr>
+        <a:lstStyle/>
+        <a:p>
+          <a:pPr marL="0" lvl="0" indent="0" algn="l" defTabSz="2933700">
+            <a:lnSpc>
+              <a:spcPct val="90000"/>
+            </a:lnSpc>
+            <a:spcBef>
+              <a:spcPct val="0"/>
+            </a:spcBef>
+            <a:spcAft>
+              <a:spcPct val="35000"/>
+            </a:spcAft>
+            <a:buNone/>
+          </a:pPr>
+          <a:r>
+            <a:rPr lang="en-US" sz="6600" kern="1200"/>
+            <a:t>02</a:t>
+          </a:r>
+        </a:p>
+      </dsp:txBody>
+      <dsp:txXfrm>
+        <a:off x="3385839" y="0"/>
+        <a:ext cx="3134320" cy="1257088"/>
+      </dsp:txXfrm>
+    </dsp:sp>
+    <dsp:sp modelId="{270AD7A0-5A34-9949-AE1A-C94C3DBB7E06}">
+      <dsp:nvSpPr>
+        <dsp:cNvPr id="0" name=""/>
+        <dsp:cNvSpPr/>
+      </dsp:nvSpPr>
+      <dsp:spPr>
+        <a:xfrm>
+          <a:off x="6770905" y="0"/>
+          <a:ext cx="3134320" cy="3142721"/>
+        </a:xfrm>
+        <a:prstGeom prst="rect">
+          <a:avLst/>
+        </a:prstGeom>
+        <a:gradFill rotWithShape="0">
+          <a:gsLst>
+            <a:gs pos="0">
+              <a:schemeClr val="accent2">
+                <a:hueOff val="4788082"/>
+                <a:satOff val="-14551"/>
+                <a:lumOff val="-196"/>
+                <a:alphaOff val="0"/>
+                <a:tint val="94000"/>
+                <a:satMod val="105000"/>
+                <a:lumMod val="102000"/>
+              </a:schemeClr>
+            </a:gs>
+            <a:gs pos="100000">
+              <a:schemeClr val="accent2">
+                <a:hueOff val="4788082"/>
+                <a:satOff val="-14551"/>
+                <a:lumOff val="-196"/>
+                <a:alphaOff val="0"/>
+                <a:shade val="74000"/>
+                <a:satMod val="128000"/>
+                <a:lumMod val="100000"/>
+              </a:schemeClr>
+            </a:gs>
+          </a:gsLst>
+          <a:lin ang="5400000" scaled="0"/>
+        </a:gradFill>
+        <a:ln w="9525" cap="flat" cmpd="sng" algn="ctr">
+          <a:solidFill>
+            <a:schemeClr val="accent2">
+              <a:hueOff val="4788082"/>
+              <a:satOff val="-14551"/>
+              <a:lumOff val="-196"/>
+              <a:alphaOff val="0"/>
+            </a:schemeClr>
+          </a:solidFill>
+          <a:prstDash val="solid"/>
+        </a:ln>
+        <a:effectLst/>
+      </dsp:spPr>
+      <dsp:style>
+        <a:lnRef idx="1">
+          <a:scrgbClr r="0" g="0" b="0"/>
+        </a:lnRef>
+        <a:fillRef idx="3">
+          <a:scrgbClr r="0" g="0" b="0"/>
+        </a:fillRef>
+        <a:effectRef idx="2">
+          <a:scrgbClr r="0" g="0" b="0"/>
+        </a:effectRef>
+        <a:fontRef idx="minor">
+          <a:schemeClr val="lt1"/>
+        </a:fontRef>
+      </dsp:style>
+      <dsp:txBody>
+        <a:bodyPr spcFirstLastPara="0" vert="horz" wrap="square" lIns="309601" tIns="0" rIns="309601" bIns="330200" numCol="1" spcCol="1270" anchor="t" anchorCtr="0">
+          <a:noAutofit/>
+        </a:bodyPr>
+        <a:lstStyle/>
+        <a:p>
+          <a:pPr marL="0" lvl="0" indent="0" algn="l" defTabSz="1155700">
+            <a:lnSpc>
+              <a:spcPct val="90000"/>
+            </a:lnSpc>
+            <a:spcBef>
+              <a:spcPct val="0"/>
+            </a:spcBef>
+            <a:spcAft>
+              <a:spcPct val="35000"/>
+            </a:spcAft>
+            <a:buNone/>
+          </a:pPr>
+          <a:r>
+            <a:rPr lang="en-US" sz="2600" kern="1200"/>
+            <a:t>Build an LLM proving runtime usable in production</a:t>
+          </a:r>
+        </a:p>
+      </dsp:txBody>
+      <dsp:txXfrm>
+        <a:off x="6770905" y="1257088"/>
+        <a:ext cx="3134320" cy="1885632"/>
+      </dsp:txXfrm>
+    </dsp:sp>
+    <dsp:sp modelId="{4B74C98C-46C8-9943-95F0-C719CD4AC326}">
+      <dsp:nvSpPr>
+        <dsp:cNvPr id="0" name=""/>
+        <dsp:cNvSpPr/>
+      </dsp:nvSpPr>
+      <dsp:spPr>
+        <a:xfrm>
+          <a:off x="6770905" y="0"/>
+          <a:ext cx="3134320" cy="1257088"/>
+        </a:xfrm>
+        <a:prstGeom prst="rect">
+          <a:avLst/>
+        </a:prstGeom>
+        <a:noFill/>
+        <a:ln w="9525" cap="flat" cmpd="sng" algn="ctr">
+          <a:noFill/>
+          <a:prstDash val="solid"/>
+        </a:ln>
+        <a:effectLst/>
+        <a:sp3d/>
+      </dsp:spPr>
+      <dsp:style>
+        <a:lnRef idx="1">
+          <a:scrgbClr r="0" g="0" b="0"/>
+        </a:lnRef>
+        <a:fillRef idx="3">
+          <a:scrgbClr r="0" g="0" b="0"/>
+        </a:fillRef>
+        <a:effectRef idx="2">
+          <a:scrgbClr r="0" g="0" b="0"/>
+        </a:effectRef>
+        <a:fontRef idx="minor">
+          <a:schemeClr val="lt1"/>
+        </a:fontRef>
+      </dsp:style>
+      <dsp:txBody>
+        <a:bodyPr spcFirstLastPara="0" vert="horz" wrap="square" lIns="309601" tIns="165100" rIns="309601" bIns="165100" numCol="1" spcCol="1270" anchor="ctr" anchorCtr="0">
+          <a:noAutofit/>
+        </a:bodyPr>
+        <a:lstStyle/>
+        <a:p>
+          <a:pPr marL="0" lvl="0" indent="0" algn="l" defTabSz="2933700">
+            <a:lnSpc>
+              <a:spcPct val="90000"/>
+            </a:lnSpc>
+            <a:spcBef>
+              <a:spcPct val="0"/>
+            </a:spcBef>
+            <a:spcAft>
+              <a:spcPct val="35000"/>
+            </a:spcAft>
+            <a:buNone/>
+          </a:pPr>
+          <a:r>
+            <a:rPr lang="en-US" sz="6600" kern="1200"/>
+            <a:t>03</a:t>
+          </a:r>
+        </a:p>
+      </dsp:txBody>
+      <dsp:txXfrm>
+        <a:off x="6770905" y="0"/>
+        <a:ext cx="3134320" cy="1257088"/>
+      </dsp:txXfrm>
+    </dsp:sp>
+  </dsp:spTree>
+</dsp:drawing>
+</file>
+
+<file path=ppt/diagrams/layout1.xml><?xml version="1.0" encoding="utf-8"?>
+<dgm:layoutDef xmlns:dgm="http://schemas.openxmlformats.org/drawingml/2006/diagram" xmlns:a="http://schemas.openxmlformats.org/drawingml/2006/main" uniqueId="urn:microsoft.com/office/officeart/2016/7/layout/LinearBlockProcessNumbered">
+  <dgm:title val="Linear Block Process Numbered"/>
+  <dgm:desc val="Used to show a progression; a timeline; sequential steps in a task, process, or workflow; or to emphasize movement or direction. Automatic numbers have been introduced to show the steps of the process. Level 1 text and Level 2 text both appears in a rectangle."/>
+  <dgm:catLst>
+    <dgm:cat type="process" pri="500"/>
+  </dgm:catLst>
+  <dgm:sampData>
+    <dgm:dataModel>
+      <dgm:ptLst>
+        <dgm:pt modelId="0" type="doc"/>
+        <dgm:pt modelId="1">
+          <dgm:prSet phldr="1"/>
+        </dgm:pt>
+        <dgm:pt modelId="11">
+          <dgm:prSet phldr="1"/>
+        </dgm:pt>
+        <dgm:pt modelId="2">
+          <dgm:prSet phldr="1"/>
+        </dgm:pt>
+        <dgm:pt modelId="21">
+          <dgm:prSet phldr="1"/>
+        </dgm:pt>
+        <dgm:pt modelId="3">
+          <dgm:prSet phldr="1"/>
+        </dgm:pt>
+        <dgm:pt modelId="31">
+          <dgm:prSet phldr="1"/>
+        </dgm:pt>
+        <dgm:pt modelId="101" type="sibTrans" cxnId="4">
+          <dgm:prSet phldrT="1"/>
+          <dgm:t>
+            <a:bodyPr/>
+            <a:lstStyle/>
+            <a:p>
+              <a:r>
+                <a:t>01</a:t>
+              </a:r>
+            </a:p>
+          </dgm:t>
+        </dgm:pt>
+        <dgm:pt modelId="201" type="sibTrans" cxnId="5">
+          <dgm:prSet phldrT="2"/>
+          <dgm:t>
+            <a:bodyPr/>
+            <a:lstStyle/>
+            <a:p>
+              <a:r>
+                <a:t>02</a:t>
+              </a:r>
+            </a:p>
+          </dgm:t>
+        </dgm:pt>
+        <dgm:pt modelId="301" type="sibTrans" cxnId="6">
+          <dgm:prSet phldrT="3"/>
+          <dgm:t>
+            <a:bodyPr/>
+            <a:lstStyle/>
+            <a:p>
+              <a:r>
+                <a:t>03</a:t>
+              </a:r>
+            </a:p>
+          </dgm:t>
+        </dgm:pt>
+      </dgm:ptLst>
+      <dgm:cxnLst>
+        <dgm:cxn modelId="4" srcId="0" destId="1" srcOrd="0" destOrd="0" sibTransId="101"/>
+        <dgm:cxn modelId="5" srcId="0" destId="2" srcOrd="1" destOrd="0" sibTransId="201"/>
+        <dgm:cxn modelId="6" srcId="0" destId="3" srcOrd="2" destOrd="0" sibTransId="301"/>
+        <dgm:cxn modelId="13" srcId="1" destId="11" srcOrd="0" destOrd="0"/>
+        <dgm:cxn modelId="23" srcId="2" destId="21" srcOrd="0" destOrd="0"/>
+        <dgm:cxn modelId="33" srcId="3" destId="31" srcOrd="0" destOrd="0"/>
+      </dgm:cxnLst>
+      <dgm:bg/>
+      <dgm:whole/>
+    </dgm:dataModel>
+  </dgm:sampData>
+  <dgm:styleData>
+    <dgm:dataModel>
+      <dgm:ptLst>
+        <dgm:pt modelId="0" type="doc"/>
+        <dgm:pt modelId="1"/>
+        <dgm:pt modelId="11"/>
+        <dgm:pt modelId="2"/>
+        <dgm:pt modelId="21"/>
+      </dgm:ptLst>
+      <dgm:cxnLst>
+        <dgm:cxn modelId="4" srcId="0" destId="1" srcOrd="0" destOrd="0"/>
+        <dgm:cxn modelId="5" srcId="0" destId="2" srcOrd="1" destOrd="0"/>
+        <dgm:cxn modelId="13" srcId="1" destId="11" srcOrd="0" destOrd="0"/>
+        <dgm:cxn modelId="23" srcId="2" destId="21" srcOrd="0" destOrd="0"/>
+      </dgm:cxnLst>
+      <dgm:bg/>
+      <dgm:whole/>
+    </dgm:dataModel>
+  </dgm:styleData>
+  <dgm:clrData>
+    <dgm:dataModel>
+      <dgm:ptLst>
+        <dgm:pt modelId="0" type="doc"/>
+        <dgm:pt modelId="1"/>
+        <dgm:pt modelId="11"/>
+        <dgm:pt modelId="2"/>
+        <dgm:pt modelId="21"/>
+        <dgm:pt modelId="3"/>
+        <dgm:pt modelId="31"/>
+        <dgm:pt modelId="4"/>
+        <dgm:pt modelId="41"/>
+      </dgm:ptLst>
+      <dgm:cxnLst>
+        <dgm:cxn modelId="5" srcId="0" destId="1" srcOrd="0" destOrd="0"/>
+        <dgm:cxn modelId="6" srcId="0" destId="2" srcOrd="1" destOrd="0"/>
+        <dgm:cxn modelId="7" srcId="0" destId="3" srcOrd="2" destOrd="0"/>
+        <dgm:cxn modelId="8" srcId="0" destId="4" srcOrd="3" destOrd="0"/>
+        <dgm:cxn modelId="13" srcId="1" destId="11" srcOrd="0" destOrd="0"/>
+        <dgm:cxn modelId="23" srcId="2" destId="21" srcOrd="0" destOrd="0"/>
+        <dgm:cxn modelId="33" srcId="3" destId="31" srcOrd="0" destOrd="0"/>
+        <dgm:cxn modelId="43" srcId="4" destId="41" srcOrd="0" destOrd="0"/>
+      </dgm:cxnLst>
+      <dgm:bg/>
+      <dgm:whole/>
+    </dgm:dataModel>
+  </dgm:clrData>
+  <dgm:layoutNode name="Name0">
+    <dgm:varLst>
+      <dgm:animLvl val="lvl"/>
+      <dgm:resizeHandles val="exact"/>
+    </dgm:varLst>
+    <dgm:alg type="lin">
+      <dgm:param type="linDir" val="fromL"/>
+      <dgm:param type="nodeVertAlign" val="t"/>
+    </dgm:alg>
+    <dgm:shape xmlns:r="http://schemas.openxmlformats.org/officeDocument/2006/relationships" r:blip="">
+      <dgm:adjLst/>
+    </dgm:shape>
+    <dgm:presOf/>
+    <dgm:constrLst>
+      <dgm:constr type="h" for="ch" forName="compositeNode" refType="h"/>
+      <dgm:constr type="w" for="ch" forName="compositeNode" refType="w"/>
+      <dgm:constr type="w" for="des" forName="simulatedConn" refType="w" refFor="ch" refForName="compositeNode" fact="0.15"/>
+      <dgm:constr type="h" for="des" forName="simulatedConn" refType="w" refFor="des" refForName="simulatedConn"/>
+      <dgm:constr type="h" for="des" forName="vSp1" refType="w" refFor="ch" refForName="compositeNode" fact="0.8"/>
+      <dgm:constr type="h" for="des" forName="vSp2" refType="w" refFor="ch" refForName="compositeNode" fact="0.07"/>
+      <dgm:constr type="w" for="ch" forName="vProcSp" refType="w" refFor="des" refForName="simulatedConn" op="equ"/>
+      <dgm:constr type="h" for="ch" forName="vProcSp" refType="h" refFor="ch" refForName="compositeNode" op="equ"/>
+      <dgm:constr type="w" for="ch" forName="sibTrans" refType="w" refFor="ch" refForName="compositeNode" fact="0.08"/>
+      <dgm:constr type="primFontSz" for="des" forName="sibTransNodeRect" op="equ"/>
+      <dgm:constr type="primFontSz" for="des" forName="nodeRect" op="equ"/>
+    </dgm:constrLst>
+    <dgm:ruleLst/>
+    <dgm:forEach name="Name4" axis="ch" ptType="node">
+      <dgm:layoutNode name="compositeNode">
+        <dgm:varLst>
+          <dgm:bulletEnabled val="1"/>
+        </dgm:varLst>
+        <dgm:alg type="composite"/>
+        <dgm:constrLst>
+          <dgm:constr type="h" refType="w" op="lte" fact="1.2"/>
+          <dgm:constr type="w" for="ch" forName="bgRect" refType="w"/>
+          <dgm:constr type="h" for="ch" forName="bgRect" refType="h"/>
+          <dgm:constr type="t" for="ch" forName="bgRect"/>
+          <dgm:constr type="l" for="ch" forName="bgRect"/>
+          <dgm:constr type="w" for="ch" forName="sibTransNodeRect" refType="w" refFor="ch" refForName="bgRect"/>
+          <dgm:constr type="h" for="ch" forName="sibTransNodeRect" refType="h" refFor="ch" refForName="bgRect" fact="0.4"/>
+          <dgm:constr type="t" for="ch" forName="sibTransNodeRect"/>
+          <dgm:constr type="l" for="ch" forName="sibTransNodeRect"/>
+          <dgm:constr type="r" for="ch" forName="nodeRect" refType="r" refFor="ch" refForName="bgRect"/>
+          <dgm:constr type="h" for="ch" forName="nodeRect" refType="h" refFor="ch" refForName="bgRect" fact="0.6"/>
+          <dgm:constr type="t" for="ch" forName="nodeRect" refType="b" refFor="ch" refForName="sibTransNodeRect"/>
+          <dgm:constr type="l" for="ch" forName="nodeRect" refType="l" refFor="ch" refForName="bgRect"/>
+        </dgm:constrLst>
+        <dgm:ruleLst>
+          <dgm:rule type="w" for="ch" forName="nodeRect" val="NaN" fact="NaN" max="30"/>
+        </dgm:ruleLst>
+        <dgm:layoutNode name="bgRect" styleLbl="alignNode1">
+          <dgm:alg type="sp"/>
+          <dgm:shape xmlns:r="http://schemas.openxmlformats.org/officeDocument/2006/relationships" type="rect" r:blip="">
+            <dgm:adjLst>
+              <dgm:adj idx="1" val="0.05"/>
+            </dgm:adjLst>
+          </dgm:shape>
+          <dgm:presOf axis="self"/>
+          <dgm:constrLst/>
+          <dgm:ruleLst/>
+        </dgm:layoutNode>
+        <dgm:forEach name="Name19" axis="followSib" ptType="sibTrans" hideLastTrans="0" cnt="1">
+          <dgm:layoutNode name="sibTransNodeRect" styleLbl="alignNode1">
+            <dgm:varLst>
+              <dgm:chMax val="0"/>
+              <dgm:bulletEnabled val="1"/>
+            </dgm:varLst>
+            <dgm:presOf axis="self"/>
+            <dgm:alg type="tx">
+              <dgm:param type="parTxLTRAlign" val="l"/>
+              <dgm:param type="parTxRTLAlign" val="l"/>
+            </dgm:alg>
+            <dgm:shape xmlns:r="http://schemas.openxmlformats.org/officeDocument/2006/relationships" type="rect" r:blip="" hideGeom="1">
+              <dgm:adjLst/>
+            </dgm:shape>
+            <dgm:constrLst>
+              <dgm:constr type="primFontSz" val="66"/>
+              <dgm:constr type="tMarg" val="13"/>
+              <dgm:constr type="lMarg" refType="w" fact="0.28"/>
+              <dgm:constr type="rMarg" refType="w" fact="0.28"/>
+              <dgm:constr type="bMarg" val="13"/>
+            </dgm:constrLst>
+            <dgm:ruleLst>
+              <dgm:rule type="primFontSz" val="14" fact="NaN" max="NaN"/>
+              <dgm:rule type="tMarg" val="13" fact="NaN" max="NaN"/>
+            </dgm:ruleLst>
+          </dgm:layoutNode>
+        </dgm:forEach>
+        <dgm:layoutNode name="nodeRect" styleLbl="alignNode1" moveWith="bgRect">
+          <dgm:varLst>
+            <dgm:bulletEnabled val="1"/>
+          </dgm:varLst>
+          <dgm:alg type="tx">
+            <dgm:param type="parTxLTRAlign" val="l"/>
+            <dgm:param type="parTxRTLAlign" val="r"/>
+            <dgm:param type="txAnchorVert" val="t"/>
+            <dgm:param type="stBulletLvl" val="2"/>
+          </dgm:alg>
+          <dgm:shape xmlns:r="http://schemas.openxmlformats.org/officeDocument/2006/relationships" type="rect" r:blip="" hideGeom="1">
+            <dgm:adjLst/>
+          </dgm:shape>
+          <dgm:presOf axis="desOrSelf" ptType="node"/>
+          <dgm:constrLst>
+            <dgm:constr type="primFontSz" val="26"/>
+            <dgm:constr type="tMarg"/>
+            <dgm:constr type="lMarg" refType="w" fact="0.28"/>
+            <dgm:constr type="rMarg" refType="w" fact="0.28"/>
+            <dgm:constr type="bMarg" val="26"/>
+          </dgm:constrLst>
+          <dgm:ruleLst>
+            <dgm:rule type="primFontSz" val="11" fact="NaN" max="NaN"/>
+          </dgm:ruleLst>
+        </dgm:layoutNode>
+      </dgm:layoutNode>
+      <dgm:forEach name="Name14" axis="followSib" ptType="sibTrans" cnt="1">
+        <dgm:layoutNode name="sibTrans">
+          <dgm:alg type="sp"/>
+          <dgm:shape xmlns:r="http://schemas.openxmlformats.org/officeDocument/2006/relationships" r:blip="">
+            <dgm:adjLst/>
+          </dgm:shape>
+          <dgm:presOf/>
+          <dgm:constrLst/>
+          <dgm:ruleLst/>
+        </dgm:layoutNode>
+      </dgm:forEach>
+    </dgm:forEach>
+  </dgm:layoutNode>
+  <dgm:extLst>
+    <a:ext uri="{4F341089-5ED1-44EC-B178-C955D00A3D55}">
+      <dgm1611:autoBuNodeInfoLst xmlns:dgm1611="http://schemas.microsoft.com/office/drawing/2016/11/diagram">
+        <dgm1611:autoBuNodeInfo lvl="1" ptType="sibTrans">
+          <dgm1611:buPr prefix="" leadZeros="1">
+            <a:buAutoNum type="arabicParenBoth"/>
+          </dgm1611:buPr>
+        </dgm1611:autoBuNodeInfo>
+      </dgm1611:autoBuNodeInfoLst>
+    </a:ext>
+  </dgm:extLst>
+</dgm:layoutDef>
+</file>
+
+<file path=ppt/diagrams/quickStyle1.xml><?xml version="1.0" encoding="utf-8"?>
+<dgm:styleDef xmlns:dgm="http://schemas.openxmlformats.org/drawingml/2006/diagram" xmlns:a="http://schemas.openxmlformats.org/drawingml/2006/main" uniqueId="urn:microsoft.com/office/officeart/2005/8/quickstyle/simple4">
+  <dgm:title val=""/>
+  <dgm:desc val=""/>
+  <dgm:catLst>
+    <dgm:cat type="simple" pri="10400"/>
+  </dgm:catLst>
+  <dgm:scene3d>
+    <a:camera prst="orthographicFront"/>
+    <a:lightRig rig="threePt" dir="t"/>
+  </dgm:scene3d>
+  <dgm:styleLbl name="node0">
+    <dgm:scene3d>
+      <a:camera prst="orthographicFront"/>
+      <a:lightRig rig="threePt" dir="t"/>
+    </dgm:scene3d>
+    <dgm:sp3d/>
+    <dgm:txPr/>
+    <dgm:style>
+      <a:lnRef idx="0">
+        <a:scrgbClr r="0" g="0" b="0"/>
+      </a:lnRef>
+      <a:fillRef idx="3">
+        <a:scrgbClr r="0" g="0" b="0"/>
+      </a:fillRef>
+      <a:effectRef idx="2">
+        <a:scrgbClr r="0" g="0" b="0"/>
+      </a:effectRef>
+      <a:fontRef idx="minor">
+        <a:schemeClr val="lt1"/>
+      </a:fontRef>
+    </dgm:style>
+  </dgm:styleLbl>
+  <dgm:styleLbl name="lnNode1">
+    <dgm:scene3d>
+      <a:camera prst="orthographicFront"/>
+      <a:lightRig rig="threePt" dir="t"/>
+    </dgm:scene3d>
+    <dgm:sp3d/>
+    <dgm:txPr/>
+    <dgm:style>
+      <a:lnRef idx="1">
+        <a:scrgbClr r="0" g="0" b="0"/>
+      </a:lnRef>
+      <a:fillRef idx="3">
+        <a:scrgbClr r="0" g="0" b="0"/>
+      </a:fillRef>
+      <a:effectRef idx="2">
+        <a:scrgbClr r="0" g="0" b="0"/>
+      </a:effectRef>
+      <a:fontRef idx="minor">
+        <a:schemeClr val="lt1"/>
+      </a:fontRef>
+    </dgm:style>
+  </dgm:styleLbl>
+  <dgm:styleLbl name="vennNode1">
+    <dgm:scene3d>
+      <a:camera prst="orthographicFront"/>
+      <a:lightRig rig="threePt" dir="t"/>
+    </dgm:scene3d>
+    <dgm:sp3d/>
+    <dgm:txPr/>
+    <dgm:style>
+      <a:lnRef idx="0">
+        <a:scrgbClr r="0" g="0" b="0"/>
+      </a:lnRef>
+      <a:fillRef idx="3">
+        <a:scrgbClr r="0" g="0" b="0"/>
+      </a:fillRef>
+      <a:effectRef idx="0">
+        <a:scrgbClr r="0" g="0" b="0"/>
+      </a:effectRef>
+      <a:fontRef idx="minor">
+        <a:schemeClr val="tx1"/>
+      </a:fontRef>
+    </dgm:style>
+  </dgm:styleLbl>
+  <dgm:styleLbl name="alignNode1">
+    <dgm:scene3d>
+      <a:camera prst="orthographicFront"/>
+      <a:lightRig rig="threePt" dir="t"/>
+    </dgm:scene3d>
+    <dgm:sp3d/>
+    <dgm:txPr/>
+    <dgm:style>
+      <a:lnRef idx="1">
+        <a:scrgbClr r="0" g="0" b="0"/>
+      </a:lnRef>
+      <a:fillRef idx="3">
+        <a:scrgbClr r="0" g="0" b="0"/>
+      </a:fillRef>
+      <a:effectRef idx="2">
+        <a:scrgbClr r="0" g="0" b="0"/>
+      </a:effectRef>
+      <a:fontRef idx="minor">
+        <a:schemeClr val="lt1"/>
+      </a:fontRef>
+    </dgm:style>
+  </dgm:styleLbl>
+  <dgm:styleLbl name="node1">
+    <dgm:scene3d>
+      <a:camera prst="orthographicFront"/>
+      <a:lightRig rig="threePt" dir="t"/>
+    </dgm:scene3d>
+    <dgm:sp3d/>
+    <dgm:txPr/>
+    <dgm:style>
+      <a:lnRef idx="0">
+        <a:scrgbClr r="0" g="0" b="0"/>
+      </a:lnRef>
+      <a:fillRef idx="3">
+        <a:scrgbClr r="0" g="0" b="0"/>
+      </a:fillRef>
+      <a:effectRef idx="2">
+        <a:scrgbClr r="0" g="0" b="0"/>
+      </a:effectRef>
+      <a:fontRef idx="minor">
+        <a:schemeClr val="lt1"/>
+      </a:fontRef>
+    </dgm:style>
+  </dgm:styleLbl>
+  <dgm:styleLbl name="node2">
+    <dgm:scene3d>
+      <a:camera prst="orthographicFront"/>
+      <a:lightRig rig="threePt" dir="t"/>
+    </dgm:scene3d>
+    <dgm:sp3d/>
+    <dgm:txPr/>
+    <dgm:style>
+      <a:lnRef idx="0">
+        <a:scrgbClr r="0" g="0" b="0"/>
+      </a:lnRef>
+      <a:fillRef idx="3">
+        <a:scrgbClr r="0" g="0" b="0"/>
+      </a:fillRef>
+      <a:effectRef idx="2">
+        <a:scrgbClr r="0" g="0" b="0"/>
+      </a:effectRef>
+      <a:fontRef idx="minor">
+        <a:schemeClr val="lt1"/>
+      </a:fontRef>
+    </dgm:style>
+  </dgm:styleLbl>
+  <dgm:styleLbl name="node3">
+    <dgm:scene3d>
+      <a:camera prst="orthographicFront"/>
+      <a:lightRig rig="threePt" dir="t"/>
+    </dgm:scene3d>
+    <dgm:sp3d/>
+    <dgm:txPr/>
+    <dgm:style>
+      <a:lnRef idx="0">
+        <a:scrgbClr r="0" g="0" b="0"/>
+      </a:lnRef>
+      <a:fillRef idx="3">
+        <a:scrgbClr r="0" g="0" b="0"/>
+      </a:fillRef>
+      <a:effectRef idx="2">
+        <a:scrgbClr r="0" g="0" b="0"/>
+      </a:effectRef>
+      <a:fontRef idx="minor">
+        <a:schemeClr val="lt1"/>
+      </a:fontRef>
+    </dgm:style>
+  </dgm:styleLbl>
+  <dgm:styleLbl name="node4">
+    <dgm:scene3d>
+      <a:camera prst="orthographicFront"/>
+      <a:lightRig rig="threePt" dir="t"/>
+    </dgm:scene3d>
+    <dgm:sp3d/>
+    <dgm:txPr/>
+    <dgm:style>
+      <a:lnRef idx="0">
+        <a:scrgbClr r="0" g="0" b="0"/>
+      </a:lnRef>
+      <a:fillRef idx="3">
+        <a:scrgbClr r="0" g="0" b="0"/>
+      </a:fillRef>
+      <a:effectRef idx="2">
+        <a:scrgbClr r="0" g="0" b="0"/>
+      </a:effectRef>
+      <a:fontRef idx="minor">
+        <a:schemeClr val="lt1"/>
+      </a:fontRef>
+    </dgm:style>
+  </dgm:styleLbl>
+  <dgm:styleLbl name="fgImgPlace1">
+    <dgm:scene3d>
+      <a:camera prst="orthographicFront"/>
+      <a:lightRig rig="threePt" dir="t"/>
+    </dgm:scene3d>
+    <dgm:sp3d/>
+    <dgm:txPr/>
+    <dgm:style>
+      <a:lnRef idx="0">
+        <a:scrgbClr r="0" g="0" b="0"/>
+      </a:lnRef>
+      <a:fillRef idx="1">
+        <a:scrgbClr r="0" g="0" b="0"/>
+      </a:fillRef>
+      <a:effectRef idx="2">
+        <a:scrgbClr r="0" g="0" b="0"/>
+      </a:effectRef>
+      <a:fontRef idx="minor"/>
+    </dgm:style>
+  </dgm:styleLbl>
+  <dgm:styleLbl name="alignImgPlace1">
+    <dgm:scene3d>
+      <a:camera prst="orthographicFront"/>
+      <a:lightRig rig="threePt" dir="t"/>
+    </dgm:scene3d>
+    <dgm:sp3d/>
+    <dgm:txPr/>
+    <dgm:style>
+      <a:lnRef idx="0">
+        <a:scrgbClr r="0" g="0" b="0"/>
+      </a:lnRef>
+      <a:fillRef idx="1">
+        <a:scrgbClr r="0" g="0" b="0"/>
+      </a:fillRef>
+      <a:effectRef idx="2">
+        <a:scrgbClr r="0" g="0" b="0"/>
+      </a:effectRef>
+      <a:fontRef idx="minor"/>
+    </dgm:style>
+  </dgm:styleLbl>
+  <dgm:styleLbl name="bgImgPlace1">
+    <dgm:scene3d>
+      <a:camera prst="orthographicFront"/>
+      <a:lightRig rig="threePt" dir="t"/>
+    </dgm:scene3d>
+    <dgm:sp3d/>
+    <dgm:txPr/>
+    <dgm:style>
+      <a:lnRef idx="0">
+        <a:scrgbClr r="0" g="0" b="0"/>
+      </a:lnRef>
+      <a:fillRef idx="1">
+        <a:scrgbClr r="0" g="0" b="0"/>
+      </a:fillRef>
+      <a:effectRef idx="2">
+        <a:scrgbClr r="0" g="0" b="0"/>
+      </a:effectRef>
+      <a:fontRef idx="minor"/>
+    </dgm:style>
+  </dgm:styleLbl>
+  <dgm:styleLbl name="sibTrans2D1">
+    <dgm:scene3d>
+      <a:camera prst="orthographicFront"/>
+      <a:lightRig rig="threePt" dir="t"/>
+    </dgm:scene3d>
+    <dgm:sp3d/>
+    <dgm:txPr/>
+    <dgm:style>
+      <a:lnRef idx="0">
+        <a:scrgbClr r="0" g="0" b="0"/>
+      </a:lnRef>
+      <a:fillRef idx="3">
+        <a:scrgbClr r="0" g="0" b="0"/>
+      </a:fillRef>
+      <a:effectRef idx="2">
+        <a:scrgbClr r="0" g="0" b="0"/>
+      </a:effectRef>
+      <a:fontRef idx="minor">
+        <a:schemeClr val="lt1"/>
+      </a:fontRef>
+    </dgm:style>
+  </dgm:styleLbl>
+  <dgm:styleLbl name="fgSibTrans2D1">
+    <dgm:scene3d>
+      <a:camera prst="orthographicFront"/>
+      <a:lightRig rig="threePt" dir="t"/>
+    </dgm:scene3d>
+    <dgm:sp3d/>
+    <dgm:txPr/>
+    <dgm:style>
+      <a:lnRef idx="0">
+        <a:scrgbClr r="0" g="0" b="0"/>
+      </a:lnRef>
+      <a:fillRef idx="3">
+        <a:scrgbClr r="0" g="0" b="0"/>
+      </a:fillRef>
+      <a:effectRef idx="2">
+        <a:scrgbClr r="0" g="0" b="0"/>
+      </a:effectRef>
+      <a:fontRef idx="minor">
+        <a:schemeClr val="lt1"/>
+      </a:fontRef>
+    </dgm:style>
+  </dgm:styleLbl>
+  <dgm:styleLbl name="bgSibTrans2D1">
+    <dgm:scene3d>
+      <a:camera prst="orthographicFront"/>
+      <a:lightRig rig="threePt" dir="t"/>
+    </dgm:scene3d>
+    <dgm:sp3d/>
+    <dgm:txPr/>
+    <dgm:style>
+      <a:lnRef idx="0">
+        <a:scrgbClr r="0" g="0" b="0"/>
+      </a:lnRef>
+      <a:fillRef idx="3">
+        <a:scrgbClr r="0" g="0" b="0"/>
+      </a:fillRef>
+      <a:effectRef idx="2">
+        <a:scrgbClr r="0" g="0" b="0"/>
+      </a:effectRef>
+      <a:fontRef idx="minor">
+        <a:schemeClr val="lt1"/>
+      </a:fontRef>
+    </dgm:style>
+  </dgm:styleLbl>
+  <dgm:styleLbl name="sibTrans1D1">
+    <dgm:scene3d>
+      <a:camera prst="orthographicFront"/>
+      <a:lightRig rig="threePt" dir="t"/>
+    </dgm:scene3d>
+    <dgm:sp3d/>
+    <dgm:txPr/>
+    <dgm:style>
+      <a:lnRef idx="1">
+        <a:scrgbClr r="0" g="0" b="0"/>
+      </a:lnRef>
+      <a:fillRef idx="0">
+        <a:scrgbClr r="0" g="0" b="0"/>
+      </a:fillRef>
+      <a:effectRef idx="0">
+        <a:scrgbClr r="0" g="0" b="0"/>
+      </a:effectRef>
+      <a:fontRef idx="minor"/>
+    </dgm:style>
+  </dgm:styleLbl>
+  <dgm:styleLbl name="callout">
+    <dgm:scene3d>
+      <a:camera prst="orthographicFront"/>
+      <a:lightRig rig="threePt" dir="t"/>
+    </dgm:scene3d>
+    <dgm:sp3d/>
+    <dgm:txPr/>
+    <dgm:style>
+      <a:lnRef idx="2">
+        <a:scrgbClr r="0" g="0" b="0"/>
+      </a:lnRef>
+      <a:fillRef idx="1">
+        <a:scrgbClr r="0" g="0" b="0"/>
+      </a:fillRef>
+      <a:effectRef idx="1">
+        <a:scrgbClr r="0" g="0" b="0"/>
+      </a:effectRef>
+      <a:fontRef idx="minor"/>
+    </dgm:style>
+  </dgm:styleLbl>
+  <dgm:styleLbl name="asst0">
+    <dgm:scene3d>
+      <a:camera prst="orthographicFront"/>
+      <a:lightRig rig="threePt" dir="t"/>
+    </dgm:scene3d>
+    <dgm:sp3d/>
+    <dgm:txPr/>
+    <dgm:style>
+      <a:lnRef idx="0">
+        <a:scrgbClr r="0" g="0" b="0"/>
+      </a:lnRef>
+      <a:fillRef idx="3">
+        <a:scrgbClr r="0" g="0" b="0"/>
+      </a:fillRef>
+      <a:effectRef idx="2">
+        <a:scrgbClr r="0" g="0" b="0"/>
+      </a:effectRef>
+      <a:fontRef idx="minor">
+        <a:schemeClr val="lt1"/>
+      </a:fontRef>
+    </dgm:style>
+  </dgm:styleLbl>
+  <dgm:styleLbl name="asst1">
+    <dgm:scene3d>
+      <a:camera prst="orthographicFront"/>
+      <a:lightRig rig="threePt" dir="t"/>
+    </dgm:scene3d>
+    <dgm:sp3d/>
+    <dgm:txPr/>
+    <dgm:style>
+      <a:lnRef idx="0">
+        <a:scrgbClr r="0" g="0" b="0"/>
+      </a:lnRef>
+      <a:fillRef idx="3">
+        <a:scrgbClr r="0" g="0" b="0"/>
+      </a:fillRef>
+      <a:effectRef idx="2">
+        <a:scrgbClr r="0" g="0" b="0"/>
+      </a:effectRef>
+      <a:fontRef idx="minor">
+        <a:schemeClr val="lt1"/>
+      </a:fontRef>
+    </dgm:style>
+  </dgm:styleLbl>
+  <dgm:styleLbl name="asst2">
+    <dgm:scene3d>
+      <a:camera prst="orthographicFront"/>
+      <a:lightRig rig="threePt" dir="t"/>
+    </dgm:scene3d>
+    <dgm:sp3d/>
+    <dgm:txPr/>
+    <dgm:style>
+      <a:lnRef idx="0">
+        <a:scrgbClr r="0" g="0" b="0"/>
+      </a:lnRef>
+      <a:fillRef idx="3">
+        <a:scrgbClr r="0" g="0" b="0"/>
+      </a:fillRef>
+      <a:effectRef idx="2">
+        <a:scrgbClr r="0" g="0" b="0"/>
+      </a:effectRef>
+      <a:fontRef idx="minor">
+        <a:schemeClr val="lt1"/>
+      </a:fontRef>
+    </dgm:style>
+  </dgm:styleLbl>
+  <dgm:styleLbl name="asst3">
+    <dgm:scene3d>
+      <a:camera prst="orthographicFront"/>
+      <a:lightRig rig="threePt" dir="t"/>
+    </dgm:scene3d>
+    <dgm:sp3d/>
+    <dgm:txPr/>
+    <dgm:style>
+      <a:lnRef idx="0">
+        <a:scrgbClr r="0" g="0" b="0"/>
+      </a:lnRef>
+      <a:fillRef idx="3">
+        <a:scrgbClr r="0" g="0" b="0"/>
+      </a:fillRef>
+      <a:effectRef idx="2">
+        <a:scrgbClr r="0" g="0" b="0"/>
+      </a:effectRef>
+      <a:fontRef idx="minor">
+        <a:schemeClr val="lt1"/>
+      </a:fontRef>
+    </dgm:style>
+  </dgm:styleLbl>
+  <dgm:styleLbl name="asst4">
+    <dgm:scene3d>
+      <a:camera prst="orthographicFront"/>
+      <a:lightRig rig="threePt" dir="t"/>
+    </dgm:scene3d>
+    <dgm:sp3d/>
+    <dgm:txPr/>
+    <dgm:style>
+      <a:lnRef idx="0">
+        <a:scrgbClr r="0" g="0" b="0"/>
+      </a:lnRef>
+      <a:fillRef idx="3">
+        <a:scrgbClr r="0" g="0" b="0"/>
+      </a:fillRef>
+      <a:effectRef idx="2">
+        <a:scrgbClr r="0" g="0" b="0"/>
+      </a:effectRef>
+      <a:fontRef idx="minor">
+        <a:schemeClr val="lt1"/>
+      </a:fontRef>
+    </dgm:style>
+  </dgm:styleLbl>
+  <dgm:styleLbl name="parChTrans2D1">
+    <dgm:scene3d>
+      <a:camera prst="orthographicFront"/>
+      <a:lightRig rig="threePt" dir="t"/>
+    </dgm:scene3d>
+    <dgm:sp3d/>
+    <dgm:txPr/>
+    <dgm:style>
+      <a:lnRef idx="0">
+        <a:scrgbClr r="0" g="0" b="0"/>
+      </a:lnRef>
+      <a:fillRef idx="3">
+        <a:scrgbClr r="0" g="0" b="0"/>
+      </a:fillRef>
+      <a:effectRef idx="2">
+        <a:scrgbClr r="0" g="0" b="0"/>
+      </a:effectRef>
+      <a:fontRef idx="minor">
+        <a:schemeClr val="lt1"/>
+      </a:fontRef>
+    </dgm:style>
+  </dgm:styleLbl>
+  <dgm:styleLbl name="parChTrans2D2">
+    <dgm:scene3d>
+      <a:camera prst="orthographicFront"/>
+      <a:lightRig rig="threePt" dir="t"/>
+    </dgm:scene3d>
+    <dgm:sp3d/>
+    <dgm:txPr/>
+    <dgm:style>
+      <a:lnRef idx="0">
+        <a:scrgbClr r="0" g="0" b="0"/>
+      </a:lnRef>
+      <a:fillRef idx="3">
+        <a:scrgbClr r="0" g="0" b="0"/>
+      </a:fillRef>
+      <a:effectRef idx="2">
+        <a:scrgbClr r="0" g="0" b="0"/>
+      </a:effectRef>
+      <a:fontRef idx="minor">
+        <a:schemeClr val="lt1"/>
+      </a:fontRef>
+    </dgm:style>
+  </dgm:styleLbl>
+  <dgm:styleLbl name="parChTrans2D3">
+    <dgm:scene3d>
+      <a:camera prst="orthographicFront"/>
+      <a:lightRig rig="threePt" dir="t"/>
+    </dgm:scene3d>
+    <dgm:sp3d/>
+    <dgm:txPr/>
+    <dgm:style>
+      <a:lnRef idx="1">
+        <a:scrgbClr r="0" g="0" b="0"/>
+      </a:lnRef>
+      <a:fillRef idx="3">
+        <a:scrgbClr r="0" g="0" b="0"/>
+      </a:fillRef>
+      <a:effectRef idx="2">
+        <a:scrgbClr r="0" g="0" b="0"/>
+      </a:effectRef>
+      <a:fontRef idx="minor">
+        <a:schemeClr val="lt1"/>
+      </a:fontRef>
+    </dgm:style>
+  </dgm:styleLbl>
+  <dgm:styleLbl name="parChTrans2D4">
+    <dgm:scene3d>
+      <a:camera prst="orthographicFront"/>
+      <a:lightRig rig="threePt" dir="t"/>
+    </dgm:scene3d>
+    <dgm:sp3d/>
+    <dgm:txPr/>
+    <dgm:style>
+      <a:lnRef idx="1">
+        <a:scrgbClr r="0" g="0" b="0"/>
+      </a:lnRef>
+      <a:fillRef idx="3">
+        <a:scrgbClr r="0" g="0" b="0"/>
+      </a:fillRef>
+      <a:effectRef idx="2">
+        <a:scrgbClr r="0" g="0" b="0"/>
+      </a:effectRef>
+      <a:fontRef idx="minor">
+        <a:schemeClr val="lt1"/>
+      </a:fontRef>
+    </dgm:style>
+  </dgm:styleLbl>
+  <dgm:styleLbl name="parChTrans1D1">
+    <dgm:scene3d>
+      <a:camera prst="orthographicFront"/>
+      <a:lightRig rig="threePt" dir="t"/>
+    </dgm:scene3d>
+    <dgm:sp3d/>
+    <dgm:txPr/>
+    <dgm:style>
+      <a:lnRef idx="1">
+        <a:scrgbClr r="0" g="0" b="0"/>
+      </a:lnRef>
+      <a:fillRef idx="0">
+        <a:scrgbClr r="0" g="0" b="0"/>
+      </a:fillRef>
+      <a:effectRef idx="0">
+        <a:scrgbClr r="0" g="0" b="0"/>
+      </a:effectRef>
+      <a:fontRef idx="minor"/>
+    </dgm:style>
+  </dgm:styleLbl>
+  <dgm:styleLbl name="parChTrans1D2">
+    <dgm:scene3d>
+      <a:camera prst="orthographicFront"/>
+      <a:lightRig rig="threePt" dir="t"/>
+    </dgm:scene3d>
+    <dgm:sp3d/>
+    <dgm:txPr/>
+    <dgm:style>
+      <a:lnRef idx="1">
+        <a:scrgbClr r="0" g="0" b="0"/>
+      </a:lnRef>
+      <a:fillRef idx="0">
+        <a:scrgbClr r="0" g="0" b="0"/>
+      </a:fillRef>
+      <a:effectRef idx="0">
+        <a:scrgbClr r="0" g="0" b="0"/>
+      </a:effectRef>
+      <a:fontRef idx="minor"/>
+    </dgm:style>
+  </dgm:styleLbl>
+  <dgm:styleLbl name="parChTrans1D3">
+    <dgm:scene3d>
+      <a:camera prst="orthographicFront"/>
+      <a:lightRig rig="threePt" dir="t"/>
+    </dgm:scene3d>
+    <dgm:sp3d/>
+    <dgm:txPr/>
+    <dgm:style>
+      <a:lnRef idx="1">
+        <a:scrgbClr r="0" g="0" b="0"/>
+      </a:lnRef>
+      <a:fillRef idx="0">
+        <a:scrgbClr r="0" g="0" b="0"/>
+      </a:fillRef>
+      <a:effectRef idx="0">
+        <a:scrgbClr r="0" g="0" b="0"/>
+      </a:effectRef>
+      <a:fontRef idx="minor"/>
+    </dgm:style>
+  </dgm:styleLbl>
+  <dgm:styleLbl name="parChTrans1D4">
+    <dgm:scene3d>
+      <a:camera prst="orthographicFront"/>
+      <a:lightRig rig="threePt" dir="t"/>
+    </dgm:scene3d>
+    <dgm:sp3d/>
+    <dgm:txPr/>
+    <dgm:style>
+      <a:lnRef idx="1">
+        <a:scrgbClr r="0" g="0" b="0"/>
+      </a:lnRef>
+      <a:fillRef idx="0">
+        <a:scrgbClr r="0" g="0" b="0"/>
+      </a:fillRef>
+      <a:effectRef idx="0">
+        <a:scrgbClr r="0" g="0" b="0"/>
+      </a:effectRef>
+      <a:fontRef idx="minor"/>
+    </dgm:style>
+  </dgm:styleLbl>
+  <dgm:styleLbl name="fgAcc1">
+    <dgm:scene3d>
+      <a:camera prst="orthographicFront"/>
+      <a:lightRig rig="threePt" dir="t"/>
+    </dgm:scene3d>
+    <dgm:sp3d/>
+    <dgm:txPr/>
+    <dgm:style>
+      <a:lnRef idx="1">
+        <a:scrgbClr r="0" g="0" b="0"/>
+      </a:lnRef>
+      <a:fillRef idx="1">
+        <a:scrgbClr r="0" g="0" b="0"/>
+      </a:fillRef>
+      <a:effectRef idx="0">
+        <a:scrgbClr r="0" g="0" b="0"/>
+      </a:effectRef>
+      <a:fontRef idx="minor"/>
+    </dgm:style>
+  </dgm:styleLbl>
+  <dgm:styleLbl name="conFgAcc1">
+    <dgm:scene3d>
+      <a:camera prst="orthographicFront"/>
+      <a:lightRig rig="threePt" dir="t"/>
+    </dgm:scene3d>
+    <dgm:sp3d/>
+    <dgm:txPr/>
+    <dgm:style>
+      <a:lnRef idx="1">
+        <a:scrgbClr r="0" g="0" b="0"/>
+      </a:lnRef>
+      <a:fillRef idx="1">
+        <a:scrgbClr r="0" g="0" b="0"/>
+      </a:fillRef>
+      <a:effectRef idx="0">
+        <a:scrgbClr r="0" g="0" b="0"/>
+      </a:effectRef>
+      <a:fontRef idx="minor"/>
+    </dgm:style>
+  </dgm:styleLbl>
+  <dgm:styleLbl name="alignAcc1">
+    <dgm:scene3d>
+      <a:camera prst="orthographicFront"/>
+      <a:lightRig rig="threePt" dir="t"/>
+    </dgm:scene3d>
+    <dgm:sp3d/>
+    <dgm:txPr/>
+    <dgm:style>
+      <a:lnRef idx="1">
+        <a:scrgbClr r="0" g="0" b="0"/>
+      </a:lnRef>
+      <a:fillRef idx="1">
+        <a:scrgbClr r="0" g="0" b="0"/>
+      </a:fillRef>
+      <a:effectRef idx="0">
+        <a:scrgbClr r="0" g="0" b="0"/>
+      </a:effectRef>
+      <a:fontRef idx="minor"/>
+    </dgm:style>
+  </dgm:styleLbl>
+  <dgm:styleLbl name="trAlignAcc1">
+    <dgm:scene3d>
+      <a:camera prst="orthographicFront"/>
+      <a:lightRig rig="threePt" dir="t"/>
+    </dgm:scene3d>
+    <dgm:sp3d/>
+    <dgm:txPr/>
+    <dgm:style>
+      <a:lnRef idx="1">
+        <a:scrgbClr r="0" g="0" b="0"/>
+      </a:lnRef>
+      <a:fillRef idx="1">
+        <a:scrgbClr r="0" g="0" b="0"/>
+      </a:fillRef>
+      <a:effectRef idx="0">
+        <a:scrgbClr r="0" g="0" b="0"/>
+      </a:effectRef>
+      <a:fontRef idx="minor"/>
+    </dgm:style>
+  </dgm:styleLbl>
+  <dgm:styleLbl name="bgAcc1">
+    <dgm:scene3d>
+      <a:camera prst="orthographicFront"/>
+      <a:lightRig rig="threePt" dir="t"/>
+    </dgm:scene3d>
+    <dgm:sp3d/>
+    <dgm:txPr/>
+    <dgm:style>
+      <a:lnRef idx="1">
+        <a:scrgbClr r="0" g="0" b="0"/>
+      </a:lnRef>
+      <a:fillRef idx="1">
+        <a:scrgbClr r="0" g="0" b="0"/>
+      </a:fillRef>
+      <a:effectRef idx="0">
+        <a:scrgbClr r="0" g="0" b="0"/>
+      </a:effectRef>
+      <a:fontRef idx="minor"/>
+    </dgm:style>
+  </dgm:styleLbl>
+  <dgm:styleLbl name="solidFgAcc1">
+    <dgm:scene3d>
+      <a:camera prst="orthographicFront"/>
+      <a:lightRig rig="threePt" dir="t"/>
+    </dgm:scene3d>
+    <dgm:sp3d/>
+    <dgm:txPr/>
+    <dgm:style>
+      <a:lnRef idx="1">
+        <a:scrgbClr r="0" g="0" b="0"/>
+      </a:lnRef>
+      <a:fillRef idx="1">
+        <a:scrgbClr r="0" g="0" b="0"/>
+      </a:fillRef>
+      <a:effectRef idx="0">
+        <a:scrgbClr r="0" g="0" b="0"/>
+      </a:effectRef>
+      <a:fontRef idx="minor"/>
+    </dgm:style>
+  </dgm:styleLbl>
+  <dgm:styleLbl name="solidAlignAcc1">
+    <dgm:scene3d>
+      <a:camera prst="orthographicFront"/>
+      <a:lightRig rig="threePt" dir="t"/>
+    </dgm:scene3d>
+    <dgm:sp3d/>
+    <dgm:txPr/>
+    <dgm:style>
+      <a:lnRef idx="1">
+        <a:scrgbClr r="0" g="0" b="0"/>
+      </a:lnRef>
+      <a:fillRef idx="1">
+        <a:scrgbClr r="0" g="0" b="0"/>
+      </a:fillRef>
+      <a:effectRef idx="0">
+        <a:scrgbClr r="0" g="0" b="0"/>
+      </a:effectRef>
+      <a:fontRef idx="minor"/>
+    </dgm:style>
+  </dgm:styleLbl>
+  <dgm:styleLbl name="solidBgAcc1">
+    <dgm:scene3d>
+      <a:camera prst="orthographicFront"/>
+      <a:lightRig rig="threePt" dir="t"/>
+    </dgm:scene3d>
+    <dgm:sp3d/>
+    <dgm:txPr/>
+    <dgm:style>
+      <a:lnRef idx="1">
+        <a:scrgbClr r="0" g="0" b="0"/>
+      </a:lnRef>
+      <a:fillRef idx="1">
+        <a:scrgbClr r="0" g="0" b="0"/>
+      </a:fillRef>
+      <a:effectRef idx="0">
+        <a:scrgbClr r="0" g="0" b="0"/>
+      </a:effectRef>
+      <a:fontRef idx="minor"/>
+    </dgm:style>
+  </dgm:styleLbl>
+  <dgm:styleLbl name="fgAccFollowNode1">
+    <dgm:scene3d>
+      <a:camera prst="orthographicFront"/>
+      <a:lightRig rig="threePt" dir="t"/>
+    </dgm:scene3d>
+    <dgm:sp3d/>
+    <dgm:txPr/>
+    <dgm:style>
+      <a:lnRef idx="1">
+        <a:scrgbClr r="0" g="0" b="0"/>
+      </a:lnRef>
+      <a:fillRef idx="1">
+        <a:scrgbClr r="0" g="0" b="0"/>
+      </a:fillRef>
+      <a:effectRef idx="0">
+        <a:scrgbClr r="0" g="0" b="0"/>
+      </a:effectRef>
+      <a:fontRef idx="minor"/>
+    </dgm:style>
+  </dgm:styleLbl>
+  <dgm:styleLbl name="alignAccFollowNode1">
+    <dgm:scene3d>
+      <a:camera prst="orthographicFront"/>
+      <a:lightRig rig="threePt" dir="t"/>
+    </dgm:scene3d>
+    <dgm:sp3d/>
+    <dgm:txPr/>
+    <dgm:style>
+      <a:lnRef idx="1">
+        <a:scrgbClr r="0" g="0" b="0"/>
+      </a:lnRef>
+      <a:fillRef idx="1">
+        <a:scrgbClr r="0" g="0" b="0"/>
+      </a:fillRef>
+      <a:effectRef idx="0">
+        <a:scrgbClr r="0" g="0" b="0"/>
+      </a:effectRef>
+      <a:fontRef idx="minor"/>
+    </dgm:style>
+  </dgm:styleLbl>
+  <dgm:styleLbl name="bgAccFollowNode1">
+    <dgm:scene3d>
+      <a:camera prst="orthographicFront"/>
+      <a:lightRig rig="threePt" dir="t"/>
+    </dgm:scene3d>
+    <dgm:sp3d/>
+    <dgm:txPr/>
+    <dgm:style>
+      <a:lnRef idx="1">
+        <a:scrgbClr r="0" g="0" b="0"/>
+      </a:lnRef>
+      <a:fillRef idx="1">
+        <a:scrgbClr r="0" g="0" b="0"/>
+      </a:fillRef>
+      <a:effectRef idx="0">
+        <a:scrgbClr r="0" g="0" b="0"/>
+      </a:effectRef>
+      <a:fontRef idx="minor"/>
+    </dgm:style>
+  </dgm:styleLbl>
+  <dgm:styleLbl name="fgAcc0">
+    <dgm:scene3d>
+      <a:camera prst="orthographicFront"/>
+      <a:lightRig rig="threePt" dir="t"/>
+    </dgm:scene3d>
+    <dgm:sp3d/>
+    <dgm:txPr/>
+    <dgm:style>
+      <a:lnRef idx="1">
+        <a:scrgbClr r="0" g="0" b="0"/>
+      </a:lnRef>
+      <a:fillRef idx="1">
+        <a:scrgbClr r="0" g="0" b="0"/>
+      </a:fillRef>
+      <a:effectRef idx="0">
+        <a:scrgbClr r="0" g="0" b="0"/>
+      </a:effectRef>
+      <a:fontRef idx="minor"/>
+    </dgm:style>
+  </dgm:styleLbl>
+  <dgm:styleLbl name="fgAcc2">
+    <dgm:scene3d>
+      <a:camera prst="orthographicFront"/>
+      <a:lightRig rig="threePt" dir="t"/>
+    </dgm:scene3d>
+    <dgm:sp3d/>
+    <dgm:txPr/>
+    <dgm:style>
+      <a:lnRef idx="1">
+        <a:scrgbClr r="0" g="0" b="0"/>
+      </a:lnRef>
+      <a:fillRef idx="1">
+        <a:scrgbClr r="0" g="0" b="0"/>
+      </a:fillRef>
+      <a:effectRef idx="0">
+        <a:scrgbClr r="0" g="0" b="0"/>
+      </a:effectRef>
+      <a:fontRef idx="minor"/>
+    </dgm:style>
+  </dgm:styleLbl>
+  <dgm:styleLbl name="fgAcc3">
+    <dgm:scene3d>
+      <a:camera prst="orthographicFront"/>
+      <a:lightRig rig="threePt" dir="t"/>
+    </dgm:scene3d>
+    <dgm:sp3d/>
+    <dgm:txPr/>
+    <dgm:style>
+      <a:lnRef idx="1">
+        <a:scrgbClr r="0" g="0" b="0"/>
+      </a:lnRef>
+      <a:fillRef idx="1">
+        <a:scrgbClr r="0" g="0" b="0"/>
+      </a:fillRef>
+      <a:effectRef idx="0">
+        <a:scrgbClr r="0" g="0" b="0"/>
+      </a:effectRef>
+      <a:fontRef idx="minor"/>
+    </dgm:style>
+  </dgm:styleLbl>
+  <dgm:styleLbl name="fgAcc4">
+    <dgm:scene3d>
+      <a:camera prst="orthographicFront"/>
+      <a:lightRig rig="threePt" dir="t"/>
+    </dgm:scene3d>
+    <dgm:sp3d/>
+    <dgm:txPr/>
+    <dgm:style>
+      <a:lnRef idx="1">
+        <a:scrgbClr r="0" g="0" b="0"/>
+      </a:lnRef>
+      <a:fillRef idx="1">
+        <a:scrgbClr r="0" g="0" b="0"/>
+      </a:fillRef>
+      <a:effectRef idx="0">
+        <a:scrgbClr r="0" g="0" b="0"/>
+      </a:effectRef>
+      <a:fontRef idx="minor"/>
+    </dgm:style>
+  </dgm:styleLbl>
+  <dgm:styleLbl name="bgShp">
+    <dgm:scene3d>
+      <a:camera prst="orthographicFront"/>
+      <a:lightRig rig="threePt" dir="t"/>
+    </dgm:scene3d>
+    <dgm:sp3d/>
+    <dgm:txPr/>
+    <dgm:style>
+      <a:lnRef idx="0">
+        <a:scrgbClr r="0" g="0" b="0"/>
+      </a:lnRef>
+      <a:fillRef idx="1">
+        <a:scrgbClr r="0" g="0" b="0"/>
+      </a:fillRef>
+      <a:effectRef idx="2">
+        <a:scrgbClr r="0" g="0" b="0"/>
+      </a:effectRef>
+      <a:fontRef idx="minor"/>
+    </dgm:style>
+  </dgm:styleLbl>
+  <dgm:styleLbl name="dkBgShp">
+    <dgm:scene3d>
+      <a:camera prst="orthographicFront"/>
+      <a:lightRig rig="threePt" dir="t"/>
+    </dgm:scene3d>
+    <dgm:sp3d/>
+    <dgm:txPr/>
+    <dgm:style>
+      <a:lnRef idx="0">
+        <a:scrgbClr r="0" g="0" b="0"/>
+      </a:lnRef>
+      <a:fillRef idx="1">
+        <a:scrgbClr r="0" g="0" b="0"/>
+      </a:fillRef>
+      <a:effectRef idx="2">
+        <a:scrgbClr r="0" g="0" b="0"/>
+      </a:effectRef>
+      <a:fontRef idx="minor"/>
+    </dgm:style>
+  </dgm:styleLbl>
+  <dgm:styleLbl name="trBgShp">
+    <dgm:scene3d>
+      <a:camera prst="orthographicFront"/>
+      <a:lightRig rig="threePt" dir="t"/>
+    </dgm:scene3d>
+    <dgm:sp3d/>
+    <dgm:txPr/>
+    <dgm:style>
+      <a:lnRef idx="0">
+        <a:scrgbClr r="0" g="0" b="0"/>
+      </a:lnRef>
+      <a:fillRef idx="1">
+        <a:scrgbClr r="0" g="0" b="0"/>
+      </a:fillRef>
+      <a:effectRef idx="0">
+        <a:scrgbClr r="0" g="0" b="0"/>
+      </a:effectRef>
+      <a:fontRef idx="minor"/>
+    </dgm:style>
+  </dgm:styleLbl>
+  <dgm:styleLbl name="fgShp">
+    <dgm:scene3d>
+      <a:camera prst="orthographicFront"/>
+      <a:lightRig rig="threePt" dir="t"/>
+    </dgm:scene3d>
+    <dgm:sp3d/>
+    <dgm:txPr/>
+    <dgm:style>
+      <a:lnRef idx="0">
+        <a:scrgbClr r="0" g="0" b="0"/>
+      </a:lnRef>
+      <a:fillRef idx="3">
+        <a:scrgbClr r="0" g="0" b="0"/>
+      </a:fillRef>
+      <a:effectRef idx="2">
+        <a:scrgbClr r="0" g="0" b="0"/>
+      </a:effectRef>
+      <a:fontRef idx="minor"/>
+    </dgm:style>
+  </dgm:styleLbl>
+  <dgm:styleLbl name="revTx">
+    <dgm:scene3d>
+      <a:camera prst="orthographicFront"/>
+      <a:lightRig rig="threePt" dir="t"/>
+    </dgm:scene3d>
+    <dgm:sp3d/>
+    <dgm:txPr/>
+    <dgm:style>
+      <a:lnRef idx="0">
+        <a:scrgbClr r="0" g="0" b="0"/>
+      </a:lnRef>
+      <a:fillRef idx="0">
+        <a:scrgbClr r="0" g="0" b="0"/>
+      </a:fillRef>
+      <a:effectRef idx="0">
+        <a:scrgbClr r="0" g="0" b="0"/>
+      </a:effectRef>
+      <a:fontRef idx="minor"/>
+    </dgm:style>
+  </dgm:styleLbl>
+</dgm:styleDef>
 </file>
 
 <file path=ppt/slideLayouts/slideLayout1.xml><?xml version="1.0" encoding="utf-8"?>
@@ -12451,27 +15304,9 @@
   <p:cSld>
     <p:bg>
       <p:bgPr>
-        <a:gradFill rotWithShape="1">
-          <a:gsLst>
-            <a:gs pos="0">
-              <a:schemeClr val="bg2">
-                <a:tint val="98000"/>
-                <a:hueMod val="94000"/>
-                <a:satMod val="148000"/>
-                <a:lumMod val="150000"/>
-              </a:schemeClr>
-            </a:gs>
-            <a:gs pos="100000">
-              <a:schemeClr val="bg2">
-                <a:shade val="92000"/>
-                <a:hueMod val="104000"/>
-                <a:satMod val="140000"/>
-                <a:lumMod val="68000"/>
-              </a:schemeClr>
-            </a:gs>
-          </a:gsLst>
-          <a:lin ang="5040000" scaled="0"/>
-        </a:gradFill>
+        <a:solidFill>
+          <a:schemeClr val="bg2"/>
+        </a:solidFill>
         <a:effectLst/>
       </p:bgPr>
     </p:bg>
@@ -12491,10 +15326,10 @@
       </p:grpSpPr>
       <p:sp useBgFill="1">
         <p:nvSpPr>
-          <p:cNvPr id="10" name="Rectangle 9">
+          <p:cNvPr id="75" name="Rectangle 74">
             <a:extLst>
               <a:ext uri="{FF2B5EF4-FFF2-40B4-BE49-F238E27FC236}">
-                <a16:creationId xmlns:a16="http://schemas.microsoft.com/office/drawing/2014/main" id="{B7D4B16D-600A-41A1-8B1B-3727C56C0C9B}"/>
+                <a16:creationId xmlns:a16="http://schemas.microsoft.com/office/drawing/2014/main" id="{7A070EAD-1DCD-4F3D-BA84-799B891A0E19}"/>
               </a:ext>
               <a:ext uri="{C183D7F6-B498-43B3-948B-1728B52AA6E4}">
                 <adec:decorative xmlns:adec="http://schemas.microsoft.com/office/drawing/2017/decorative" val="1"/>
@@ -12514,8 +15349,8 @@
         </p:nvSpPr>
         <p:spPr>
           <a:xfrm>
-            <a:off x="1" y="-1"/>
-            <a:ext cx="12192000" cy="6858000"/>
+            <a:off x="0" y="0"/>
+            <a:ext cx="12191999" cy="6858001"/>
           </a:xfrm>
           <a:prstGeom prst="rect">
             <a:avLst/>
@@ -12545,16 +15380,101 @@
           <a:lstStyle/>
           <a:p>
             <a:pPr algn="ctr"/>
-            <a:endParaRPr lang="en-US"/>
+            <a:endParaRPr lang="en-US" dirty="0"/>
+          </a:p>
+        </p:txBody>
+      </p:sp>
+      <p:sp>
+        <p:nvSpPr>
+          <p:cNvPr id="4" name="Title 3">
+            <a:extLst>
+              <a:ext uri="{FF2B5EF4-FFF2-40B4-BE49-F238E27FC236}">
+                <a16:creationId xmlns:a16="http://schemas.microsoft.com/office/drawing/2014/main" id="{BF2A2A9C-1F41-BBBB-442B-480108CAF7B0}"/>
+              </a:ext>
+            </a:extLst>
+          </p:cNvPr>
+          <p:cNvSpPr>
+            <a:spLocks noGrp="1"/>
+          </p:cNvSpPr>
+          <p:nvPr>
+            <p:ph type="ctrTitle"/>
+          </p:nvPr>
+        </p:nvSpPr>
+        <p:spPr>
+          <a:xfrm>
+            <a:off x="3108960" y="1122363"/>
+            <a:ext cx="7559039" cy="3027360"/>
+          </a:xfrm>
+        </p:spPr>
+        <p:txBody>
+          <a:bodyPr>
+            <a:normAutofit/>
+          </a:bodyPr>
+          <a:lstStyle/>
+          <a:p>
+            <a:r>
+              <a:rPr lang="en-US" sz="5400" dirty="0" err="1"/>
+              <a:t>nomopoly</a:t>
+            </a:r>
+            <a:endParaRPr lang="en-US" sz="5400" dirty="0"/>
+          </a:p>
+        </p:txBody>
+      </p:sp>
+      <p:sp>
+        <p:nvSpPr>
+          <p:cNvPr id="5" name="Subtitle 4">
+            <a:extLst>
+              <a:ext uri="{FF2B5EF4-FFF2-40B4-BE49-F238E27FC236}">
+                <a16:creationId xmlns:a16="http://schemas.microsoft.com/office/drawing/2014/main" id="{759FCC45-3BD0-B2D6-619C-2CE9E35273E0}"/>
+              </a:ext>
+            </a:extLst>
+          </p:cNvPr>
+          <p:cNvSpPr>
+            <a:spLocks noGrp="1"/>
+          </p:cNvSpPr>
+          <p:nvPr>
+            <p:ph type="subTitle" idx="1"/>
+          </p:nvPr>
+        </p:nvSpPr>
+        <p:spPr>
+          <a:xfrm>
+            <a:off x="3128010" y="4149724"/>
+            <a:ext cx="7539989" cy="1108075"/>
+          </a:xfrm>
+        </p:spPr>
+        <p:txBody>
+          <a:bodyPr>
+            <a:normAutofit/>
+          </a:bodyPr>
+          <a:lstStyle/>
+          <a:p>
+            <a:r>
+              <a:rPr lang="en-US" sz="2400" dirty="0">
+                <a:solidFill>
+                  <a:schemeClr val="tx1"/>
+                </a:solidFill>
+              </a:rPr>
+              <a:t>Avant-garde ZKML Compiler </a:t>
+            </a:r>
+          </a:p>
+          <a:p>
+            <a:r>
+              <a:rPr lang="en-US" sz="2400" dirty="0">
+                <a:solidFill>
+                  <a:schemeClr val="tx1"/>
+                </a:solidFill>
+              </a:rPr>
+              <a:t>without polynomial commitments</a:t>
+            </a:r>
           </a:p>
         </p:txBody>
       </p:sp>
       <p:grpSp>
         <p:nvGrpSpPr>
-          <p:cNvPr id="12" name="Group 11">
+          <p:cNvPr id="77" name="Group 76">
             <a:extLst>
               <a:ext uri="{FF2B5EF4-FFF2-40B4-BE49-F238E27FC236}">
-                <a16:creationId xmlns:a16="http://schemas.microsoft.com/office/drawing/2014/main" id="{DE7C35E0-BD19-4AFC-81BF-7A7507E9C94D}"/>
+                <a16:creationId xmlns:a16="http://schemas.microsoft.com/office/drawing/2014/main" id="{DE471E13-6104-4637-8A8F-B545529B1D11}"/>
               </a:ext>
               <a:ext uri="{C183D7F6-B498-43B3-948B-1728B52AA6E4}">
                 <adec:decorative xmlns:adec="http://schemas.microsoft.com/office/drawing/2017/decorative" val="1"/>
@@ -12579,19 +15499,31 @@
             <a:chOff x="0" y="0"/>
             <a:chExt cx="2305051" cy="6858001"/>
           </a:xfrm>
-          <a:solidFill>
-            <a:schemeClr val="tx1">
-              <a:alpha val="60000"/>
-            </a:schemeClr>
-          </a:solidFill>
-          <a:effectLst/>
+          <a:gradFill flip="none" rotWithShape="1">
+            <a:gsLst>
+              <a:gs pos="0">
+                <a:schemeClr val="tx2">
+                  <a:alpha val="60000"/>
+                </a:schemeClr>
+              </a:gs>
+              <a:gs pos="100000">
+                <a:schemeClr val="bg2">
+                  <a:lumMod val="60000"/>
+                  <a:lumOff val="40000"/>
+                  <a:alpha val="80000"/>
+                </a:schemeClr>
+              </a:gs>
+            </a:gsLst>
+            <a:lin ang="5400000" scaled="0"/>
+            <a:tileRect/>
+          </a:gradFill>
         </p:grpSpPr>
         <p:sp>
           <p:nvSpPr>
-            <p:cNvPr id="13" name="Rectangle 5">
+            <p:cNvPr id="78" name="Rectangle 5">
               <a:extLst>
                 <a:ext uri="{FF2B5EF4-FFF2-40B4-BE49-F238E27FC236}">
-                  <a16:creationId xmlns:a16="http://schemas.microsoft.com/office/drawing/2014/main" id="{1E08D20A-3975-4596-85C6-D46799586283}"/>
+                  <a16:creationId xmlns:a16="http://schemas.microsoft.com/office/drawing/2014/main" id="{802F412D-6781-427D-AB79-09FD610CCE5F}"/>
                 </a:ext>
                 <a:ext uri="{C183D7F6-B498-43B3-948B-1728B52AA6E4}">
                   <adec:decorative xmlns:adec="http://schemas.microsoft.com/office/drawing/2017/decorative" val="1"/>
@@ -12644,10 +15576,10 @@
         </p:sp>
         <p:sp>
           <p:nvSpPr>
-            <p:cNvPr id="14" name="Freeform 6">
+            <p:cNvPr id="79" name="Freeform 6">
               <a:extLst>
                 <a:ext uri="{FF2B5EF4-FFF2-40B4-BE49-F238E27FC236}">
-                  <a16:creationId xmlns:a16="http://schemas.microsoft.com/office/drawing/2014/main" id="{630A9349-BFE4-4720-A229-98DCD3B69F3A}"/>
+                  <a16:creationId xmlns:a16="http://schemas.microsoft.com/office/drawing/2014/main" id="{8471B962-D824-43CE-B5DD-704B305B285F}"/>
                 </a:ext>
                 <a:ext uri="{C183D7F6-B498-43B3-948B-1728B52AA6E4}">
                   <adec:decorative xmlns:adec="http://schemas.microsoft.com/office/drawing/2017/decorative" val="1"/>
@@ -12756,10 +15688,10 @@
         </p:sp>
         <p:sp>
           <p:nvSpPr>
-            <p:cNvPr id="15" name="Freeform 7">
+            <p:cNvPr id="80" name="Freeform 7">
               <a:extLst>
                 <a:ext uri="{FF2B5EF4-FFF2-40B4-BE49-F238E27FC236}">
-                  <a16:creationId xmlns:a16="http://schemas.microsoft.com/office/drawing/2014/main" id="{28487744-BBC9-4D40-85B3-0D45003C339E}"/>
+                  <a16:creationId xmlns:a16="http://schemas.microsoft.com/office/drawing/2014/main" id="{ED60EBD3-FA75-460B-AFBD-3F234A0CAA1F}"/>
                 </a:ext>
                 <a:ext uri="{C183D7F6-B498-43B3-948B-1728B52AA6E4}">
                   <adec:decorative xmlns:adec="http://schemas.microsoft.com/office/drawing/2017/decorative" val="1"/>
@@ -12868,10 +15800,10 @@
         </p:sp>
         <p:sp>
           <p:nvSpPr>
-            <p:cNvPr id="16" name="Rectangle 8">
+            <p:cNvPr id="81" name="Rectangle 8">
               <a:extLst>
                 <a:ext uri="{FF2B5EF4-FFF2-40B4-BE49-F238E27FC236}">
-                  <a16:creationId xmlns:a16="http://schemas.microsoft.com/office/drawing/2014/main" id="{FAD6EF4D-97BD-46B4-9B5B-CD70971DD553}"/>
+                  <a16:creationId xmlns:a16="http://schemas.microsoft.com/office/drawing/2014/main" id="{D0791244-FBF2-49D9-BDBC-E2E58C86B4DB}"/>
                 </a:ext>
                 <a:ext uri="{C183D7F6-B498-43B3-948B-1728B52AA6E4}">
                   <adec:decorative xmlns:adec="http://schemas.microsoft.com/office/drawing/2017/decorative" val="1"/>
@@ -12924,10 +15856,10 @@
         </p:sp>
         <p:sp>
           <p:nvSpPr>
-            <p:cNvPr id="17" name="Freeform 9">
+            <p:cNvPr id="82" name="Freeform 9">
               <a:extLst>
                 <a:ext uri="{FF2B5EF4-FFF2-40B4-BE49-F238E27FC236}">
-                  <a16:creationId xmlns:a16="http://schemas.microsoft.com/office/drawing/2014/main" id="{210DCC42-11D2-4162-B47A-869B3F669483}"/>
+                  <a16:creationId xmlns:a16="http://schemas.microsoft.com/office/drawing/2014/main" id="{FEE4C4B1-195C-40F5-A78F-2EB7ED6E6FA6}"/>
                 </a:ext>
                 <a:ext uri="{C183D7F6-B498-43B3-948B-1728B52AA6E4}">
                   <adec:decorative xmlns:adec="http://schemas.microsoft.com/office/drawing/2017/decorative" val="1"/>
@@ -13036,10 +15968,10 @@
         </p:sp>
         <p:sp>
           <p:nvSpPr>
-            <p:cNvPr id="18" name="Freeform 10">
+            <p:cNvPr id="83" name="Freeform 10">
               <a:extLst>
                 <a:ext uri="{FF2B5EF4-FFF2-40B4-BE49-F238E27FC236}">
-                  <a16:creationId xmlns:a16="http://schemas.microsoft.com/office/drawing/2014/main" id="{DE4880D6-6ECE-4F1B-B474-FE3940D043BB}"/>
+                  <a16:creationId xmlns:a16="http://schemas.microsoft.com/office/drawing/2014/main" id="{22766AF8-3850-41E4-80D0-321D9A13D168}"/>
                 </a:ext>
                 <a:ext uri="{C183D7F6-B498-43B3-948B-1728B52AA6E4}">
                   <adec:decorative xmlns:adec="http://schemas.microsoft.com/office/drawing/2017/decorative" val="1"/>
@@ -13120,10 +16052,10 @@
         </p:sp>
         <p:sp>
           <p:nvSpPr>
-            <p:cNvPr id="19" name="Freeform 11">
+            <p:cNvPr id="84" name="Freeform 11">
               <a:extLst>
                 <a:ext uri="{FF2B5EF4-FFF2-40B4-BE49-F238E27FC236}">
-                  <a16:creationId xmlns:a16="http://schemas.microsoft.com/office/drawing/2014/main" id="{A1A39307-F675-49D2-9E45-28DA2AB5C941}"/>
+                  <a16:creationId xmlns:a16="http://schemas.microsoft.com/office/drawing/2014/main" id="{8834F8EE-AB04-42FE-AE7B-3E9C6ACA0E96}"/>
                 </a:ext>
                 <a:ext uri="{C183D7F6-B498-43B3-948B-1728B52AA6E4}">
                   <adec:decorative xmlns:adec="http://schemas.microsoft.com/office/drawing/2017/decorative" val="1"/>
@@ -13204,10 +16136,10 @@
         </p:sp>
         <p:sp>
           <p:nvSpPr>
-            <p:cNvPr id="20" name="Freeform 12">
+            <p:cNvPr id="85" name="Freeform 12">
               <a:extLst>
                 <a:ext uri="{FF2B5EF4-FFF2-40B4-BE49-F238E27FC236}">
-                  <a16:creationId xmlns:a16="http://schemas.microsoft.com/office/drawing/2014/main" id="{AC5E23C5-C5D6-4BC3-9531-C0B2D7D29F98}"/>
+                  <a16:creationId xmlns:a16="http://schemas.microsoft.com/office/drawing/2014/main" id="{C86BB534-4617-4275-908E-357CF2246C93}"/>
                 </a:ext>
                 <a:ext uri="{C183D7F6-B498-43B3-948B-1728B52AA6E4}">
                   <adec:decorative xmlns:adec="http://schemas.microsoft.com/office/drawing/2017/decorative" val="1"/>
@@ -13316,10 +16248,10 @@
         </p:sp>
         <p:sp>
           <p:nvSpPr>
-            <p:cNvPr id="21" name="Freeform 13">
+            <p:cNvPr id="86" name="Freeform 13">
               <a:extLst>
                 <a:ext uri="{FF2B5EF4-FFF2-40B4-BE49-F238E27FC236}">
-                  <a16:creationId xmlns:a16="http://schemas.microsoft.com/office/drawing/2014/main" id="{4D3FC0A7-9672-4B19-8D54-71C3B39F7A3B}"/>
+                  <a16:creationId xmlns:a16="http://schemas.microsoft.com/office/drawing/2014/main" id="{B6DEB58B-8D28-4BE9-9CA9-F4B3A083BCF9}"/>
                 </a:ext>
                 <a:ext uri="{C183D7F6-B498-43B3-948B-1728B52AA6E4}">
                   <adec:decorative xmlns:adec="http://schemas.microsoft.com/office/drawing/2017/decorative" val="1"/>
@@ -13400,10 +16332,10 @@
         </p:sp>
         <p:sp>
           <p:nvSpPr>
-            <p:cNvPr id="22" name="Freeform 14">
+            <p:cNvPr id="87" name="Freeform 14">
               <a:extLst>
                 <a:ext uri="{FF2B5EF4-FFF2-40B4-BE49-F238E27FC236}">
-                  <a16:creationId xmlns:a16="http://schemas.microsoft.com/office/drawing/2014/main" id="{9911D04C-3FFB-4D1E-8F59-5C02692E3E98}"/>
+                  <a16:creationId xmlns:a16="http://schemas.microsoft.com/office/drawing/2014/main" id="{25A772BC-4720-4EC2-AD61-A7B74E9151F9}"/>
                 </a:ext>
                 <a:ext uri="{C183D7F6-B498-43B3-948B-1728B52AA6E4}">
                   <adec:decorative xmlns:adec="http://schemas.microsoft.com/office/drawing/2017/decorative" val="1"/>
@@ -13484,10 +16416,10 @@
         </p:sp>
         <p:sp>
           <p:nvSpPr>
-            <p:cNvPr id="23" name="Freeform 15">
+            <p:cNvPr id="88" name="Freeform 15">
               <a:extLst>
                 <a:ext uri="{FF2B5EF4-FFF2-40B4-BE49-F238E27FC236}">
-                  <a16:creationId xmlns:a16="http://schemas.microsoft.com/office/drawing/2014/main" id="{A0178C8F-EF32-4F3D-B022-60A7DE1367BD}"/>
+                  <a16:creationId xmlns:a16="http://schemas.microsoft.com/office/drawing/2014/main" id="{60D6B27E-FAC5-4267-80A9-DE4D2E02B802}"/>
                 </a:ext>
                 <a:ext uri="{C183D7F6-B498-43B3-948B-1728B52AA6E4}">
                   <adec:decorative xmlns:adec="http://schemas.microsoft.com/office/drawing/2017/decorative" val="1"/>
@@ -13596,10 +16528,10 @@
         </p:sp>
         <p:sp>
           <p:nvSpPr>
-            <p:cNvPr id="24" name="Freeform 16">
+            <p:cNvPr id="89" name="Freeform 16">
               <a:extLst>
                 <a:ext uri="{FF2B5EF4-FFF2-40B4-BE49-F238E27FC236}">
-                  <a16:creationId xmlns:a16="http://schemas.microsoft.com/office/drawing/2014/main" id="{EEB2DD25-DE0D-48CE-8218-E4EF12273A2C}"/>
+                  <a16:creationId xmlns:a16="http://schemas.microsoft.com/office/drawing/2014/main" id="{1F39FA83-D8C8-4CE3-9C62-10375FD041E3}"/>
                 </a:ext>
                 <a:ext uri="{C183D7F6-B498-43B3-948B-1728B52AA6E4}">
                   <adec:decorative xmlns:adec="http://schemas.microsoft.com/office/drawing/2017/decorative" val="1"/>
@@ -13708,10 +16640,10 @@
         </p:sp>
         <p:sp>
           <p:nvSpPr>
-            <p:cNvPr id="25" name="Freeform 17">
+            <p:cNvPr id="90" name="Freeform 17">
               <a:extLst>
                 <a:ext uri="{FF2B5EF4-FFF2-40B4-BE49-F238E27FC236}">
-                  <a16:creationId xmlns:a16="http://schemas.microsoft.com/office/drawing/2014/main" id="{13C92E55-66CB-48F7-BF28-5D8ED146BB2A}"/>
+                  <a16:creationId xmlns:a16="http://schemas.microsoft.com/office/drawing/2014/main" id="{E09B4CF3-A51F-4787-81FE-F5C79BA426CE}"/>
                 </a:ext>
                 <a:ext uri="{C183D7F6-B498-43B3-948B-1728B52AA6E4}">
                   <adec:decorative xmlns:adec="http://schemas.microsoft.com/office/drawing/2017/decorative" val="1"/>
@@ -13792,10 +16724,10 @@
         </p:sp>
         <p:sp>
           <p:nvSpPr>
-            <p:cNvPr id="26" name="Freeform 18">
+            <p:cNvPr id="91" name="Freeform 18">
               <a:extLst>
                 <a:ext uri="{FF2B5EF4-FFF2-40B4-BE49-F238E27FC236}">
-                  <a16:creationId xmlns:a16="http://schemas.microsoft.com/office/drawing/2014/main" id="{CB0B6C7B-4820-48AB-92AF-896559F00938}"/>
+                  <a16:creationId xmlns:a16="http://schemas.microsoft.com/office/drawing/2014/main" id="{6695CB35-74E4-43C0-89F5-9FDA59B3AC08}"/>
                 </a:ext>
                 <a:ext uri="{C183D7F6-B498-43B3-948B-1728B52AA6E4}">
                   <adec:decorative xmlns:adec="http://schemas.microsoft.com/office/drawing/2017/decorative" val="1"/>
@@ -13924,10 +16856,10 @@
         </p:sp>
         <p:sp>
           <p:nvSpPr>
-            <p:cNvPr id="27" name="Freeform 19">
+            <p:cNvPr id="92" name="Freeform 19">
               <a:extLst>
                 <a:ext uri="{FF2B5EF4-FFF2-40B4-BE49-F238E27FC236}">
-                  <a16:creationId xmlns:a16="http://schemas.microsoft.com/office/drawing/2014/main" id="{2018EECD-4518-458F-989E-6FCAE5AE040C}"/>
+                  <a16:creationId xmlns:a16="http://schemas.microsoft.com/office/drawing/2014/main" id="{945450CE-FB13-4C46-825F-5BB191703336}"/>
                 </a:ext>
                 <a:ext uri="{C183D7F6-B498-43B3-948B-1728B52AA6E4}">
                   <adec:decorative xmlns:adec="http://schemas.microsoft.com/office/drawing/2017/decorative" val="1"/>
@@ -14008,10 +16940,10 @@
         </p:sp>
         <p:sp>
           <p:nvSpPr>
-            <p:cNvPr id="28" name="Freeform 20">
+            <p:cNvPr id="93" name="Freeform 20">
               <a:extLst>
                 <a:ext uri="{FF2B5EF4-FFF2-40B4-BE49-F238E27FC236}">
-                  <a16:creationId xmlns:a16="http://schemas.microsoft.com/office/drawing/2014/main" id="{1FB0915F-3C52-468A-87E7-F3EE381DA3EC}"/>
+                  <a16:creationId xmlns:a16="http://schemas.microsoft.com/office/drawing/2014/main" id="{E80AA0B2-7FE7-4B75-AC25-E0F6C0FE458A}"/>
                 </a:ext>
                 <a:ext uri="{C183D7F6-B498-43B3-948B-1728B52AA6E4}">
                   <adec:decorative xmlns:adec="http://schemas.microsoft.com/office/drawing/2017/decorative" val="1"/>
@@ -14120,10 +17052,10 @@
         </p:sp>
         <p:sp>
           <p:nvSpPr>
-            <p:cNvPr id="29" name="Freeform 21">
+            <p:cNvPr id="94" name="Freeform 21">
               <a:extLst>
                 <a:ext uri="{FF2B5EF4-FFF2-40B4-BE49-F238E27FC236}">
-                  <a16:creationId xmlns:a16="http://schemas.microsoft.com/office/drawing/2014/main" id="{7B184771-5A8E-4ED5-9179-24B19F26C329}"/>
+                  <a16:creationId xmlns:a16="http://schemas.microsoft.com/office/drawing/2014/main" id="{2E81F7C1-AD8F-41A0-91A8-E05F66CB0ED2}"/>
                 </a:ext>
                 <a:ext uri="{C183D7F6-B498-43B3-948B-1728B52AA6E4}">
                   <adec:decorative xmlns:adec="http://schemas.microsoft.com/office/drawing/2017/decorative" val="1"/>
@@ -14232,10 +17164,10 @@
         </p:sp>
         <p:sp>
           <p:nvSpPr>
-            <p:cNvPr id="30" name="Freeform 22">
+            <p:cNvPr id="95" name="Freeform 22">
               <a:extLst>
                 <a:ext uri="{FF2B5EF4-FFF2-40B4-BE49-F238E27FC236}">
-                  <a16:creationId xmlns:a16="http://schemas.microsoft.com/office/drawing/2014/main" id="{BC5162D1-D64C-4FBA-BE86-11B27A7432E5}"/>
+                  <a16:creationId xmlns:a16="http://schemas.microsoft.com/office/drawing/2014/main" id="{F4E8A538-9FFA-4C76-BCE2-D54F56A1158F}"/>
                 </a:ext>
                 <a:ext uri="{C183D7F6-B498-43B3-948B-1728B52AA6E4}">
                   <adec:decorative xmlns:adec="http://schemas.microsoft.com/office/drawing/2017/decorative" val="1"/>
@@ -14316,10 +17248,10 @@
         </p:sp>
         <p:sp>
           <p:nvSpPr>
-            <p:cNvPr id="31" name="Freeform 23">
+            <p:cNvPr id="96" name="Freeform 23">
               <a:extLst>
                 <a:ext uri="{FF2B5EF4-FFF2-40B4-BE49-F238E27FC236}">
-                  <a16:creationId xmlns:a16="http://schemas.microsoft.com/office/drawing/2014/main" id="{9EFF345C-6A58-4123-B2D1-2ED9E3691247}"/>
+                  <a16:creationId xmlns:a16="http://schemas.microsoft.com/office/drawing/2014/main" id="{3C412824-3CBA-4E74-B2FD-936EA704869B}"/>
                 </a:ext>
                 <a:ext uri="{C183D7F6-B498-43B3-948B-1728B52AA6E4}">
                   <adec:decorative xmlns:adec="http://schemas.microsoft.com/office/drawing/2017/decorative" val="1"/>
@@ -14428,10 +17360,10 @@
         </p:sp>
         <p:sp>
           <p:nvSpPr>
-            <p:cNvPr id="32" name="Freeform 24">
+            <p:cNvPr id="97" name="Freeform 24">
               <a:extLst>
                 <a:ext uri="{FF2B5EF4-FFF2-40B4-BE49-F238E27FC236}">
-                  <a16:creationId xmlns:a16="http://schemas.microsoft.com/office/drawing/2014/main" id="{03CE89F7-AE1C-4370-920E-EE04C4124FF1}"/>
+                  <a16:creationId xmlns:a16="http://schemas.microsoft.com/office/drawing/2014/main" id="{E28DC1F0-74FF-4D97-BD4D-FD42DE4AC6D7}"/>
                 </a:ext>
                 <a:ext uri="{C183D7F6-B498-43B3-948B-1728B52AA6E4}">
                   <adec:decorative xmlns:adec="http://schemas.microsoft.com/office/drawing/2017/decorative" val="1"/>
@@ -14540,10 +17472,10 @@
         </p:sp>
         <p:sp>
           <p:nvSpPr>
-            <p:cNvPr id="33" name="Freeform 25">
+            <p:cNvPr id="98" name="Freeform 25">
               <a:extLst>
                 <a:ext uri="{FF2B5EF4-FFF2-40B4-BE49-F238E27FC236}">
-                  <a16:creationId xmlns:a16="http://schemas.microsoft.com/office/drawing/2014/main" id="{D6E298F6-F99D-49EF-B614-24D2179C23D4}"/>
+                  <a16:creationId xmlns:a16="http://schemas.microsoft.com/office/drawing/2014/main" id="{77CEC4FA-6FD3-4ABF-BF98-94E7947A556B}"/>
                 </a:ext>
                 <a:ext uri="{C183D7F6-B498-43B3-948B-1728B52AA6E4}">
                   <adec:decorative xmlns:adec="http://schemas.microsoft.com/office/drawing/2017/decorative" val="1"/>
@@ -14618,10 +17550,10 @@
         </p:sp>
         <p:sp>
           <p:nvSpPr>
-            <p:cNvPr id="34" name="Freeform 26">
+            <p:cNvPr id="99" name="Freeform 26">
               <a:extLst>
                 <a:ext uri="{FF2B5EF4-FFF2-40B4-BE49-F238E27FC236}">
-                  <a16:creationId xmlns:a16="http://schemas.microsoft.com/office/drawing/2014/main" id="{2424FD35-451D-468C-9EB2-8DA350C12475}"/>
+                  <a16:creationId xmlns:a16="http://schemas.microsoft.com/office/drawing/2014/main" id="{D4E61DA7-BFA9-48AF-BD6F-EBB15C235934}"/>
                 </a:ext>
                 <a:ext uri="{C183D7F6-B498-43B3-948B-1728B52AA6E4}">
                   <adec:decorative xmlns:adec="http://schemas.microsoft.com/office/drawing/2017/decorative" val="1"/>
@@ -14730,10 +17662,10 @@
         </p:sp>
         <p:sp>
           <p:nvSpPr>
-            <p:cNvPr id="35" name="Freeform 27">
+            <p:cNvPr id="100" name="Freeform 27">
               <a:extLst>
                 <a:ext uri="{FF2B5EF4-FFF2-40B4-BE49-F238E27FC236}">
-                  <a16:creationId xmlns:a16="http://schemas.microsoft.com/office/drawing/2014/main" id="{45BC0C6F-B91F-42CC-9046-522FE8223CBC}"/>
+                  <a16:creationId xmlns:a16="http://schemas.microsoft.com/office/drawing/2014/main" id="{57164D6A-1DD9-43AE-878F-A413DC26FB10}"/>
                 </a:ext>
                 <a:ext uri="{C183D7F6-B498-43B3-948B-1728B52AA6E4}">
                   <adec:decorative xmlns:adec="http://schemas.microsoft.com/office/drawing/2017/decorative" val="1"/>
@@ -14808,10 +17740,10 @@
         </p:sp>
         <p:sp>
           <p:nvSpPr>
-            <p:cNvPr id="36" name="Freeform 28">
+            <p:cNvPr id="101" name="Freeform 28">
               <a:extLst>
                 <a:ext uri="{FF2B5EF4-FFF2-40B4-BE49-F238E27FC236}">
-                  <a16:creationId xmlns:a16="http://schemas.microsoft.com/office/drawing/2014/main" id="{F88AFBEE-A8B5-4B18-B834-5269F6C13C07}"/>
+                  <a16:creationId xmlns:a16="http://schemas.microsoft.com/office/drawing/2014/main" id="{4949EBA6-53D9-4F2D-91DB-EA7AE260F63A}"/>
                 </a:ext>
                 <a:ext uri="{C183D7F6-B498-43B3-948B-1728B52AA6E4}">
                   <adec:decorative xmlns:adec="http://schemas.microsoft.com/office/drawing/2017/decorative" val="1"/>
@@ -14920,10 +17852,10 @@
         </p:sp>
         <p:sp>
           <p:nvSpPr>
-            <p:cNvPr id="37" name="Freeform 29">
+            <p:cNvPr id="102" name="Freeform 29">
               <a:extLst>
                 <a:ext uri="{FF2B5EF4-FFF2-40B4-BE49-F238E27FC236}">
-                  <a16:creationId xmlns:a16="http://schemas.microsoft.com/office/drawing/2014/main" id="{64B0F493-EC69-4C85-87D4-287628231128}"/>
+                  <a16:creationId xmlns:a16="http://schemas.microsoft.com/office/drawing/2014/main" id="{0AFEA5FA-F759-441C-A0BC-7EDC79A67297}"/>
                 </a:ext>
                 <a:ext uri="{C183D7F6-B498-43B3-948B-1728B52AA6E4}">
                   <adec:decorative xmlns:adec="http://schemas.microsoft.com/office/drawing/2017/decorative" val="1"/>
@@ -15010,10 +17942,10 @@
         </p:sp>
         <p:sp>
           <p:nvSpPr>
-            <p:cNvPr id="38" name="Freeform 30">
+            <p:cNvPr id="103" name="Freeform 30">
               <a:extLst>
                 <a:ext uri="{FF2B5EF4-FFF2-40B4-BE49-F238E27FC236}">
-                  <a16:creationId xmlns:a16="http://schemas.microsoft.com/office/drawing/2014/main" id="{09920E7F-979C-40F6-8FB1-791325A4A448}"/>
+                  <a16:creationId xmlns:a16="http://schemas.microsoft.com/office/drawing/2014/main" id="{5B913AE0-5DC8-4244-8C26-ED97F834E33A}"/>
                 </a:ext>
                 <a:ext uri="{C183D7F6-B498-43B3-948B-1728B52AA6E4}">
                   <adec:decorative xmlns:adec="http://schemas.microsoft.com/office/drawing/2017/decorative" val="1"/>
@@ -15122,10 +18054,10 @@
         </p:sp>
         <p:sp>
           <p:nvSpPr>
-            <p:cNvPr id="39" name="Freeform 31">
+            <p:cNvPr id="104" name="Freeform 31">
               <a:extLst>
                 <a:ext uri="{FF2B5EF4-FFF2-40B4-BE49-F238E27FC236}">
-                  <a16:creationId xmlns:a16="http://schemas.microsoft.com/office/drawing/2014/main" id="{1387BCC3-D7BF-443E-B18C-87B696E64428}"/>
+                  <a16:creationId xmlns:a16="http://schemas.microsoft.com/office/drawing/2014/main" id="{A87DB58A-25D2-46F1-85E3-06F964D01678}"/>
                 </a:ext>
                 <a:ext uri="{C183D7F6-B498-43B3-948B-1728B52AA6E4}">
                   <adec:decorative xmlns:adec="http://schemas.microsoft.com/office/drawing/2017/decorative" val="1"/>
@@ -15212,10 +18144,10 @@
         </p:sp>
         <p:sp>
           <p:nvSpPr>
-            <p:cNvPr id="40" name="Freeform 32">
+            <p:cNvPr id="105" name="Freeform 32">
               <a:extLst>
                 <a:ext uri="{FF2B5EF4-FFF2-40B4-BE49-F238E27FC236}">
-                  <a16:creationId xmlns:a16="http://schemas.microsoft.com/office/drawing/2014/main" id="{F1C0670D-9FA2-48D7-AFDB-4438ECC3EE19}"/>
+                  <a16:creationId xmlns:a16="http://schemas.microsoft.com/office/drawing/2014/main" id="{E7AE8209-F3E7-4ACA-98D0-90B282A147F3}"/>
                 </a:ext>
                 <a:ext uri="{C183D7F6-B498-43B3-948B-1728B52AA6E4}">
                   <adec:decorative xmlns:adec="http://schemas.microsoft.com/office/drawing/2017/decorative" val="1"/>
@@ -15324,10 +18256,10 @@
         </p:sp>
         <p:sp>
           <p:nvSpPr>
-            <p:cNvPr id="41" name="Rectangle 33">
+            <p:cNvPr id="106" name="Rectangle 33">
               <a:extLst>
                 <a:ext uri="{FF2B5EF4-FFF2-40B4-BE49-F238E27FC236}">
-                  <a16:creationId xmlns:a16="http://schemas.microsoft.com/office/drawing/2014/main" id="{34088C0C-CAD1-4E66-A162-1D7020365B6A}"/>
+                  <a16:creationId xmlns:a16="http://schemas.microsoft.com/office/drawing/2014/main" id="{1CED7927-A7C7-444A-A8F3-6348852AEFB1}"/>
                 </a:ext>
                 <a:ext uri="{C183D7F6-B498-43B3-948B-1728B52AA6E4}">
                   <adec:decorative xmlns:adec="http://schemas.microsoft.com/office/drawing/2017/decorative" val="1"/>
@@ -15380,10 +18312,10 @@
         </p:sp>
         <p:sp>
           <p:nvSpPr>
-            <p:cNvPr id="42" name="Freeform 34">
+            <p:cNvPr id="107" name="Freeform 34">
               <a:extLst>
                 <a:ext uri="{FF2B5EF4-FFF2-40B4-BE49-F238E27FC236}">
-                  <a16:creationId xmlns:a16="http://schemas.microsoft.com/office/drawing/2014/main" id="{B8C224A6-72B4-4763-B708-65A321D0D619}"/>
+                  <a16:creationId xmlns:a16="http://schemas.microsoft.com/office/drawing/2014/main" id="{08BEDF90-F9A6-4DE4-94B6-43E41603948F}"/>
                 </a:ext>
                 <a:ext uri="{C183D7F6-B498-43B3-948B-1728B52AA6E4}">
                   <adec:decorative xmlns:adec="http://schemas.microsoft.com/office/drawing/2017/decorative" val="1"/>
@@ -15492,10 +18424,10 @@
         </p:sp>
         <p:sp>
           <p:nvSpPr>
-            <p:cNvPr id="43" name="Freeform 35">
+            <p:cNvPr id="108" name="Freeform 35">
               <a:extLst>
                 <a:ext uri="{FF2B5EF4-FFF2-40B4-BE49-F238E27FC236}">
-                  <a16:creationId xmlns:a16="http://schemas.microsoft.com/office/drawing/2014/main" id="{2EE3A964-523C-470B-8B10-09053452C55C}"/>
+                  <a16:creationId xmlns:a16="http://schemas.microsoft.com/office/drawing/2014/main" id="{36540D5F-1C77-438A-BF12-56455C472008}"/>
                 </a:ext>
                 <a:ext uri="{C183D7F6-B498-43B3-948B-1728B52AA6E4}">
                   <adec:decorative xmlns:adec="http://schemas.microsoft.com/office/drawing/2017/decorative" val="1"/>
@@ -15576,10 +18508,10 @@
         </p:sp>
         <p:sp>
           <p:nvSpPr>
-            <p:cNvPr id="44" name="Freeform 36">
+            <p:cNvPr id="109" name="Freeform 36">
               <a:extLst>
                 <a:ext uri="{FF2B5EF4-FFF2-40B4-BE49-F238E27FC236}">
-                  <a16:creationId xmlns:a16="http://schemas.microsoft.com/office/drawing/2014/main" id="{1B87487E-C0EA-4E2A-8FC0-3D4C4F017757}"/>
+                  <a16:creationId xmlns:a16="http://schemas.microsoft.com/office/drawing/2014/main" id="{52FC779A-BC55-40AC-8FFD-E014F8C051CB}"/>
                 </a:ext>
                 <a:ext uri="{C183D7F6-B498-43B3-948B-1728B52AA6E4}">
                   <adec:decorative xmlns:adec="http://schemas.microsoft.com/office/drawing/2017/decorative" val="1"/>
@@ -15660,10 +18592,10 @@
         </p:sp>
         <p:sp>
           <p:nvSpPr>
-            <p:cNvPr id="45" name="Freeform 37">
+            <p:cNvPr id="110" name="Freeform 37">
               <a:extLst>
                 <a:ext uri="{FF2B5EF4-FFF2-40B4-BE49-F238E27FC236}">
-                  <a16:creationId xmlns:a16="http://schemas.microsoft.com/office/drawing/2014/main" id="{D8B57E7E-D885-4A0B-BBA0-E3BC3A68CDE1}"/>
+                  <a16:creationId xmlns:a16="http://schemas.microsoft.com/office/drawing/2014/main" id="{63E42DE5-DC0E-4043-8A35-20C53074A2B9}"/>
                 </a:ext>
                 <a:ext uri="{C183D7F6-B498-43B3-948B-1728B52AA6E4}">
                   <adec:decorative xmlns:adec="http://schemas.microsoft.com/office/drawing/2017/decorative" val="1"/>
@@ -15772,10 +18704,10 @@
         </p:sp>
         <p:sp>
           <p:nvSpPr>
-            <p:cNvPr id="46" name="Freeform 38">
+            <p:cNvPr id="111" name="Freeform 38">
               <a:extLst>
                 <a:ext uri="{FF2B5EF4-FFF2-40B4-BE49-F238E27FC236}">
-                  <a16:creationId xmlns:a16="http://schemas.microsoft.com/office/drawing/2014/main" id="{6FB84573-B84B-4571-A6E5-91CD308E7DAC}"/>
+                  <a16:creationId xmlns:a16="http://schemas.microsoft.com/office/drawing/2014/main" id="{41581FA6-993A-4899-ADF1-0A83A6234EBC}"/>
                 </a:ext>
                 <a:ext uri="{C183D7F6-B498-43B3-948B-1728B52AA6E4}">
                   <adec:decorative xmlns:adec="http://schemas.microsoft.com/office/drawing/2017/decorative" val="1"/>
@@ -15862,10 +18794,10 @@
         </p:sp>
         <p:sp>
           <p:nvSpPr>
-            <p:cNvPr id="47" name="Freeform 39">
+            <p:cNvPr id="112" name="Freeform 39">
               <a:extLst>
                 <a:ext uri="{FF2B5EF4-FFF2-40B4-BE49-F238E27FC236}">
-                  <a16:creationId xmlns:a16="http://schemas.microsoft.com/office/drawing/2014/main" id="{7EE5EE00-E139-4AB9-ACFC-5E39CFA9519A}"/>
+                  <a16:creationId xmlns:a16="http://schemas.microsoft.com/office/drawing/2014/main" id="{33C4FDB9-01D2-4CB0-BFED-216CAC7EB838}"/>
                 </a:ext>
                 <a:ext uri="{C183D7F6-B498-43B3-948B-1728B52AA6E4}">
                   <adec:decorative xmlns:adec="http://schemas.microsoft.com/office/drawing/2017/decorative" val="1"/>
@@ -15946,10 +18878,10 @@
         </p:sp>
         <p:sp>
           <p:nvSpPr>
-            <p:cNvPr id="48" name="Freeform 40">
+            <p:cNvPr id="113" name="Freeform 40">
               <a:extLst>
                 <a:ext uri="{FF2B5EF4-FFF2-40B4-BE49-F238E27FC236}">
-                  <a16:creationId xmlns:a16="http://schemas.microsoft.com/office/drawing/2014/main" id="{5A38A6AA-6753-4EFE-94BB-96DF739758C4}"/>
+                  <a16:creationId xmlns:a16="http://schemas.microsoft.com/office/drawing/2014/main" id="{34E715AB-2B68-41C4-A61F-02C413F242EE}"/>
                 </a:ext>
                 <a:ext uri="{C183D7F6-B498-43B3-948B-1728B52AA6E4}">
                   <adec:decorative xmlns:adec="http://schemas.microsoft.com/office/drawing/2017/decorative" val="1"/>
@@ -16058,10 +18990,10 @@
         </p:sp>
         <p:sp>
           <p:nvSpPr>
-            <p:cNvPr id="49" name="Freeform 41">
+            <p:cNvPr id="114" name="Freeform 41">
               <a:extLst>
                 <a:ext uri="{FF2B5EF4-FFF2-40B4-BE49-F238E27FC236}">
-                  <a16:creationId xmlns:a16="http://schemas.microsoft.com/office/drawing/2014/main" id="{506AB599-570B-4547-97F4-F2C6723014A0}"/>
+                  <a16:creationId xmlns:a16="http://schemas.microsoft.com/office/drawing/2014/main" id="{D3861C35-D060-408D-9871-4DA2D0547BB3}"/>
                 </a:ext>
                 <a:ext uri="{C183D7F6-B498-43B3-948B-1728B52AA6E4}">
                   <adec:decorative xmlns:adec="http://schemas.microsoft.com/office/drawing/2017/decorative" val="1"/>
@@ -16142,10 +19074,10 @@
         </p:sp>
         <p:sp>
           <p:nvSpPr>
-            <p:cNvPr id="50" name="Freeform 42">
+            <p:cNvPr id="115" name="Freeform 42">
               <a:extLst>
                 <a:ext uri="{FF2B5EF4-FFF2-40B4-BE49-F238E27FC236}">
-                  <a16:creationId xmlns:a16="http://schemas.microsoft.com/office/drawing/2014/main" id="{9AFDEA1E-DBAB-4507-8D36-786F19A85BA5}"/>
+                  <a16:creationId xmlns:a16="http://schemas.microsoft.com/office/drawing/2014/main" id="{B4F4F38F-33FE-48A0-986D-FB771F18BE7F}"/>
                 </a:ext>
                 <a:ext uri="{C183D7F6-B498-43B3-948B-1728B52AA6E4}">
                   <adec:decorative xmlns:adec="http://schemas.microsoft.com/office/drawing/2017/decorative" val="1"/>
@@ -16254,10 +19186,10 @@
         </p:sp>
         <p:sp>
           <p:nvSpPr>
-            <p:cNvPr id="51" name="Freeform 43">
+            <p:cNvPr id="116" name="Freeform 43">
               <a:extLst>
                 <a:ext uri="{FF2B5EF4-FFF2-40B4-BE49-F238E27FC236}">
-                  <a16:creationId xmlns:a16="http://schemas.microsoft.com/office/drawing/2014/main" id="{C824D6F7-0BDF-4C8C-869D-BDDEB076418E}"/>
+                  <a16:creationId xmlns:a16="http://schemas.microsoft.com/office/drawing/2014/main" id="{50FCFC8E-2DC3-4F27-9E02-196830E78D1E}"/>
                 </a:ext>
                 <a:ext uri="{C183D7F6-B498-43B3-948B-1728B52AA6E4}">
                   <adec:decorative xmlns:adec="http://schemas.microsoft.com/office/drawing/2017/decorative" val="1"/>
@@ -16338,10 +19270,10 @@
         </p:sp>
         <p:sp>
           <p:nvSpPr>
-            <p:cNvPr id="52" name="Freeform 44">
+            <p:cNvPr id="117" name="Freeform 44">
               <a:extLst>
                 <a:ext uri="{FF2B5EF4-FFF2-40B4-BE49-F238E27FC236}">
-                  <a16:creationId xmlns:a16="http://schemas.microsoft.com/office/drawing/2014/main" id="{6953C491-AE0F-4D2B-9474-18D5E8B5DC99}"/>
+                  <a16:creationId xmlns:a16="http://schemas.microsoft.com/office/drawing/2014/main" id="{3A6EE414-1500-4144-B453-BA950E5107E9}"/>
                 </a:ext>
                 <a:ext uri="{C183D7F6-B498-43B3-948B-1728B52AA6E4}">
                   <adec:decorative xmlns:adec="http://schemas.microsoft.com/office/drawing/2017/decorative" val="1"/>
@@ -16450,10 +19382,10 @@
         </p:sp>
         <p:sp>
           <p:nvSpPr>
-            <p:cNvPr id="53" name="Rectangle 45">
+            <p:cNvPr id="118" name="Rectangle 45">
               <a:extLst>
                 <a:ext uri="{FF2B5EF4-FFF2-40B4-BE49-F238E27FC236}">
-                  <a16:creationId xmlns:a16="http://schemas.microsoft.com/office/drawing/2014/main" id="{5B956350-9BDD-4090-B2B6-12C13D1CE272}"/>
+                  <a16:creationId xmlns:a16="http://schemas.microsoft.com/office/drawing/2014/main" id="{0C1A9D8A-5515-4C84-AE17-A6D51243834B}"/>
                 </a:ext>
                 <a:ext uri="{C183D7F6-B498-43B3-948B-1728B52AA6E4}">
                   <adec:decorative xmlns:adec="http://schemas.microsoft.com/office/drawing/2017/decorative" val="1"/>
@@ -16506,10 +19438,10 @@
         </p:sp>
         <p:sp>
           <p:nvSpPr>
-            <p:cNvPr id="54" name="Freeform 46">
+            <p:cNvPr id="119" name="Freeform 46">
               <a:extLst>
                 <a:ext uri="{FF2B5EF4-FFF2-40B4-BE49-F238E27FC236}">
-                  <a16:creationId xmlns:a16="http://schemas.microsoft.com/office/drawing/2014/main" id="{ECE31E80-E354-44C3-81E0-4E3E41DDF6F8}"/>
+                  <a16:creationId xmlns:a16="http://schemas.microsoft.com/office/drawing/2014/main" id="{E8E7C8C7-FE85-4C8F-960C-3748511E089C}"/>
                 </a:ext>
                 <a:ext uri="{C183D7F6-B498-43B3-948B-1728B52AA6E4}">
                   <adec:decorative xmlns:adec="http://schemas.microsoft.com/office/drawing/2017/decorative" val="1"/>
@@ -16593,10 +19525,10 @@
         </p:sp>
         <p:sp>
           <p:nvSpPr>
-            <p:cNvPr id="55" name="Freeform 47">
+            <p:cNvPr id="120" name="Freeform 47">
               <a:extLst>
                 <a:ext uri="{FF2B5EF4-FFF2-40B4-BE49-F238E27FC236}">
-                  <a16:creationId xmlns:a16="http://schemas.microsoft.com/office/drawing/2014/main" id="{9DFA35DB-5360-405A-A7EB-064E51FBC0A4}"/>
+                  <a16:creationId xmlns:a16="http://schemas.microsoft.com/office/drawing/2014/main" id="{33DF2ED7-F601-4A9F-AA50-822ED85D560C}"/>
                 </a:ext>
                 <a:ext uri="{C183D7F6-B498-43B3-948B-1728B52AA6E4}">
                   <adec:decorative xmlns:adec="http://schemas.microsoft.com/office/drawing/2017/decorative" val="1"/>
@@ -16705,10 +19637,10 @@
         </p:sp>
         <p:sp>
           <p:nvSpPr>
-            <p:cNvPr id="56" name="Freeform 48">
+            <p:cNvPr id="121" name="Freeform 48">
               <a:extLst>
                 <a:ext uri="{FF2B5EF4-FFF2-40B4-BE49-F238E27FC236}">
-                  <a16:creationId xmlns:a16="http://schemas.microsoft.com/office/drawing/2014/main" id="{2DA499BD-4313-4AD1-BE87-4BEF50FECB61}"/>
+                  <a16:creationId xmlns:a16="http://schemas.microsoft.com/office/drawing/2014/main" id="{FEDB3A05-6FDD-4E87-B800-8F997524443B}"/>
                 </a:ext>
                 <a:ext uri="{C183D7F6-B498-43B3-948B-1728B52AA6E4}">
                   <adec:decorative xmlns:adec="http://schemas.microsoft.com/office/drawing/2017/decorative" val="1"/>
@@ -16789,10 +19721,10 @@
         </p:sp>
         <p:sp>
           <p:nvSpPr>
-            <p:cNvPr id="57" name="Freeform 49">
+            <p:cNvPr id="122" name="Freeform 49">
               <a:extLst>
                 <a:ext uri="{FF2B5EF4-FFF2-40B4-BE49-F238E27FC236}">
-                  <a16:creationId xmlns:a16="http://schemas.microsoft.com/office/drawing/2014/main" id="{680E4C6D-12D1-417A-A709-EC416D98FA05}"/>
+                  <a16:creationId xmlns:a16="http://schemas.microsoft.com/office/drawing/2014/main" id="{AD6225C0-E391-49D5-9A7B-57C5ED60E1AB}"/>
                 </a:ext>
                 <a:ext uri="{C183D7F6-B498-43B3-948B-1728B52AA6E4}">
                   <adec:decorative xmlns:adec="http://schemas.microsoft.com/office/drawing/2017/decorative" val="1"/>
@@ -16901,10 +19833,10 @@
         </p:sp>
         <p:sp>
           <p:nvSpPr>
-            <p:cNvPr id="58" name="Freeform 50">
+            <p:cNvPr id="123" name="Freeform 50">
               <a:extLst>
                 <a:ext uri="{FF2B5EF4-FFF2-40B4-BE49-F238E27FC236}">
-                  <a16:creationId xmlns:a16="http://schemas.microsoft.com/office/drawing/2014/main" id="{C93537B4-09B6-4CC6-92DE-3D3BDAC7ABB9}"/>
+                  <a16:creationId xmlns:a16="http://schemas.microsoft.com/office/drawing/2014/main" id="{B814B458-45E5-451C-9CBD-027E3776A4EE}"/>
                 </a:ext>
                 <a:ext uri="{C183D7F6-B498-43B3-948B-1728B52AA6E4}">
                   <adec:decorative xmlns:adec="http://schemas.microsoft.com/office/drawing/2017/decorative" val="1"/>
@@ -17013,10 +19945,10 @@
         </p:sp>
         <p:sp>
           <p:nvSpPr>
-            <p:cNvPr id="59" name="Freeform 51">
+            <p:cNvPr id="124" name="Freeform 51">
               <a:extLst>
                 <a:ext uri="{FF2B5EF4-FFF2-40B4-BE49-F238E27FC236}">
-                  <a16:creationId xmlns:a16="http://schemas.microsoft.com/office/drawing/2014/main" id="{5D100FC5-9EA8-4DA7-AFA4-BC60831FD874}"/>
+                  <a16:creationId xmlns:a16="http://schemas.microsoft.com/office/drawing/2014/main" id="{59167140-9A0D-4FE7-8E37-2CD613011696}"/>
                 </a:ext>
                 <a:ext uri="{C183D7F6-B498-43B3-948B-1728B52AA6E4}">
                   <adec:decorative xmlns:adec="http://schemas.microsoft.com/office/drawing/2017/decorative" val="1"/>
@@ -17100,10 +20032,10 @@
         </p:sp>
         <p:sp>
           <p:nvSpPr>
-            <p:cNvPr id="60" name="Freeform 52">
+            <p:cNvPr id="125" name="Freeform 52">
               <a:extLst>
                 <a:ext uri="{FF2B5EF4-FFF2-40B4-BE49-F238E27FC236}">
-                  <a16:creationId xmlns:a16="http://schemas.microsoft.com/office/drawing/2014/main" id="{3F10D757-6A3B-4314-9755-419B3738E47E}"/>
+                  <a16:creationId xmlns:a16="http://schemas.microsoft.com/office/drawing/2014/main" id="{2D38B213-991B-495D-8886-04CAD44C79B1}"/>
                 </a:ext>
                 <a:ext uri="{C183D7F6-B498-43B3-948B-1728B52AA6E4}">
                   <adec:decorative xmlns:adec="http://schemas.microsoft.com/office/drawing/2017/decorative" val="1"/>
@@ -17184,10 +20116,10 @@
         </p:sp>
         <p:sp>
           <p:nvSpPr>
-            <p:cNvPr id="61" name="Freeform 53">
+            <p:cNvPr id="126" name="Freeform 53">
               <a:extLst>
                 <a:ext uri="{FF2B5EF4-FFF2-40B4-BE49-F238E27FC236}">
-                  <a16:creationId xmlns:a16="http://schemas.microsoft.com/office/drawing/2014/main" id="{28A4D881-D08B-4AAF-866D-7C31601126DF}"/>
+                  <a16:creationId xmlns:a16="http://schemas.microsoft.com/office/drawing/2014/main" id="{67C1C3DA-3972-4D98-9D9E-390461B28877}"/>
                 </a:ext>
                 <a:ext uri="{C183D7F6-B498-43B3-948B-1728B52AA6E4}">
                   <adec:decorative xmlns:adec="http://schemas.microsoft.com/office/drawing/2017/decorative" val="1"/>
@@ -17296,10 +20228,10 @@
         </p:sp>
         <p:sp>
           <p:nvSpPr>
-            <p:cNvPr id="62" name="Freeform 54">
+            <p:cNvPr id="127" name="Freeform 54">
               <a:extLst>
                 <a:ext uri="{FF2B5EF4-FFF2-40B4-BE49-F238E27FC236}">
-                  <a16:creationId xmlns:a16="http://schemas.microsoft.com/office/drawing/2014/main" id="{A666F3F8-571E-483F-9B9F-31EDB91A9C6B}"/>
+                  <a16:creationId xmlns:a16="http://schemas.microsoft.com/office/drawing/2014/main" id="{972F8941-61DB-48E1-B9C1-E732470563E1}"/>
                 </a:ext>
                 <a:ext uri="{C183D7F6-B498-43B3-948B-1728B52AA6E4}">
                   <adec:decorative xmlns:adec="http://schemas.microsoft.com/office/drawing/2017/decorative" val="1"/>
@@ -17408,10 +20340,10 @@
         </p:sp>
         <p:sp>
           <p:nvSpPr>
-            <p:cNvPr id="63" name="Freeform 55">
+            <p:cNvPr id="128" name="Freeform 55">
               <a:extLst>
                 <a:ext uri="{FF2B5EF4-FFF2-40B4-BE49-F238E27FC236}">
-                  <a16:creationId xmlns:a16="http://schemas.microsoft.com/office/drawing/2014/main" id="{18305C0F-0A00-450D-92A1-313C724398CD}"/>
+                  <a16:creationId xmlns:a16="http://schemas.microsoft.com/office/drawing/2014/main" id="{857B495F-5C9B-435F-8D39-45CC57471F94}"/>
                 </a:ext>
                 <a:ext uri="{C183D7F6-B498-43B3-948B-1728B52AA6E4}">
                   <adec:decorative xmlns:adec="http://schemas.microsoft.com/office/drawing/2017/decorative" val="1"/>
@@ -17492,10 +20424,10 @@
         </p:sp>
         <p:sp>
           <p:nvSpPr>
-            <p:cNvPr id="64" name="Freeform 56">
+            <p:cNvPr id="129" name="Freeform 56">
               <a:extLst>
                 <a:ext uri="{FF2B5EF4-FFF2-40B4-BE49-F238E27FC236}">
-                  <a16:creationId xmlns:a16="http://schemas.microsoft.com/office/drawing/2014/main" id="{9A5635D8-CCB7-4D16-BB87-B1BC1AC97DCE}"/>
+                  <a16:creationId xmlns:a16="http://schemas.microsoft.com/office/drawing/2014/main" id="{B607428B-B7C9-4017-84F8-19C9B2134A95}"/>
                 </a:ext>
                 <a:ext uri="{C183D7F6-B498-43B3-948B-1728B52AA6E4}">
                   <adec:decorative xmlns:adec="http://schemas.microsoft.com/office/drawing/2017/decorative" val="1"/>
@@ -17634,10 +20566,10 @@
         </p:sp>
         <p:sp>
           <p:nvSpPr>
-            <p:cNvPr id="65" name="Freeform 57">
+            <p:cNvPr id="130" name="Freeform 57">
               <a:extLst>
                 <a:ext uri="{FF2B5EF4-FFF2-40B4-BE49-F238E27FC236}">
-                  <a16:creationId xmlns:a16="http://schemas.microsoft.com/office/drawing/2014/main" id="{7C10A784-B5EE-4486-96E7-3CC72B93AE2D}"/>
+                  <a16:creationId xmlns:a16="http://schemas.microsoft.com/office/drawing/2014/main" id="{A20C5139-2108-4F5E-B892-64F1D8605EF9}"/>
                 </a:ext>
                 <a:ext uri="{C183D7F6-B498-43B3-948B-1728B52AA6E4}">
                   <adec:decorative xmlns:adec="http://schemas.microsoft.com/office/drawing/2017/decorative" val="1"/>
@@ -17724,10 +20656,10 @@
         </p:sp>
         <p:sp>
           <p:nvSpPr>
-            <p:cNvPr id="66" name="Freeform 58">
+            <p:cNvPr id="131" name="Freeform 58">
               <a:extLst>
                 <a:ext uri="{FF2B5EF4-FFF2-40B4-BE49-F238E27FC236}">
-                  <a16:creationId xmlns:a16="http://schemas.microsoft.com/office/drawing/2014/main" id="{AE5FA7CA-916C-4A34-A727-E0289D891AB4}"/>
+                  <a16:creationId xmlns:a16="http://schemas.microsoft.com/office/drawing/2014/main" id="{C2A51623-F2F3-4584-93F5-598E56A5F4DE}"/>
                 </a:ext>
                 <a:ext uri="{C183D7F6-B498-43B3-948B-1728B52AA6E4}">
                   <adec:decorative xmlns:adec="http://schemas.microsoft.com/office/drawing/2017/decorative" val="1"/>
@@ -17835,76 +20767,48 @@
           </p:txBody>
         </p:sp>
       </p:grpSp>
-      <p:pic>
-        <p:nvPicPr>
-          <p:cNvPr id="68" name="Picture 2">
+    </p:spTree>
+    <p:extLst>
+      <p:ext uri="{BB962C8B-B14F-4D97-AF65-F5344CB8AC3E}">
+        <p14:creationId xmlns:p14="http://schemas.microsoft.com/office/powerpoint/2010/main" val="1169857960"/>
+      </p:ext>
+    </p:extLst>
+  </p:cSld>
+  <p:clrMapOvr>
+    <a:masterClrMapping/>
+  </p:clrMapOvr>
+</p:sld>
+</file>
+
+<file path=ppt/slides/slide10.xml><?xml version="1.0" encoding="utf-8"?>
+<p:sld xmlns:a="http://schemas.openxmlformats.org/drawingml/2006/main" xmlns:r="http://schemas.openxmlformats.org/officeDocument/2006/relationships" xmlns:p="http://schemas.openxmlformats.org/presentationml/2006/main">
+  <p:cSld>
+    <p:spTree>
+      <p:nvGrpSpPr>
+        <p:cNvPr id="1" name="">
+          <a:extLst>
+            <a:ext uri="{FF2B5EF4-FFF2-40B4-BE49-F238E27FC236}">
+              <a16:creationId xmlns:a16="http://schemas.microsoft.com/office/drawing/2014/main" id="{6109FFA6-0B1C-46C6-5310-06EA3668F00A}"/>
+            </a:ext>
+          </a:extLst>
+        </p:cNvPr>
+        <p:cNvGrpSpPr/>
+        <p:nvPr/>
+      </p:nvGrpSpPr>
+      <p:grpSpPr>
+        <a:xfrm>
+          <a:off x="0" y="0"/>
+          <a:ext cx="0" cy="0"/>
+          <a:chOff x="0" y="0"/>
+          <a:chExt cx="0" cy="0"/>
+        </a:xfrm>
+      </p:grpSpPr>
+      <p:sp>
+        <p:nvSpPr>
+          <p:cNvPr id="2" name="Title 1">
             <a:extLst>
               <a:ext uri="{FF2B5EF4-FFF2-40B4-BE49-F238E27FC236}">
-                <a16:creationId xmlns:a16="http://schemas.microsoft.com/office/drawing/2014/main" id="{51039561-92F9-40EE-900B-6AA0F58042A4}"/>
-              </a:ext>
-              <a:ext uri="{C183D7F6-B498-43B3-948B-1728B52AA6E4}">
-                <adec:decorative xmlns:adec="http://schemas.microsoft.com/office/drawing/2017/decorative" val="1"/>
-              </a:ext>
-            </a:extLst>
-          </p:cNvPr>
-          <p:cNvPicPr>
-            <a:picLocks noGrp="1" noRot="1" noChangeAspect="1" noMove="1" noResize="1" noEditPoints="1" noAdjustHandles="1" noChangeArrowheads="1" noChangeShapeType="1" noCrop="1"/>
-          </p:cNvPicPr>
-          <p:nvPr>
-            <p:extLst>
-              <p:ext uri="{386F3935-93C4-4BCD-93E2-E3B085C9AB24}">
-                <p16:designElem xmlns:p16="http://schemas.microsoft.com/office/powerpoint/2015/main" val="1"/>
-              </p:ext>
-            </p:extLst>
-          </p:nvPr>
-        </p:nvPicPr>
-        <p:blipFill>
-          <a:blip r:embed="rId2">
-            <a:alphaModFix amt="30000"/>
-            <a:duotone>
-              <a:prstClr val="black"/>
-              <a:schemeClr val="tx2">
-                <a:tint val="45000"/>
-                <a:satMod val="400000"/>
-              </a:schemeClr>
-            </a:duotone>
-            <a:extLst>
-              <a:ext uri="{28A0092B-C50C-407E-A947-70E740481C1C}">
-                <a14:useLocalDpi xmlns:a14="http://schemas.microsoft.com/office/drawing/2010/main" val="0"/>
-              </a:ext>
-            </a:extLst>
-          </a:blip>
-          <a:srcRect/>
-          <a:stretch>
-            <a:fillRect/>
-          </a:stretch>
-        </p:blipFill>
-        <p:spPr bwMode="auto">
-          <a:xfrm>
-            <a:off x="-3" y="9525"/>
-            <a:ext cx="12192003" cy="6858001"/>
-          </a:xfrm>
-          <a:prstGeom prst="rect">
-            <a:avLst/>
-          </a:prstGeom>
-          <a:noFill/>
-          <a:extLst>
-            <a:ext uri="{909E8E84-426E-40dd-AFC4-6F175D3DCCD1}">
-              <a14:hiddenFill xmlns="" xmlns:a16="http://schemas.microsoft.com/office/drawing/2014/main" xmlns:p14="http://schemas.microsoft.com/office/powerpoint/2010/main" xmlns:a14="http://schemas.microsoft.com/office/drawing/2010/main">
-                <a:solidFill>
-                  <a:srgbClr val="FFFFFF"/>
-                </a:solidFill>
-              </a14:hiddenFill>
-            </a:ext>
-          </a:extLst>
-        </p:spPr>
-      </p:pic>
-      <p:sp>
-        <p:nvSpPr>
-          <p:cNvPr id="4" name="Title 3">
-            <a:extLst>
-              <a:ext uri="{FF2B5EF4-FFF2-40B4-BE49-F238E27FC236}">
-                <a16:creationId xmlns:a16="http://schemas.microsoft.com/office/drawing/2014/main" id="{BF2A2A9C-1F41-BBBB-442B-480108CAF7B0}"/>
+                <a16:creationId xmlns:a16="http://schemas.microsoft.com/office/drawing/2014/main" id="{26761F0B-784D-9EF2-D436-830701C30D5B}"/>
               </a:ext>
             </a:extLst>
           </p:cNvPr>
@@ -17912,35 +20816,29 @@
             <a:spLocks noGrp="1"/>
           </p:cNvSpPr>
           <p:nvPr>
-            <p:ph type="ctrTitle"/>
+            <p:ph type="title"/>
           </p:nvPr>
         </p:nvSpPr>
-        <p:spPr>
-          <a:xfrm>
-            <a:off x="2043113" y="1122363"/>
-            <a:ext cx="4527929" cy="4287836"/>
-          </a:xfrm>
-        </p:spPr>
+        <p:spPr/>
         <p:txBody>
-          <a:bodyPr anchor="ctr">
+          <a:bodyPr>
             <a:normAutofit/>
           </a:bodyPr>
           <a:lstStyle/>
           <a:p>
-            <a:pPr algn="r"/>
             <a:r>
-              <a:rPr lang="en-US" sz="6000"/>
-              <a:t>nomopoly</a:t>
+              <a:rPr lang="en-US" dirty="0"/>
+              <a:t>Feedback is highly appreciated</a:t>
             </a:r>
           </a:p>
         </p:txBody>
       </p:sp>
       <p:sp>
         <p:nvSpPr>
-          <p:cNvPr id="5" name="Subtitle 4">
+          <p:cNvPr id="3" name="Content Placeholder 2">
             <a:extLst>
               <a:ext uri="{FF2B5EF4-FFF2-40B4-BE49-F238E27FC236}">
-                <a16:creationId xmlns:a16="http://schemas.microsoft.com/office/drawing/2014/main" id="{759FCC45-3BD0-B2D6-619C-2CE9E35273E0}"/>
+                <a16:creationId xmlns:a16="http://schemas.microsoft.com/office/drawing/2014/main" id="{6AB15851-7847-39C7-5453-082891924829}"/>
               </a:ext>
             </a:extLst>
           </p:cNvPr>
@@ -17948,86 +20846,25 @@
             <a:spLocks noGrp="1"/>
           </p:cNvSpPr>
           <p:nvPr>
-            <p:ph type="subTitle" idx="1"/>
+            <p:ph idx="1"/>
           </p:nvPr>
         </p:nvSpPr>
-        <p:spPr>
-          <a:xfrm>
-            <a:off x="7851631" y="1122363"/>
-            <a:ext cx="2816368" cy="4287834"/>
-          </a:xfrm>
-        </p:spPr>
+        <p:spPr/>
         <p:txBody>
-          <a:bodyPr anchor="ctr">
-            <a:normAutofit/>
-          </a:bodyPr>
+          <a:bodyPr/>
           <a:lstStyle/>
           <a:p>
             <a:r>
-              <a:rPr lang="en-US" sz="2400"/>
-              <a:t>ZKML Compiler without polynomial commitments</a:t>
+              <a:rPr lang="en-US" dirty="0"/>
+              <a:t>There must be some sense working on this</a:t>
             </a:r>
           </a:p>
         </p:txBody>
       </p:sp>
-      <p:cxnSp>
-        <p:nvCxnSpPr>
-          <p:cNvPr id="70" name="Straight Connector 69">
-            <a:extLst>
-              <a:ext uri="{FF2B5EF4-FFF2-40B4-BE49-F238E27FC236}">
-                <a16:creationId xmlns:a16="http://schemas.microsoft.com/office/drawing/2014/main" id="{D902DA06-324A-48CE-8C20-94535480A632}"/>
-              </a:ext>
-              <a:ext uri="{C183D7F6-B498-43B3-948B-1728B52AA6E4}">
-                <adec:decorative xmlns:adec="http://schemas.microsoft.com/office/drawing/2017/decorative" val="1"/>
-              </a:ext>
-            </a:extLst>
-          </p:cNvPr>
-          <p:cNvCxnSpPr>
-            <a:cxnSpLocks noGrp="1" noRot="1" noChangeAspect="1" noMove="1" noResize="1" noEditPoints="1" noAdjustHandles="1" noChangeArrowheads="1" noChangeShapeType="1"/>
-          </p:cNvCxnSpPr>
-          <p:nvPr>
-            <p:extLst>
-              <p:ext uri="{386F3935-93C4-4BCD-93E2-E3B085C9AB24}">
-                <p16:designElem xmlns:p16="http://schemas.microsoft.com/office/powerpoint/2015/main" val="1"/>
-              </p:ext>
-            </p:extLst>
-          </p:nvPr>
-        </p:nvCxnSpPr>
-        <p:spPr>
-          <a:xfrm>
-            <a:off x="7211336" y="1454684"/>
-            <a:ext cx="0" cy="3649129"/>
-          </a:xfrm>
-          <a:prstGeom prst="line">
-            <a:avLst/>
-          </a:prstGeom>
-          <a:ln w="25400">
-            <a:solidFill>
-              <a:schemeClr val="tx1">
-                <a:alpha val="70000"/>
-              </a:schemeClr>
-            </a:solidFill>
-          </a:ln>
-        </p:spPr>
-        <p:style>
-          <a:lnRef idx="1">
-            <a:schemeClr val="accent1"/>
-          </a:lnRef>
-          <a:fillRef idx="0">
-            <a:schemeClr val="accent1"/>
-          </a:fillRef>
-          <a:effectRef idx="0">
-            <a:schemeClr val="accent1"/>
-          </a:effectRef>
-          <a:fontRef idx="minor">
-            <a:schemeClr val="tx1"/>
-          </a:fontRef>
-        </p:style>
-      </p:cxnSp>
     </p:spTree>
     <p:extLst>
       <p:ext uri="{BB962C8B-B14F-4D97-AF65-F5344CB8AC3E}">
-        <p14:creationId xmlns:p14="http://schemas.microsoft.com/office/powerpoint/2010/main" val="1169857960"/>
+        <p14:creationId xmlns:p14="http://schemas.microsoft.com/office/powerpoint/2010/main" val="3671644742"/>
       </p:ext>
     </p:extLst>
   </p:cSld>
@@ -18550,7 +21387,7 @@
           <a:p>
             <a:r>
               <a:rPr lang="en-US" dirty="0"/>
-              <a:t>ZKML</a:t>
+              <a:t>ZKML landscape today</a:t>
             </a:r>
           </a:p>
         </p:txBody>
@@ -18577,8 +21414,16 @@
           <a:lstStyle/>
           <a:p>
             <a:r>
+              <a:rPr lang="en-US" dirty="0" err="1"/>
+              <a:t>ezkl</a:t>
+            </a:r>
+            <a:endParaRPr lang="en-US" dirty="0"/>
+          </a:p>
+          <a:p>
+            <a:pPr lvl="1"/>
+            <a:r>
               <a:rPr lang="en-US" dirty="0"/>
-              <a:t>EZKL – Halo2</a:t>
+              <a:t>Halo2</a:t>
             </a:r>
           </a:p>
           <a:p>
@@ -18609,6 +21454,13 @@
               <a:t>)</a:t>
             </a:r>
           </a:p>
+          <a:p>
+            <a:pPr lvl="1"/>
+            <a:r>
+              <a:rPr lang="en-US" dirty="0"/>
+              <a:t>Not open source</a:t>
+            </a:r>
+          </a:p>
         </p:txBody>
       </p:sp>
     </p:spTree>
@@ -18627,6 +21479,30 @@
 <file path=ppt/slides/slide4.xml><?xml version="1.0" encoding="utf-8"?>
 <p:sld xmlns:a="http://schemas.openxmlformats.org/drawingml/2006/main" xmlns:r="http://schemas.openxmlformats.org/officeDocument/2006/relationships" xmlns:p="http://schemas.openxmlformats.org/presentationml/2006/main">
   <p:cSld>
+    <p:bg>
+      <p:bgPr>
+        <a:blipFill>
+          <a:blip r:embed="rId2">
+            <a:duotone>
+              <a:schemeClr val="bg2">
+                <a:shade val="48000"/>
+                <a:hueMod val="106000"/>
+                <a:satMod val="140000"/>
+                <a:lumMod val="42000"/>
+              </a:schemeClr>
+              <a:schemeClr val="bg2">
+                <a:tint val="98000"/>
+                <a:hueMod val="92000"/>
+                <a:satMod val="220000"/>
+                <a:lumMod val="90000"/>
+              </a:schemeClr>
+            </a:duotone>
+          </a:blip>
+          <a:stretch/>
+        </a:blipFill>
+        <a:effectLst/>
+      </p:bgPr>
+    </p:bg>
     <p:spTree>
       <p:nvGrpSpPr>
         <p:cNvPr id="1" name="">
@@ -18663,9 +21539,16 @@
             <p:ph type="title"/>
           </p:nvPr>
         </p:nvSpPr>
-        <p:spPr/>
+        <p:spPr>
+          <a:xfrm>
+            <a:off x="1141413" y="618518"/>
+            <a:ext cx="9905998" cy="1478570"/>
+          </a:xfrm>
+        </p:spPr>
         <p:txBody>
-          <a:bodyPr/>
+          <a:bodyPr>
+            <a:normAutofit/>
+          </a:bodyPr>
           <a:lstStyle/>
           <a:p>
             <a:r>
@@ -18675,49 +21558,37 @@
           </a:p>
         </p:txBody>
       </p:sp>
-      <p:sp>
-        <p:nvSpPr>
-          <p:cNvPr id="3" name="Content Placeholder 2">
+      <p:graphicFrame>
+        <p:nvGraphicFramePr>
+          <p:cNvPr id="5" name="Content Placeholder 2">
             <a:extLst>
               <a:ext uri="{FF2B5EF4-FFF2-40B4-BE49-F238E27FC236}">
-                <a16:creationId xmlns:a16="http://schemas.microsoft.com/office/drawing/2014/main" id="{015B71A8-BB3F-418A-4A49-4E94D30AFE23}"/>
+                <a16:creationId xmlns:a16="http://schemas.microsoft.com/office/drawing/2014/main" id="{F070C33F-ACF2-332B-4708-5E279E082697}"/>
               </a:ext>
             </a:extLst>
           </p:cNvPr>
-          <p:cNvSpPr>
-            <a:spLocks noGrp="1"/>
-          </p:cNvSpPr>
+          <p:cNvGraphicFramePr>
+            <a:graphicFrameLocks noGrp="1"/>
+          </p:cNvGraphicFramePr>
           <p:nvPr>
             <p:ph idx="1"/>
+            <p:extLst>
+              <p:ext uri="{D42A27DB-BD31-4B8C-83A1-F6EECF244321}">
+                <p14:modId xmlns:p14="http://schemas.microsoft.com/office/powerpoint/2010/main" val="3127917542"/>
+              </p:ext>
+            </p:extLst>
           </p:nvPr>
-        </p:nvSpPr>
-        <p:spPr/>
-        <p:txBody>
-          <a:bodyPr/>
-          <a:lstStyle/>
-          <a:p>
-            <a:r>
-              <a:rPr lang="en-US" dirty="0"/>
-              <a:t>Learn the most efficient proof of inference system for a given model</a:t>
-            </a:r>
-          </a:p>
-          <a:p>
-            <a:r>
-              <a:rPr lang="en-US" dirty="0"/>
-              <a:t>Prove the token generation of a small language model</a:t>
-            </a:r>
-          </a:p>
-          <a:p>
-            <a:r>
-              <a:rPr lang="en-US" dirty="0"/>
-              <a:t>Build an LLM proving runtime usable in production</a:t>
-            </a:r>
-          </a:p>
-          <a:p>
-            <a:endParaRPr lang="en-US" dirty="0"/>
-          </a:p>
-        </p:txBody>
-      </p:sp>
+        </p:nvGraphicFramePr>
+        <p:xfrm>
+          <a:off x="1141413" y="2418820"/>
+          <a:ext cx="9906000" cy="3142721"/>
+        </p:xfrm>
+        <a:graphic>
+          <a:graphicData uri="http://schemas.openxmlformats.org/drawingml/2006/diagram">
+            <dgm:relIds xmlns:dgm="http://schemas.openxmlformats.org/drawingml/2006/diagram" xmlns:r="http://schemas.openxmlformats.org/officeDocument/2006/relationships" r:dm="rId3" r:lo="rId4" r:qs="rId5" r:cs="rId6"/>
+          </a:graphicData>
+        </a:graphic>
+      </p:graphicFrame>
     </p:spTree>
     <p:extLst>
       <p:ext uri="{BB962C8B-B14F-4D97-AF65-F5344CB8AC3E}">
@@ -24314,7 +27185,15 @@
           <a:p>
             <a:r>
               <a:rPr lang="en-US" dirty="0"/>
-              <a:t>Can you really avoid polynomials?</a:t>
+              <a:t>Can you </a:t>
+            </a:r>
+            <a:r>
+              <a:rPr lang="en-US" u="sng" dirty="0"/>
+              <a:t>really</a:t>
+            </a:r>
+            <a:r>
+              <a:rPr lang="en-US" dirty="0"/>
+              <a:t> avoid polynomials?</a:t>
             </a:r>
           </a:p>
           <a:p>
@@ -24324,7 +27203,7 @@
             </a:r>
             <a:r>
               <a:rPr lang="en-US" dirty="0"/>
-              <a:t> paper did it</a:t>
+              <a:t> paper did it!</a:t>
             </a:r>
           </a:p>
           <a:p>
@@ -24350,6 +27229,368 @@
 </file>
 
 <file path=ppt/slides/slide6.xml><?xml version="1.0" encoding="utf-8"?>
+<p:sld xmlns:a="http://schemas.openxmlformats.org/drawingml/2006/main" xmlns:r="http://schemas.openxmlformats.org/officeDocument/2006/relationships" xmlns:p="http://schemas.openxmlformats.org/presentationml/2006/main">
+  <p:cSld>
+    <p:spTree>
+      <p:nvGrpSpPr>
+        <p:cNvPr id="1" name="">
+          <a:extLst>
+            <a:ext uri="{FF2B5EF4-FFF2-40B4-BE49-F238E27FC236}">
+              <a16:creationId xmlns:a16="http://schemas.microsoft.com/office/drawing/2014/main" id="{330D46C2-0964-CA0E-5D6D-74D1A48E1B61}"/>
+            </a:ext>
+          </a:extLst>
+        </p:cNvPr>
+        <p:cNvGrpSpPr/>
+        <p:nvPr/>
+      </p:nvGrpSpPr>
+      <p:grpSpPr>
+        <a:xfrm>
+          <a:off x="0" y="0"/>
+          <a:ext cx="0" cy="0"/>
+          <a:chOff x="0" y="0"/>
+          <a:chExt cx="0" cy="0"/>
+        </a:xfrm>
+      </p:grpSpPr>
+      <p:sp>
+        <p:nvSpPr>
+          <p:cNvPr id="2" name="Title 1">
+            <a:extLst>
+              <a:ext uri="{FF2B5EF4-FFF2-40B4-BE49-F238E27FC236}">
+                <a16:creationId xmlns:a16="http://schemas.microsoft.com/office/drawing/2014/main" id="{DEB146B1-A98F-8B0F-556D-FF017485C8D9}"/>
+              </a:ext>
+            </a:extLst>
+          </p:cNvPr>
+          <p:cNvSpPr>
+            <a:spLocks noGrp="1"/>
+          </p:cNvSpPr>
+          <p:nvPr>
+            <p:ph type="title"/>
+          </p:nvPr>
+        </p:nvSpPr>
+        <p:spPr/>
+        <p:txBody>
+          <a:bodyPr>
+            <a:normAutofit/>
+          </a:bodyPr>
+          <a:lstStyle/>
+          <a:p>
+            <a:r>
+              <a:rPr lang="en-US" dirty="0"/>
+              <a:t>Neural Network Trifecta</a:t>
+            </a:r>
+          </a:p>
+        </p:txBody>
+      </p:sp>
+      <p:sp>
+        <p:nvSpPr>
+          <p:cNvPr id="3" name="Content Placeholder 2">
+            <a:extLst>
+              <a:ext uri="{FF2B5EF4-FFF2-40B4-BE49-F238E27FC236}">
+                <a16:creationId xmlns:a16="http://schemas.microsoft.com/office/drawing/2014/main" id="{0BDA901F-1DFC-63E2-D938-CE7C5A075450}"/>
+              </a:ext>
+            </a:extLst>
+          </p:cNvPr>
+          <p:cNvSpPr>
+            <a:spLocks noGrp="1"/>
+          </p:cNvSpPr>
+          <p:nvPr>
+            <p:ph idx="1"/>
+          </p:nvPr>
+        </p:nvSpPr>
+        <p:spPr/>
+        <p:txBody>
+          <a:bodyPr/>
+          <a:lstStyle/>
+          <a:p>
+            <a:r>
+              <a:rPr lang="en-US" dirty="0"/>
+              <a:t>Prover Net</a:t>
+            </a:r>
+          </a:p>
+          <a:p>
+            <a:pPr lvl="1"/>
+            <a:r>
+              <a:rPr lang="en-US" dirty="0"/>
+              <a:t>Augment the original network with Proof Generation Network</a:t>
+            </a:r>
+          </a:p>
+          <a:p>
+            <a:r>
+              <a:rPr lang="en-US" dirty="0"/>
+              <a:t>Verifier Net</a:t>
+            </a:r>
+          </a:p>
+          <a:p>
+            <a:pPr lvl="1"/>
+            <a:r>
+              <a:rPr lang="en-US" dirty="0"/>
+              <a:t>Binary classification network learning to verify (in, out, proof) triplets correctly</a:t>
+            </a:r>
+          </a:p>
+          <a:p>
+            <a:r>
+              <a:rPr lang="en-US" dirty="0"/>
+              <a:t>Malicious Net</a:t>
+            </a:r>
+          </a:p>
+          <a:p>
+            <a:pPr lvl="1"/>
+            <a:r>
+              <a:rPr lang="en-US" dirty="0"/>
+              <a:t>Given (in, out) pair tries to generate proof to fool the verifier</a:t>
+            </a:r>
+          </a:p>
+        </p:txBody>
+      </p:sp>
+    </p:spTree>
+    <p:extLst>
+      <p:ext uri="{BB962C8B-B14F-4D97-AF65-F5344CB8AC3E}">
+        <p14:creationId xmlns:p14="http://schemas.microsoft.com/office/powerpoint/2010/main" val="1566548458"/>
+      </p:ext>
+    </p:extLst>
+  </p:cSld>
+  <p:clrMapOvr>
+    <a:masterClrMapping/>
+  </p:clrMapOvr>
+</p:sld>
+</file>
+
+<file path=ppt/slides/slide7.xml><?xml version="1.0" encoding="utf-8"?>
+<p:sld xmlns:a="http://schemas.openxmlformats.org/drawingml/2006/main" xmlns:r="http://schemas.openxmlformats.org/officeDocument/2006/relationships" xmlns:p="http://schemas.openxmlformats.org/presentationml/2006/main">
+  <p:cSld>
+    <p:spTree>
+      <p:nvGrpSpPr>
+        <p:cNvPr id="1" name="">
+          <a:extLst>
+            <a:ext uri="{FF2B5EF4-FFF2-40B4-BE49-F238E27FC236}">
+              <a16:creationId xmlns:a16="http://schemas.microsoft.com/office/drawing/2014/main" id="{5BD3ADD1-C375-BA83-808C-141A19820B8A}"/>
+            </a:ext>
+          </a:extLst>
+        </p:cNvPr>
+        <p:cNvGrpSpPr/>
+        <p:nvPr/>
+      </p:nvGrpSpPr>
+      <p:grpSpPr>
+        <a:xfrm>
+          <a:off x="0" y="0"/>
+          <a:ext cx="0" cy="0"/>
+          <a:chOff x="0" y="0"/>
+          <a:chExt cx="0" cy="0"/>
+        </a:xfrm>
+      </p:grpSpPr>
+      <p:sp>
+        <p:nvSpPr>
+          <p:cNvPr id="2" name="Title 1">
+            <a:extLst>
+              <a:ext uri="{FF2B5EF4-FFF2-40B4-BE49-F238E27FC236}">
+                <a16:creationId xmlns:a16="http://schemas.microsoft.com/office/drawing/2014/main" id="{41CEEF28-6E5E-6879-087C-350F3B071CEE}"/>
+              </a:ext>
+            </a:extLst>
+          </p:cNvPr>
+          <p:cNvSpPr>
+            <a:spLocks noGrp="1"/>
+          </p:cNvSpPr>
+          <p:nvPr>
+            <p:ph type="title"/>
+          </p:nvPr>
+        </p:nvSpPr>
+        <p:spPr/>
+        <p:txBody>
+          <a:bodyPr>
+            <a:normAutofit/>
+          </a:bodyPr>
+          <a:lstStyle/>
+          <a:p>
+            <a:r>
+              <a:rPr lang="en-US" dirty="0"/>
+              <a:t>Training</a:t>
+            </a:r>
+          </a:p>
+        </p:txBody>
+      </p:sp>
+      <p:sp>
+        <p:nvSpPr>
+          <p:cNvPr id="3" name="Content Placeholder 2">
+            <a:extLst>
+              <a:ext uri="{FF2B5EF4-FFF2-40B4-BE49-F238E27FC236}">
+                <a16:creationId xmlns:a16="http://schemas.microsoft.com/office/drawing/2014/main" id="{675626CD-1AF2-1277-4130-5E9661BC21B4}"/>
+              </a:ext>
+            </a:extLst>
+          </p:cNvPr>
+          <p:cNvSpPr>
+            <a:spLocks noGrp="1"/>
+          </p:cNvSpPr>
+          <p:nvPr>
+            <p:ph idx="1"/>
+          </p:nvPr>
+        </p:nvSpPr>
+        <p:spPr/>
+        <p:txBody>
+          <a:bodyPr/>
+          <a:lstStyle/>
+          <a:p>
+            <a:r>
+              <a:rPr lang="en-US" dirty="0"/>
+              <a:t>…</a:t>
+            </a:r>
+          </a:p>
+        </p:txBody>
+      </p:sp>
+    </p:spTree>
+    <p:extLst>
+      <p:ext uri="{BB962C8B-B14F-4D97-AF65-F5344CB8AC3E}">
+        <p14:creationId xmlns:p14="http://schemas.microsoft.com/office/powerpoint/2010/main" val="4137140982"/>
+      </p:ext>
+    </p:extLst>
+  </p:cSld>
+  <p:clrMapOvr>
+    <a:masterClrMapping/>
+  </p:clrMapOvr>
+</p:sld>
+</file>
+
+<file path=ppt/slides/slide8.xml><?xml version="1.0" encoding="utf-8"?>
+<p:sld xmlns:a="http://schemas.openxmlformats.org/drawingml/2006/main" xmlns:r="http://schemas.openxmlformats.org/officeDocument/2006/relationships" xmlns:p="http://schemas.openxmlformats.org/presentationml/2006/main">
+  <p:cSld>
+    <p:spTree>
+      <p:nvGrpSpPr>
+        <p:cNvPr id="1" name="">
+          <a:extLst>
+            <a:ext uri="{FF2B5EF4-FFF2-40B4-BE49-F238E27FC236}">
+              <a16:creationId xmlns:a16="http://schemas.microsoft.com/office/drawing/2014/main" id="{5ADD9713-223D-3512-3CAD-416C8FEFDBFA}"/>
+            </a:ext>
+          </a:extLst>
+        </p:cNvPr>
+        <p:cNvGrpSpPr/>
+        <p:nvPr/>
+      </p:nvGrpSpPr>
+      <p:grpSpPr>
+        <a:xfrm>
+          <a:off x="0" y="0"/>
+          <a:ext cx="0" cy="0"/>
+          <a:chOff x="0" y="0"/>
+          <a:chExt cx="0" cy="0"/>
+        </a:xfrm>
+      </p:grpSpPr>
+      <p:sp>
+        <p:nvSpPr>
+          <p:cNvPr id="2" name="Title 1">
+            <a:extLst>
+              <a:ext uri="{FF2B5EF4-FFF2-40B4-BE49-F238E27FC236}">
+                <a16:creationId xmlns:a16="http://schemas.microsoft.com/office/drawing/2014/main" id="{FADC4AC5-CF05-D0F9-B440-58371478C9F1}"/>
+              </a:ext>
+            </a:extLst>
+          </p:cNvPr>
+          <p:cNvSpPr>
+            <a:spLocks noGrp="1"/>
+          </p:cNvSpPr>
+          <p:nvPr>
+            <p:ph type="title"/>
+          </p:nvPr>
+        </p:nvSpPr>
+        <p:spPr/>
+        <p:txBody>
+          <a:bodyPr>
+            <a:normAutofit/>
+          </a:bodyPr>
+          <a:lstStyle/>
+          <a:p>
+            <a:r>
+              <a:rPr lang="en-US" dirty="0"/>
+              <a:t>Benchmark</a:t>
+            </a:r>
+          </a:p>
+        </p:txBody>
+      </p:sp>
+      <p:sp>
+        <p:nvSpPr>
+          <p:cNvPr id="3" name="Content Placeholder 2">
+            <a:extLst>
+              <a:ext uri="{FF2B5EF4-FFF2-40B4-BE49-F238E27FC236}">
+                <a16:creationId xmlns:a16="http://schemas.microsoft.com/office/drawing/2014/main" id="{106BC4CF-5CF1-4CEF-2B4A-D0FB114DC420}"/>
+              </a:ext>
+            </a:extLst>
+          </p:cNvPr>
+          <p:cNvSpPr>
+            <a:spLocks noGrp="1"/>
+          </p:cNvSpPr>
+          <p:nvPr>
+            <p:ph idx="1"/>
+          </p:nvPr>
+        </p:nvSpPr>
+        <p:spPr/>
+        <p:txBody>
+          <a:bodyPr/>
+          <a:lstStyle/>
+          <a:p>
+            <a:r>
+              <a:rPr lang="en-US" dirty="0"/>
+              <a:t>…</a:t>
+            </a:r>
+          </a:p>
+        </p:txBody>
+      </p:sp>
+      <p:pic>
+        <p:nvPicPr>
+          <p:cNvPr id="4" name="Picture 2">
+            <a:extLst>
+              <a:ext uri="{FF2B5EF4-FFF2-40B4-BE49-F238E27FC236}">
+                <a16:creationId xmlns:a16="http://schemas.microsoft.com/office/drawing/2014/main" id="{6027CECA-25EB-1598-54B0-2F343E797DE4}"/>
+              </a:ext>
+            </a:extLst>
+          </p:cNvPr>
+          <p:cNvPicPr>
+            <a:picLocks noChangeAspect="1" noChangeArrowheads="1"/>
+          </p:cNvPicPr>
+          <p:nvPr/>
+        </p:nvPicPr>
+        <p:blipFill>
+          <a:blip r:embed="rId2">
+            <a:extLst>
+              <a:ext uri="{28A0092B-C50C-407E-A947-70E740481C1C}">
+                <a14:useLocalDpi xmlns:a14="http://schemas.microsoft.com/office/drawing/2010/main" val="0"/>
+              </a:ext>
+            </a:extLst>
+          </a:blip>
+          <a:srcRect/>
+          <a:stretch>
+            <a:fillRect/>
+          </a:stretch>
+        </p:blipFill>
+        <p:spPr bwMode="auto">
+          <a:xfrm>
+            <a:off x="7043737" y="0"/>
+            <a:ext cx="5148263" cy="6858000"/>
+          </a:xfrm>
+          <a:prstGeom prst="rect">
+            <a:avLst/>
+          </a:prstGeom>
+          <a:noFill/>
+          <a:extLst>
+            <a:ext uri="{909E8E84-426E-40DD-AFC4-6F175D3DCCD1}">
+              <a14:hiddenFill xmlns:a14="http://schemas.microsoft.com/office/drawing/2010/main">
+                <a:solidFill>
+                  <a:srgbClr val="FFFFFF"/>
+                </a:solidFill>
+              </a14:hiddenFill>
+            </a:ext>
+          </a:extLst>
+        </p:spPr>
+      </p:pic>
+    </p:spTree>
+    <p:extLst>
+      <p:ext uri="{BB962C8B-B14F-4D97-AF65-F5344CB8AC3E}">
+        <p14:creationId xmlns:p14="http://schemas.microsoft.com/office/powerpoint/2010/main" val="3454425819"/>
+      </p:ext>
+    </p:extLst>
+  </p:cSld>
+  <p:clrMapOvr>
+    <a:masterClrMapping/>
+  </p:clrMapOvr>
+</p:sld>
+</file>
+
+<file path=ppt/slides/slide9.xml><?xml version="1.0" encoding="utf-8"?>
 <p:sld xmlns:a="http://schemas.openxmlformats.org/drawingml/2006/main" xmlns:r="http://schemas.openxmlformats.org/officeDocument/2006/relationships" xmlns:p="http://schemas.openxmlformats.org/presentationml/2006/main">
   <p:cSld>
     <p:spTree>
@@ -24447,7 +27688,7 @@
           <a:p>
             <a:r>
               <a:rPr lang="en-US" dirty="0"/>
-              <a:t>we can learn each op (2DCONV, Linear, ReLU…)</a:t>
+              <a:t>…we can learn each op (2DCONV, Linear, ReLU…)</a:t>
             </a:r>
           </a:p>
           <a:p>

</xml_diff>